<commit_message>
adjust game screen size and add arch label option
</commit_message>
<xml_diff>
--- a/images/images.pptx
+++ b/images/images.pptx
@@ -199,7 +199,7 @@
           <a:p>
             <a:fld id="{886F97ED-8CED-CA4C-AC21-E9F1C6F3A2C0}" type="datetimeFigureOut">
               <a:rPr lang="en-US" smtClean="0"/>
-              <a:t>7/18/19</a:t>
+              <a:t>7/19/19</a:t>
             </a:fld>
             <a:endParaRPr lang="en-US"/>
           </a:p>
@@ -682,7 +682,7 @@
           <a:p>
             <a:fld id="{65BA97D1-A630-FB46-8B2C-2E138AAEAE44}" type="datetimeFigureOut">
               <a:rPr lang="en-US" smtClean="0"/>
-              <a:t>7/18/19</a:t>
+              <a:t>7/19/19</a:t>
             </a:fld>
             <a:endParaRPr lang="en-US"/>
           </a:p>
@@ -852,7 +852,7 @@
           <a:p>
             <a:fld id="{65BA97D1-A630-FB46-8B2C-2E138AAEAE44}" type="datetimeFigureOut">
               <a:rPr lang="en-US" smtClean="0"/>
-              <a:t>7/18/19</a:t>
+              <a:t>7/19/19</a:t>
             </a:fld>
             <a:endParaRPr lang="en-US"/>
           </a:p>
@@ -1032,7 +1032,7 @@
           <a:p>
             <a:fld id="{65BA97D1-A630-FB46-8B2C-2E138AAEAE44}" type="datetimeFigureOut">
               <a:rPr lang="en-US" smtClean="0"/>
-              <a:t>7/18/19</a:t>
+              <a:t>7/19/19</a:t>
             </a:fld>
             <a:endParaRPr lang="en-US"/>
           </a:p>
@@ -1202,7 +1202,7 @@
           <a:p>
             <a:fld id="{65BA97D1-A630-FB46-8B2C-2E138AAEAE44}" type="datetimeFigureOut">
               <a:rPr lang="en-US" smtClean="0"/>
-              <a:t>7/18/19</a:t>
+              <a:t>7/19/19</a:t>
             </a:fld>
             <a:endParaRPr lang="en-US"/>
           </a:p>
@@ -1448,7 +1448,7 @@
           <a:p>
             <a:fld id="{65BA97D1-A630-FB46-8B2C-2E138AAEAE44}" type="datetimeFigureOut">
               <a:rPr lang="en-US" smtClean="0"/>
-              <a:t>7/18/19</a:t>
+              <a:t>7/19/19</a:t>
             </a:fld>
             <a:endParaRPr lang="en-US"/>
           </a:p>
@@ -1680,7 +1680,7 @@
           <a:p>
             <a:fld id="{65BA97D1-A630-FB46-8B2C-2E138AAEAE44}" type="datetimeFigureOut">
               <a:rPr lang="en-US" smtClean="0"/>
-              <a:t>7/18/19</a:t>
+              <a:t>7/19/19</a:t>
             </a:fld>
             <a:endParaRPr lang="en-US"/>
           </a:p>
@@ -2047,7 +2047,7 @@
           <a:p>
             <a:fld id="{65BA97D1-A630-FB46-8B2C-2E138AAEAE44}" type="datetimeFigureOut">
               <a:rPr lang="en-US" smtClean="0"/>
-              <a:t>7/18/19</a:t>
+              <a:t>7/19/19</a:t>
             </a:fld>
             <a:endParaRPr lang="en-US"/>
           </a:p>
@@ -2165,7 +2165,7 @@
           <a:p>
             <a:fld id="{65BA97D1-A630-FB46-8B2C-2E138AAEAE44}" type="datetimeFigureOut">
               <a:rPr lang="en-US" smtClean="0"/>
-              <a:t>7/18/19</a:t>
+              <a:t>7/19/19</a:t>
             </a:fld>
             <a:endParaRPr lang="en-US"/>
           </a:p>
@@ -2260,7 +2260,7 @@
           <a:p>
             <a:fld id="{65BA97D1-A630-FB46-8B2C-2E138AAEAE44}" type="datetimeFigureOut">
               <a:rPr lang="en-US" smtClean="0"/>
-              <a:t>7/18/19</a:t>
+              <a:t>7/19/19</a:t>
             </a:fld>
             <a:endParaRPr lang="en-US"/>
           </a:p>
@@ -2537,7 +2537,7 @@
           <a:p>
             <a:fld id="{65BA97D1-A630-FB46-8B2C-2E138AAEAE44}" type="datetimeFigureOut">
               <a:rPr lang="en-US" smtClean="0"/>
-              <a:t>7/18/19</a:t>
+              <a:t>7/19/19</a:t>
             </a:fld>
             <a:endParaRPr lang="en-US"/>
           </a:p>
@@ -2790,7 +2790,7 @@
           <a:p>
             <a:fld id="{65BA97D1-A630-FB46-8B2C-2E138AAEAE44}" type="datetimeFigureOut">
               <a:rPr lang="en-US" smtClean="0"/>
-              <a:t>7/18/19</a:t>
+              <a:t>7/19/19</a:t>
             </a:fld>
             <a:endParaRPr lang="en-US"/>
           </a:p>
@@ -3003,7 +3003,7 @@
           <a:p>
             <a:fld id="{65BA97D1-A630-FB46-8B2C-2E138AAEAE44}" type="datetimeFigureOut">
               <a:rPr lang="en-US" smtClean="0"/>
-              <a:t>7/18/19</a:t>
+              <a:t>7/19/19</a:t>
             </a:fld>
             <a:endParaRPr lang="en-US"/>
           </a:p>
@@ -3784,7 +3784,7 @@
               <a:lstStyle/>
               <a:p>
                 <a:pPr algn="ctr"/>
-                <a:endParaRPr lang="en-US"/>
+                <a:endParaRPr lang="en-US" dirty="0"/>
               </a:p>
             </p:txBody>
           </p:sp>
@@ -4475,6 +4475,36 @@
           </p:sp>
         </p:grpSp>
       </p:grpSp>
+      <p:sp>
+        <p:nvSpPr>
+          <p:cNvPr id="2" name="TextBox 1"/>
+          <p:cNvSpPr txBox="1"/>
+          <p:nvPr/>
+        </p:nvSpPr>
+        <p:spPr>
+          <a:xfrm>
+            <a:off x="2416637" y="791914"/>
+            <a:ext cx="2314608" cy="369332"/>
+          </a:xfrm>
+          <a:prstGeom prst="rect">
+            <a:avLst/>
+          </a:prstGeom>
+          <a:noFill/>
+        </p:spPr>
+        <p:txBody>
+          <a:bodyPr wrap="none" rtlCol="0">
+            <a:spAutoFit/>
+          </a:bodyPr>
+          <a:lstStyle/>
+          <a:p>
+            <a:r>
+              <a:rPr lang="en-US" spc="600" dirty="0" smtClean="0"/>
+              <a:t>LET’S BEGIN!</a:t>
+            </a:r>
+            <a:endParaRPr lang="en-US" spc="600" dirty="0"/>
+          </a:p>
+        </p:txBody>
+      </p:sp>
     </p:spTree>
     <p:extLst>
       <p:ext uri="{BB962C8B-B14F-4D97-AF65-F5344CB8AC3E}">
@@ -5449,8 +5479,8 @@
           <a:chExt cx="0" cy="0"/>
         </a:xfrm>
       </p:grpSpPr>
-      <mc:AlternateContent xmlns:mc="http://schemas.openxmlformats.org/markup-compatibility/2006">
-        <mc:Choice xmlns:a14="http://schemas.microsoft.com/office/drawing/2010/main" Requires="a14">
+      <mc:AlternateContent xmlns:mc="http://schemas.openxmlformats.org/markup-compatibility/2006" xmlns:a14="http://schemas.microsoft.com/office/drawing/2010/main">
+        <mc:Choice Requires="a14">
           <p:sp>
             <p:nvSpPr>
               <p:cNvPr id="4" name="TextBox 3"/>
@@ -5473,6 +5503,7 @@
               </a:bodyPr>
               <a:lstStyle/>
               <a:p>
+                <a:pPr/>
                 <a14:m>
                   <m:oMathPara xmlns:m="http://schemas.openxmlformats.org/officeDocument/2006/math">
                     <m:oMathParaPr>
@@ -5888,7 +5919,7 @@
             </p:txBody>
           </p:sp>
         </mc:Choice>
-        <mc:Fallback>
+        <mc:Fallback xmlns="">
           <p:sp>
             <p:nvSpPr>
               <p:cNvPr id="4" name="TextBox 3"/>
@@ -5927,8 +5958,8 @@
           </p:sp>
         </mc:Fallback>
       </mc:AlternateContent>
-      <mc:AlternateContent xmlns:mc="http://schemas.openxmlformats.org/markup-compatibility/2006">
-        <mc:Choice xmlns:a14="http://schemas.microsoft.com/office/drawing/2010/main" Requires="a14">
+      <mc:AlternateContent xmlns:mc="http://schemas.openxmlformats.org/markup-compatibility/2006" xmlns:a14="http://schemas.microsoft.com/office/drawing/2010/main">
+        <mc:Choice Requires="a14">
           <p:sp>
             <p:nvSpPr>
               <p:cNvPr id="5" name="TextBox 4"/>
@@ -5951,6 +5982,7 @@
               </a:bodyPr>
               <a:lstStyle/>
               <a:p>
+                <a:pPr/>
                 <a14:m>
                   <m:oMathPara xmlns:m="http://schemas.openxmlformats.org/officeDocument/2006/math">
                     <m:oMathParaPr>
@@ -6356,7 +6388,7 @@
             </p:txBody>
           </p:sp>
         </mc:Choice>
-        <mc:Fallback>
+        <mc:Fallback xmlns="">
           <p:sp>
             <p:nvSpPr>
               <p:cNvPr id="5" name="TextBox 4"/>
@@ -6409,8 +6441,8 @@
             <a:chExt cx="10096931" cy="788900"/>
           </a:xfrm>
         </p:grpSpPr>
-        <mc:AlternateContent xmlns:mc="http://schemas.openxmlformats.org/markup-compatibility/2006">
-          <mc:Choice xmlns:a14="http://schemas.microsoft.com/office/drawing/2010/main" Requires="a14">
+        <mc:AlternateContent xmlns:mc="http://schemas.openxmlformats.org/markup-compatibility/2006" xmlns:a14="http://schemas.microsoft.com/office/drawing/2010/main">
+          <mc:Choice Requires="a14">
             <p:sp>
               <p:nvSpPr>
                 <p:cNvPr id="6" name="TextBox 5"/>
@@ -6433,6 +6465,7 @@
                 </a:bodyPr>
                 <a:lstStyle/>
                 <a:p>
+                  <a:pPr/>
                   <a14:m>
                     <m:oMathPara xmlns:m="http://schemas.openxmlformats.org/officeDocument/2006/math">
                       <m:oMathParaPr>
@@ -6859,7 +6892,7 @@
               </p:txBody>
             </p:sp>
           </mc:Choice>
-          <mc:Fallback>
+          <mc:Fallback xmlns="">
             <p:sp>
               <p:nvSpPr>
                 <p:cNvPr id="6" name="TextBox 5"/>
@@ -6898,8 +6931,8 @@
             </p:sp>
           </mc:Fallback>
         </mc:AlternateContent>
-        <mc:AlternateContent xmlns:mc="http://schemas.openxmlformats.org/markup-compatibility/2006">
-          <mc:Choice xmlns:a14="http://schemas.microsoft.com/office/drawing/2010/main" Requires="a14">
+        <mc:AlternateContent xmlns:mc="http://schemas.openxmlformats.org/markup-compatibility/2006" xmlns:a14="http://schemas.microsoft.com/office/drawing/2010/main">
+          <mc:Choice Requires="a14">
             <p:sp>
               <p:nvSpPr>
                 <p:cNvPr id="9" name="TextBox 8"/>
@@ -6922,6 +6955,7 @@
                 </a:bodyPr>
                 <a:lstStyle/>
                 <a:p>
+                  <a:pPr/>
                   <a14:m>
                     <m:oMathPara xmlns:m="http://schemas.openxmlformats.org/officeDocument/2006/math">
                       <m:oMathParaPr>
@@ -6999,7 +7033,7 @@
               </p:txBody>
             </p:sp>
           </mc:Choice>
-          <mc:Fallback>
+          <mc:Fallback xmlns="">
             <p:sp>
               <p:nvSpPr>
                 <p:cNvPr id="9" name="TextBox 8"/>

</xml_diff>

<commit_message>
fixed some wording and the formulas!
</commit_message>
<xml_diff>
--- a/images/images.pptx
+++ b/images/images.pptx
@@ -3505,7 +3505,7 @@
         </p:nvGrpSpPr>
         <p:grpSpPr>
           <a:xfrm>
-            <a:off x="3708971" y="1479476"/>
+            <a:off x="1636785" y="1282935"/>
             <a:ext cx="2044557" cy="2938413"/>
             <a:chOff x="3708971" y="1479476"/>
             <a:chExt cx="2044557" cy="2938413"/>
@@ -4483,8 +4483,8 @@
         </p:nvSpPr>
         <p:spPr>
           <a:xfrm>
-            <a:off x="2416637" y="791914"/>
-            <a:ext cx="2314608" cy="369332"/>
+            <a:off x="1636785" y="1650775"/>
+            <a:ext cx="2044557" cy="1063924"/>
           </a:xfrm>
           <a:prstGeom prst="rect">
             <a:avLst/>
@@ -4493,15 +4493,28 @@
         </p:spPr>
         <p:txBody>
           <a:bodyPr wrap="none" rtlCol="0">
+            <a:prstTxWarp prst="textArchUp">
+              <a:avLst>
+                <a:gd name="adj" fmla="val 13147348"/>
+              </a:avLst>
+            </a:prstTxWarp>
             <a:spAutoFit/>
           </a:bodyPr>
           <a:lstStyle/>
           <a:p>
             <a:r>
-              <a:rPr lang="en-US" spc="600" dirty="0" smtClean="0"/>
+              <a:rPr lang="en-US" spc="300" dirty="0" smtClean="0">
+                <a:latin typeface="Karla" charset="0"/>
+                <a:ea typeface="Karla" charset="0"/>
+                <a:cs typeface="Karla" charset="0"/>
+              </a:rPr>
               <a:t>LET’S BEGIN!</a:t>
             </a:r>
-            <a:endParaRPr lang="en-US" spc="600" dirty="0"/>
+            <a:endParaRPr lang="en-US" spc="300" dirty="0">
+              <a:latin typeface="Karla" charset="0"/>
+              <a:ea typeface="Karla" charset="0"/>
+              <a:cs typeface="Karla" charset="0"/>
+            </a:endParaRPr>
           </a:p>
         </p:txBody>
       </p:sp>
@@ -5479,8 +5492,8 @@
           <a:chExt cx="0" cy="0"/>
         </a:xfrm>
       </p:grpSpPr>
-      <mc:AlternateContent xmlns:mc="http://schemas.openxmlformats.org/markup-compatibility/2006" xmlns:a14="http://schemas.microsoft.com/office/drawing/2010/main">
-        <mc:Choice Requires="a14">
+      <mc:AlternateContent xmlns:mc="http://schemas.openxmlformats.org/markup-compatibility/2006">
+        <mc:Choice xmlns:a14="http://schemas.microsoft.com/office/drawing/2010/main" Requires="a14">
           <p:sp>
             <p:nvSpPr>
               <p:cNvPr id="4" name="TextBox 3"/>
@@ -5490,7 +5503,7 @@
             <p:spPr>
               <a:xfrm>
                 <a:off x="1876829" y="1215226"/>
-                <a:ext cx="8925392" cy="631070"/>
+                <a:ext cx="9226115" cy="631070"/>
               </a:xfrm>
               <a:prstGeom prst="rect">
                 <a:avLst/>
@@ -5657,7 +5670,13 @@
                                     <a:rPr lang="en-US" b="0" i="1" smtClean="0">
                                       <a:latin typeface="Cambria Math" charset="0"/>
                                     </a:rPr>
-                                    <m:t>𝑘𝑛𝑒𝑤</m:t>
+                                    <m:t>𝑘𝑛</m:t>
+                                  </m:r>
+                                  <m:r>
+                                    <a:rPr lang="en-US" b="0" i="1" smtClean="0">
+                                      <a:latin typeface="Cambria Math" charset="0"/>
+                                    </a:rPr>
+                                    <m:t>𝑜𝑤𝑛</m:t>
                                   </m:r>
                                 </m:e>
                                 <m:sub>
@@ -5742,7 +5761,13 @@
                                     <a:rPr lang="en-US" b="0" i="1" smtClean="0">
                                       <a:latin typeface="Cambria Math" charset="0"/>
                                     </a:rPr>
-                                    <m:t>𝑘𝑛𝑒𝑤</m:t>
+                                    <m:t>𝑘𝑛</m:t>
+                                  </m:r>
+                                  <m:r>
+                                    <a:rPr lang="en-US" b="0" i="1" smtClean="0">
+                                      <a:latin typeface="Cambria Math" charset="0"/>
+                                    </a:rPr>
+                                    <m:t>𝑜𝑤𝑛</m:t>
                                   </m:r>
                                 </m:e>
                                 <m:sub>
@@ -5857,7 +5882,13 @@
                                         <a:rPr lang="en-US" i="1">
                                           <a:latin typeface="Cambria Math" charset="0"/>
                                         </a:rPr>
-                                        <m:t>𝑘𝑛𝑒𝑤</m:t>
+                                        <m:t>𝑘𝑛</m:t>
+                                      </m:r>
+                                      <m:r>
+                                        <a:rPr lang="en-US" b="0" i="1" smtClean="0">
+                                          <a:latin typeface="Cambria Math" charset="0"/>
+                                        </a:rPr>
+                                        <m:t>𝑜𝑤𝑛</m:t>
                                       </m:r>
                                     </m:e>
                                     <m:sub>
@@ -5919,7 +5950,7 @@
             </p:txBody>
           </p:sp>
         </mc:Choice>
-        <mc:Fallback xmlns="">
+        <mc:Fallback>
           <p:sp>
             <p:nvSpPr>
               <p:cNvPr id="4" name="TextBox 3"/>
@@ -5931,7 +5962,7 @@
             <p:spPr>
               <a:xfrm>
                 <a:off x="1876829" y="1215226"/>
-                <a:ext cx="8925392" cy="631070"/>
+                <a:ext cx="9226115" cy="631070"/>
               </a:xfrm>
               <a:prstGeom prst="rect">
                 <a:avLst/>
@@ -5958,8 +5989,8 @@
           </p:sp>
         </mc:Fallback>
       </mc:AlternateContent>
-      <mc:AlternateContent xmlns:mc="http://schemas.openxmlformats.org/markup-compatibility/2006" xmlns:a14="http://schemas.microsoft.com/office/drawing/2010/main">
-        <mc:Choice Requires="a14">
+      <mc:AlternateContent xmlns:mc="http://schemas.openxmlformats.org/markup-compatibility/2006">
+        <mc:Choice xmlns:a14="http://schemas.microsoft.com/office/drawing/2010/main" Requires="a14">
           <p:sp>
             <p:nvSpPr>
               <p:cNvPr id="5" name="TextBox 4"/>
@@ -5969,7 +6000,7 @@
             <p:spPr>
               <a:xfrm>
                 <a:off x="1876829" y="2440136"/>
-                <a:ext cx="9109994" cy="631070"/>
+                <a:ext cx="9417130" cy="631070"/>
               </a:xfrm>
               <a:prstGeom prst="rect">
                 <a:avLst/>
@@ -6144,7 +6175,13 @@
                                     <a:rPr lang="en-US" b="0" i="1" smtClean="0">
                                       <a:latin typeface="Cambria Math" charset="0"/>
                                     </a:rPr>
-                                    <m:t>𝑘𝑛𝑒𝑤</m:t>
+                                    <m:t>𝑘𝑛</m:t>
+                                  </m:r>
+                                  <m:r>
+                                    <a:rPr lang="en-US" b="0" i="1" smtClean="0">
+                                      <a:latin typeface="Cambria Math" charset="0"/>
+                                    </a:rPr>
+                                    <m:t>𝑜𝑤𝑛</m:t>
                                   </m:r>
                                 </m:e>
                                 <m:sub>
@@ -6223,7 +6260,13 @@
                                     <a:rPr lang="en-US" b="0" i="1" smtClean="0">
                                       <a:latin typeface="Cambria Math" charset="0"/>
                                     </a:rPr>
-                                    <m:t>𝑘𝑛𝑒𝑤</m:t>
+                                    <m:t>𝑘𝑛</m:t>
+                                  </m:r>
+                                  <m:r>
+                                    <a:rPr lang="en-US" b="0" i="1" smtClean="0">
+                                      <a:latin typeface="Cambria Math" charset="0"/>
+                                    </a:rPr>
+                                    <m:t>𝑜𝑤𝑛</m:t>
                                   </m:r>
                                 </m:e>
                                 <m:sub>
@@ -6321,7 +6364,13 @@
                                         <a:rPr lang="en-US" i="1">
                                           <a:latin typeface="Cambria Math" charset="0"/>
                                         </a:rPr>
-                                        <m:t>𝑘𝑛𝑒𝑤</m:t>
+                                        <m:t>𝑘𝑛</m:t>
+                                      </m:r>
+                                      <m:r>
+                                        <a:rPr lang="en-US" b="0" i="1" smtClean="0">
+                                          <a:latin typeface="Cambria Math" charset="0"/>
+                                        </a:rPr>
+                                        <m:t>𝑜𝑤𝑛</m:t>
                                       </m:r>
                                     </m:e>
                                     <m:sub>
@@ -6388,7 +6437,7 @@
             </p:txBody>
           </p:sp>
         </mc:Choice>
-        <mc:Fallback xmlns="">
+        <mc:Fallback>
           <p:sp>
             <p:nvSpPr>
               <p:cNvPr id="5" name="TextBox 4"/>
@@ -6400,7 +6449,7 @@
             <p:spPr>
               <a:xfrm>
                 <a:off x="1876829" y="2440136"/>
-                <a:ext cx="9109994" cy="631070"/>
+                <a:ext cx="9417130" cy="631070"/>
               </a:xfrm>
               <a:prstGeom prst="rect">
                 <a:avLst/>
@@ -6427,652 +6476,496 @@
           </p:sp>
         </mc:Fallback>
       </mc:AlternateContent>
-      <p:grpSp>
-        <p:nvGrpSpPr>
-          <p:cNvPr id="12" name="Group 11"/>
-          <p:cNvGrpSpPr/>
-          <p:nvPr/>
-        </p:nvGrpSpPr>
-        <p:grpSpPr>
-          <a:xfrm>
-            <a:off x="1382431" y="3585556"/>
-            <a:ext cx="10096931" cy="788900"/>
-            <a:chOff x="1382431" y="3585556"/>
-            <a:chExt cx="10096931" cy="788900"/>
-          </a:xfrm>
-        </p:grpSpPr>
-        <mc:AlternateContent xmlns:mc="http://schemas.openxmlformats.org/markup-compatibility/2006" xmlns:a14="http://schemas.microsoft.com/office/drawing/2010/main">
-          <mc:Choice Requires="a14">
-            <p:sp>
-              <p:nvSpPr>
-                <p:cNvPr id="6" name="TextBox 5"/>
-                <p:cNvSpPr txBox="1"/>
-                <p:nvPr/>
-              </p:nvSpPr>
-              <p:spPr>
-                <a:xfrm>
-                  <a:off x="1382431" y="3585556"/>
-                  <a:ext cx="10096931" cy="312650"/>
-                </a:xfrm>
-                <a:prstGeom prst="rect">
-                  <a:avLst/>
-                </a:prstGeom>
-                <a:noFill/>
-              </p:spPr>
-              <p:txBody>
-                <a:bodyPr wrap="none" lIns="0" tIns="0" rIns="0" bIns="0" rtlCol="0">
-                  <a:spAutoFit/>
-                </a:bodyPr>
-                <a:lstStyle/>
-                <a:p>
-                  <a:pPr/>
-                  <a14:m>
-                    <m:oMathPara xmlns:m="http://schemas.openxmlformats.org/officeDocument/2006/math">
-                      <m:oMathParaPr>
-                        <m:jc m:val="centerGroup"/>
-                      </m:oMathParaPr>
-                      <m:oMath xmlns:m="http://schemas.openxmlformats.org/officeDocument/2006/math">
-                        <m:sSub>
-                          <m:sSubPr>
-                            <m:ctrlPr>
-                              <a:rPr lang="en-US" b="0" i="1" smtClean="0">
-                                <a:latin typeface="Cambria Math" charset="0"/>
-                                <a:ea typeface="Cambria Math" charset="0"/>
-                                <a:cs typeface="Cambria Math" charset="0"/>
-                              </a:rPr>
-                            </m:ctrlPr>
-                          </m:sSubPr>
-                          <m:e>
-                            <m:r>
-                              <a:rPr lang="en-US" b="0" i="1" smtClean="0">
-                                <a:latin typeface="Cambria Math" charset="0"/>
-                                <a:ea typeface="Cambria Math" charset="0"/>
-                                <a:cs typeface="Cambria Math" charset="0"/>
-                              </a:rPr>
-                              <m:t>𝑃</m:t>
-                            </m:r>
-                            <m:r>
-                              <a:rPr lang="en-US" b="0" i="1" smtClean="0">
-                                <a:latin typeface="Cambria Math" charset="0"/>
-                                <a:ea typeface="Cambria Math" charset="0"/>
-                                <a:cs typeface="Cambria Math" charset="0"/>
-                              </a:rPr>
-                              <m:t>(</m:t>
-                            </m:r>
-                            <m:r>
-                              <a:rPr lang="en-US" b="0" i="1" smtClean="0">
-                                <a:latin typeface="Cambria Math" charset="0"/>
-                                <a:ea typeface="Cambria Math" charset="0"/>
-                                <a:cs typeface="Cambria Math" charset="0"/>
-                              </a:rPr>
-                              <m:t>𝑙𝑒𝑎𝑟𝑛𝑒𝑑</m:t>
-                            </m:r>
-                          </m:e>
-                          <m:sub>
-                            <m:r>
-                              <a:rPr lang="en-US" b="0" i="1" smtClean="0">
-                                <a:latin typeface="Cambria Math" charset="0"/>
-                                <a:ea typeface="Cambria Math" charset="0"/>
-                                <a:cs typeface="Cambria Math" charset="0"/>
-                              </a:rPr>
-                              <m:t>𝑛</m:t>
-                            </m:r>
-                          </m:sub>
-                        </m:sSub>
-                        <m:r>
-                          <a:rPr lang="en-US" b="0" i="1" smtClean="0">
-                            <a:latin typeface="Cambria Math" charset="0"/>
-                            <a:ea typeface="Cambria Math" charset="0"/>
-                            <a:cs typeface="Cambria Math" charset="0"/>
-                          </a:rPr>
-                          <m:t> </m:t>
-                        </m:r>
-                        <m:d>
-                          <m:dPr>
-                            <m:begChr m:val="|"/>
-                            <m:ctrlPr>
-                              <a:rPr lang="en-US" b="0" i="1" smtClean="0">
-                                <a:latin typeface="Cambria Math" charset="0"/>
-                                <a:ea typeface="Cambria Math" charset="0"/>
-                                <a:cs typeface="Cambria Math" charset="0"/>
-                              </a:rPr>
-                            </m:ctrlPr>
-                          </m:dPr>
-                          <m:e>
-                            <m:sSub>
-                              <m:sSubPr>
-                                <m:ctrlPr>
-                                  <a:rPr lang="en-US" b="0" i="1" smtClean="0">
-                                    <a:latin typeface="Cambria Math" charset="0"/>
-                                    <a:ea typeface="Cambria Math" charset="0"/>
-                                    <a:cs typeface="Cambria Math" charset="0"/>
-                                  </a:rPr>
-                                </m:ctrlPr>
-                              </m:sSubPr>
-                              <m:e>
-                                <m:r>
-                                  <a:rPr lang="en-US" b="0" i="1" smtClean="0">
-                                    <a:latin typeface="Cambria Math" charset="0"/>
-                                    <a:ea typeface="Cambria Math" charset="0"/>
-                                    <a:cs typeface="Cambria Math" charset="0"/>
-                                  </a:rPr>
-                                  <m:t> </m:t>
-                                </m:r>
-                                <m:r>
-                                  <a:rPr lang="en-US" b="0" i="1" smtClean="0">
-                                    <a:latin typeface="Cambria Math" charset="0"/>
-                                    <a:ea typeface="Cambria Math" charset="0"/>
-                                    <a:cs typeface="Cambria Math" charset="0"/>
-                                  </a:rPr>
-                                  <m:t>𝑎𝑛𝑠𝑤𝑒𝑟</m:t>
-                                </m:r>
-                              </m:e>
-                              <m:sub>
-                                <m:r>
-                                  <a:rPr lang="en-US" b="0" i="1" smtClean="0">
-                                    <a:latin typeface="Cambria Math" charset="0"/>
-                                    <a:ea typeface="Cambria Math" charset="0"/>
-                                    <a:cs typeface="Cambria Math" charset="0"/>
-                                  </a:rPr>
-                                  <m:t>𝑛</m:t>
-                                </m:r>
-                              </m:sub>
-                            </m:sSub>
-                          </m:e>
-                        </m:d>
-                        <m:r>
-                          <a:rPr lang="mr-IN" i="1" smtClean="0">
-                            <a:latin typeface="Cambria Math" charset="0"/>
-                            <a:ea typeface="Cambria Math" charset="0"/>
-                            <a:cs typeface="Cambria Math" charset="0"/>
-                          </a:rPr>
-                          <m:t>=</m:t>
-                        </m:r>
-                        <m:sSub>
-                          <m:sSubPr>
-                            <m:ctrlPr>
-                              <a:rPr lang="en-US" i="1">
-                                <a:latin typeface="Cambria Math" charset="0"/>
-                                <a:ea typeface="Cambria Math" charset="0"/>
-                                <a:cs typeface="Cambria Math" charset="0"/>
-                              </a:rPr>
-                            </m:ctrlPr>
-                          </m:sSubPr>
-                          <m:e>
-                            <m:r>
-                              <a:rPr lang="en-US" i="1">
-                                <a:latin typeface="Cambria Math" charset="0"/>
-                                <a:ea typeface="Cambria Math" charset="0"/>
-                                <a:cs typeface="Cambria Math" charset="0"/>
-                              </a:rPr>
-                              <m:t>𝑃</m:t>
-                            </m:r>
-                            <m:r>
-                              <a:rPr lang="en-US" i="1">
-                                <a:latin typeface="Cambria Math" charset="0"/>
-                                <a:ea typeface="Cambria Math" charset="0"/>
-                                <a:cs typeface="Cambria Math" charset="0"/>
-                              </a:rPr>
-                              <m:t>(</m:t>
-                            </m:r>
-                            <m:r>
-                              <a:rPr lang="en-US" i="1">
-                                <a:latin typeface="Cambria Math" charset="0"/>
-                                <a:ea typeface="Cambria Math" charset="0"/>
-                                <a:cs typeface="Cambria Math" charset="0"/>
-                              </a:rPr>
-                              <m:t>𝑙𝑒𝑎𝑟𝑛𝑒𝑑</m:t>
-                            </m:r>
-                          </m:e>
-                          <m:sub>
-                            <m:r>
-                              <a:rPr lang="en-US" i="1">
-                                <a:latin typeface="Cambria Math" charset="0"/>
-                                <a:ea typeface="Cambria Math" charset="0"/>
-                                <a:cs typeface="Cambria Math" charset="0"/>
-                              </a:rPr>
-                              <m:t>𝑛</m:t>
-                            </m:r>
-                            <m:r>
-                              <a:rPr lang="en-US" i="1">
-                                <a:latin typeface="Cambria Math" charset="0"/>
-                                <a:ea typeface="Cambria Math" charset="0"/>
-                                <a:cs typeface="Cambria Math" charset="0"/>
-                              </a:rPr>
-                              <m:t>−1</m:t>
-                            </m:r>
-                          </m:sub>
-                        </m:sSub>
-                        <m:r>
-                          <a:rPr lang="en-US" b="0" i="1" smtClean="0">
-                            <a:latin typeface="Cambria Math" charset="0"/>
-                            <a:ea typeface="Cambria Math" charset="0"/>
-                            <a:cs typeface="Cambria Math" charset="0"/>
-                          </a:rPr>
-                          <m:t> </m:t>
-                        </m:r>
-                        <m:d>
-                          <m:dPr>
-                            <m:begChr m:val="|"/>
-                            <m:ctrlPr>
-                              <a:rPr lang="en-US" i="1">
-                                <a:latin typeface="Cambria Math" charset="0"/>
-                                <a:ea typeface="Cambria Math" charset="0"/>
-                                <a:cs typeface="Cambria Math" charset="0"/>
-                              </a:rPr>
-                            </m:ctrlPr>
-                          </m:dPr>
-                          <m:e>
-                            <m:sSub>
-                              <m:sSubPr>
-                                <m:ctrlPr>
-                                  <a:rPr lang="en-US" i="1">
-                                    <a:latin typeface="Cambria Math" charset="0"/>
-                                    <a:ea typeface="Cambria Math" charset="0"/>
-                                    <a:cs typeface="Cambria Math" charset="0"/>
-                                  </a:rPr>
-                                </m:ctrlPr>
-                              </m:sSubPr>
-                              <m:e>
-                                <m:r>
-                                  <a:rPr lang="en-US" b="0" i="1" smtClean="0">
-                                    <a:latin typeface="Cambria Math" charset="0"/>
-                                    <a:ea typeface="Cambria Math" charset="0"/>
-                                    <a:cs typeface="Cambria Math" charset="0"/>
-                                  </a:rPr>
-                                  <m:t> </m:t>
-                                </m:r>
-                                <m:r>
-                                  <a:rPr lang="en-US" b="0" i="1" smtClean="0">
-                                    <a:latin typeface="Cambria Math" charset="0"/>
-                                    <a:ea typeface="Cambria Math" charset="0"/>
-                                    <a:cs typeface="Cambria Math" charset="0"/>
-                                  </a:rPr>
-                                  <m:t>𝑎𝑛𝑠𝑤𝑒𝑟</m:t>
-                                </m:r>
-                              </m:e>
-                              <m:sub>
-                                <m:r>
-                                  <a:rPr lang="en-US" i="1">
-                                    <a:latin typeface="Cambria Math" charset="0"/>
-                                    <a:ea typeface="Cambria Math" charset="0"/>
-                                    <a:cs typeface="Cambria Math" charset="0"/>
-                                  </a:rPr>
-                                  <m:t>𝑛</m:t>
-                                </m:r>
-                              </m:sub>
-                            </m:sSub>
-                          </m:e>
-                        </m:d>
-                        <m:r>
-                          <a:rPr lang="en-US" b="0" i="1" smtClean="0">
-                            <a:latin typeface="Cambria Math" charset="0"/>
-                          </a:rPr>
-                          <m:t>+</m:t>
-                        </m:r>
-                        <m:d>
-                          <m:dPr>
-                            <m:ctrlPr>
-                              <a:rPr lang="en-US" b="0" i="1" smtClean="0">
-                                <a:latin typeface="Cambria Math" charset="0"/>
-                              </a:rPr>
-                            </m:ctrlPr>
-                          </m:dPr>
-                          <m:e>
-                            <m:r>
-                              <a:rPr lang="en-US" b="0" i="1" smtClean="0">
-                                <a:latin typeface="Cambria Math" charset="0"/>
-                              </a:rPr>
-                              <m:t>1−</m:t>
-                            </m:r>
-                            <m:sSub>
-                              <m:sSubPr>
-                                <m:ctrlPr>
-                                  <a:rPr lang="en-US" i="1">
-                                    <a:latin typeface="Cambria Math" charset="0"/>
-                                    <a:ea typeface="Cambria Math" charset="0"/>
-                                    <a:cs typeface="Cambria Math" charset="0"/>
-                                  </a:rPr>
-                                </m:ctrlPr>
-                              </m:sSubPr>
-                              <m:e>
-                                <m:r>
-                                  <a:rPr lang="en-US" i="1">
-                                    <a:latin typeface="Cambria Math" charset="0"/>
-                                    <a:ea typeface="Cambria Math" charset="0"/>
-                                    <a:cs typeface="Cambria Math" charset="0"/>
-                                  </a:rPr>
-                                  <m:t>𝑃</m:t>
-                                </m:r>
-                                <m:r>
-                                  <a:rPr lang="en-US" i="1">
-                                    <a:latin typeface="Cambria Math" charset="0"/>
-                                    <a:ea typeface="Cambria Math" charset="0"/>
-                                    <a:cs typeface="Cambria Math" charset="0"/>
-                                  </a:rPr>
-                                  <m:t>(</m:t>
-                                </m:r>
-                                <m:r>
-                                  <a:rPr lang="en-US" i="1">
-                                    <a:latin typeface="Cambria Math" charset="0"/>
-                                    <a:ea typeface="Cambria Math" charset="0"/>
-                                    <a:cs typeface="Cambria Math" charset="0"/>
-                                  </a:rPr>
-                                  <m:t>𝑙𝑒𝑎𝑟𝑛𝑒𝑑</m:t>
-                                </m:r>
-                              </m:e>
-                              <m:sub>
-                                <m:r>
-                                  <a:rPr lang="en-US" i="1">
-                                    <a:latin typeface="Cambria Math" charset="0"/>
-                                    <a:ea typeface="Cambria Math" charset="0"/>
-                                    <a:cs typeface="Cambria Math" charset="0"/>
-                                  </a:rPr>
-                                  <m:t>𝑛</m:t>
-                                </m:r>
-                                <m:r>
-                                  <a:rPr lang="en-US" i="1">
-                                    <a:latin typeface="Cambria Math" charset="0"/>
-                                    <a:ea typeface="Cambria Math" charset="0"/>
-                                    <a:cs typeface="Cambria Math" charset="0"/>
-                                  </a:rPr>
-                                  <m:t>−1</m:t>
-                                </m:r>
-                              </m:sub>
-                            </m:sSub>
-                            <m:r>
-                              <a:rPr lang="en-US" b="0" i="1" smtClean="0">
-                                <a:latin typeface="Cambria Math" charset="0"/>
-                                <a:ea typeface="Cambria Math" charset="0"/>
-                                <a:cs typeface="Cambria Math" charset="0"/>
-                              </a:rPr>
-                              <m:t> </m:t>
-                            </m:r>
-                            <m:d>
-                              <m:dPr>
-                                <m:begChr m:val="|"/>
-                                <m:ctrlPr>
-                                  <a:rPr lang="en-US" i="1">
-                                    <a:latin typeface="Cambria Math" charset="0"/>
-                                    <a:ea typeface="Cambria Math" charset="0"/>
-                                    <a:cs typeface="Cambria Math" charset="0"/>
-                                  </a:rPr>
-                                </m:ctrlPr>
-                              </m:dPr>
-                              <m:e>
-                                <m:sSub>
-                                  <m:sSubPr>
-                                    <m:ctrlPr>
-                                      <a:rPr lang="en-US" i="1">
-                                        <a:latin typeface="Cambria Math" charset="0"/>
-                                        <a:ea typeface="Cambria Math" charset="0"/>
-                                        <a:cs typeface="Cambria Math" charset="0"/>
-                                      </a:rPr>
-                                    </m:ctrlPr>
-                                  </m:sSubPr>
-                                  <m:e>
-                                    <m:r>
-                                      <a:rPr lang="en-US" b="0" i="1" smtClean="0">
-                                        <a:latin typeface="Cambria Math" charset="0"/>
-                                        <a:ea typeface="Cambria Math" charset="0"/>
-                                        <a:cs typeface="Cambria Math" charset="0"/>
-                                      </a:rPr>
-                                      <m:t> </m:t>
-                                    </m:r>
-                                    <m:r>
-                                      <a:rPr lang="en-US" b="0" i="1" smtClean="0">
-                                        <a:latin typeface="Cambria Math" charset="0"/>
-                                        <a:ea typeface="Cambria Math" charset="0"/>
-                                        <a:cs typeface="Cambria Math" charset="0"/>
-                                      </a:rPr>
-                                      <m:t>𝑎𝑛𝑠𝑤𝑒𝑟</m:t>
-                                    </m:r>
-                                  </m:e>
-                                  <m:sub>
-                                    <m:r>
-                                      <a:rPr lang="en-US" i="1">
-                                        <a:latin typeface="Cambria Math" charset="0"/>
-                                        <a:ea typeface="Cambria Math" charset="0"/>
-                                        <a:cs typeface="Cambria Math" charset="0"/>
-                                      </a:rPr>
-                                      <m:t>𝑛</m:t>
-                                    </m:r>
-                                  </m:sub>
-                                </m:sSub>
-                              </m:e>
-                            </m:d>
-                          </m:e>
-                        </m:d>
-                        <m:r>
-                          <a:rPr lang="en-US" b="0" i="1" smtClean="0">
-                            <a:latin typeface="Cambria Math" charset="0"/>
-                          </a:rPr>
-                          <m:t>∗</m:t>
-                        </m:r>
-                        <m:r>
-                          <a:rPr lang="en-US" b="0" i="1" smtClean="0">
-                            <a:latin typeface="Cambria Math" charset="0"/>
-                          </a:rPr>
-                          <m:t>𝑃</m:t>
-                        </m:r>
-                        <m:d>
-                          <m:dPr>
-                            <m:ctrlPr>
-                              <a:rPr lang="en-US" b="0" i="1" smtClean="0">
-                                <a:latin typeface="Cambria Math" charset="0"/>
-                              </a:rPr>
-                            </m:ctrlPr>
-                          </m:dPr>
-                          <m:e>
-                            <m:r>
-                              <a:rPr lang="en-US" b="0" i="1" smtClean="0">
-                                <a:latin typeface="Cambria Math" charset="0"/>
-                              </a:rPr>
-                              <m:t>𝑤𝑖𝑙𝑙</m:t>
-                            </m:r>
-                            <m:r>
-                              <a:rPr lang="en-US" b="0" i="1" smtClean="0">
-                                <a:latin typeface="Cambria Math" charset="0"/>
-                              </a:rPr>
-                              <m:t> </m:t>
-                            </m:r>
-                            <m:r>
-                              <a:rPr lang="en-US" b="0" i="1" smtClean="0">
-                                <a:latin typeface="Cambria Math" charset="0"/>
-                              </a:rPr>
-                              <m:t>𝑙𝑒𝑎𝑟𝑛</m:t>
-                            </m:r>
-                          </m:e>
-                        </m:d>
-                      </m:oMath>
-                    </m:oMathPara>
-                  </a14:m>
-                  <a:endParaRPr lang="en-US" b="0" dirty="0" smtClean="0"/>
-                </a:p>
-              </p:txBody>
-            </p:sp>
-          </mc:Choice>
-          <mc:Fallback xmlns="">
-            <p:sp>
-              <p:nvSpPr>
-                <p:cNvPr id="6" name="TextBox 5"/>
-                <p:cNvSpPr txBox="1">
-                  <a:spLocks noRot="1" noChangeAspect="1" noMove="1" noResize="1" noEditPoints="1" noAdjustHandles="1" noChangeArrowheads="1" noChangeShapeType="1" noTextEdit="1"/>
-                </p:cNvSpPr>
-                <p:nvPr/>
-              </p:nvSpPr>
-              <p:spPr>
-                <a:xfrm>
-                  <a:off x="1382431" y="3585556"/>
-                  <a:ext cx="10096931" cy="312650"/>
-                </a:xfrm>
-                <a:prstGeom prst="rect">
-                  <a:avLst/>
-                </a:prstGeom>
-                <a:blipFill rotWithShape="0">
-                  <a:blip r:embed="rId5"/>
-                  <a:stretch>
-                    <a:fillRect l="-60" t="-121569" b="-156863"/>
-                  </a:stretch>
-                </a:blipFill>
-              </p:spPr>
-              <p:txBody>
-                <a:bodyPr/>
-                <a:lstStyle/>
-                <a:p>
-                  <a:r>
-                    <a:rPr lang="en-US">
-                      <a:noFill/>
-                    </a:rPr>
-                    <a:t> </a:t>
-                  </a:r>
-                </a:p>
-              </p:txBody>
-            </p:sp>
-          </mc:Fallback>
-        </mc:AlternateContent>
-        <mc:AlternateContent xmlns:mc="http://schemas.openxmlformats.org/markup-compatibility/2006" xmlns:a14="http://schemas.microsoft.com/office/drawing/2010/main">
-          <mc:Choice Requires="a14">
-            <p:sp>
-              <p:nvSpPr>
-                <p:cNvPr id="9" name="TextBox 8"/>
-                <p:cNvSpPr txBox="1"/>
-                <p:nvPr/>
-              </p:nvSpPr>
-              <p:spPr>
-                <a:xfrm>
-                  <a:off x="3759200" y="4097457"/>
-                  <a:ext cx="1280992" cy="276999"/>
-                </a:xfrm>
-                <a:prstGeom prst="rect">
-                  <a:avLst/>
-                </a:prstGeom>
-                <a:noFill/>
-              </p:spPr>
-              <p:txBody>
-                <a:bodyPr wrap="none" lIns="0" tIns="0" rIns="0" bIns="0" rtlCol="0">
-                  <a:spAutoFit/>
-                </a:bodyPr>
-                <a:lstStyle/>
-                <a:p>
-                  <a:pPr/>
-                  <a14:m>
-                    <m:oMathPara xmlns:m="http://schemas.openxmlformats.org/officeDocument/2006/math">
-                      <m:oMathParaPr>
-                        <m:jc m:val="centerGroup"/>
-                      </m:oMathParaPr>
-                      <m:oMath xmlns:m="http://schemas.openxmlformats.org/officeDocument/2006/math">
-                        <m:r>
-                          <a:rPr lang="mr-IN" i="1" smtClean="0">
-                            <a:latin typeface="Cambria Math" charset="0"/>
-                            <a:ea typeface="Cambria Math" charset="0"/>
-                            <a:cs typeface="Cambria Math" charset="0"/>
-                          </a:rPr>
-                          <m:t>=</m:t>
-                        </m:r>
-                        <m:r>
-                          <a:rPr lang="en-US" b="0" i="1" smtClean="0">
-                            <a:latin typeface="Cambria Math" charset="0"/>
-                            <a:ea typeface="Cambria Math" charset="0"/>
-                            <a:cs typeface="Cambria Math" charset="0"/>
-                          </a:rPr>
-                          <m:t>𝑃</m:t>
-                        </m:r>
-                        <m:r>
-                          <a:rPr lang="en-US" b="0" i="1" smtClean="0">
-                            <a:latin typeface="Cambria Math" charset="0"/>
-                            <a:ea typeface="Cambria Math" charset="0"/>
-                            <a:cs typeface="Cambria Math" charset="0"/>
-                          </a:rPr>
-                          <m:t>(</m:t>
-                        </m:r>
-                        <m:sSub>
-                          <m:sSubPr>
-                            <m:ctrlPr>
-                              <a:rPr lang="en-US" b="0" i="1" smtClean="0">
-                                <a:latin typeface="Cambria Math" charset="0"/>
-                                <a:ea typeface="Cambria Math" charset="0"/>
-                                <a:cs typeface="Cambria Math" charset="0"/>
-                              </a:rPr>
-                            </m:ctrlPr>
-                          </m:sSubPr>
-                          <m:e>
-                            <m:r>
-                              <a:rPr lang="en-US" b="0" i="1" smtClean="0">
-                                <a:latin typeface="Cambria Math" charset="0"/>
-                                <a:ea typeface="Cambria Math" charset="0"/>
-                                <a:cs typeface="Cambria Math" charset="0"/>
-                              </a:rPr>
-                              <m:t>𝑘𝑛𝑒𝑤</m:t>
-                            </m:r>
-                          </m:e>
-                          <m:sub>
-                            <m:r>
-                              <a:rPr lang="en-US" b="0" i="1" smtClean="0">
-                                <a:latin typeface="Cambria Math" charset="0"/>
-                                <a:ea typeface="Cambria Math" charset="0"/>
-                                <a:cs typeface="Cambria Math" charset="0"/>
-                              </a:rPr>
-                              <m:t>𝑛</m:t>
-                            </m:r>
-                          </m:sub>
-                        </m:sSub>
-                        <m:r>
-                          <a:rPr lang="en-US" b="0" i="1" smtClean="0">
-                            <a:latin typeface="Cambria Math" charset="0"/>
-                            <a:ea typeface="Cambria Math" charset="0"/>
-                            <a:cs typeface="Cambria Math" charset="0"/>
-                          </a:rPr>
-                          <m:t>)</m:t>
-                        </m:r>
-                      </m:oMath>
-                    </m:oMathPara>
-                  </a14:m>
-                  <a:endParaRPr lang="en-US" dirty="0"/>
-                </a:p>
-              </p:txBody>
-            </p:sp>
-          </mc:Choice>
-          <mc:Fallback xmlns="">
-            <p:sp>
-              <p:nvSpPr>
-                <p:cNvPr id="9" name="TextBox 8"/>
-                <p:cNvSpPr txBox="1">
-                  <a:spLocks noRot="1" noChangeAspect="1" noMove="1" noResize="1" noEditPoints="1" noAdjustHandles="1" noChangeArrowheads="1" noChangeShapeType="1" noTextEdit="1"/>
-                </p:cNvSpPr>
-                <p:nvPr/>
-              </p:nvSpPr>
-              <p:spPr>
-                <a:xfrm>
-                  <a:off x="3759200" y="4097457"/>
-                  <a:ext cx="1280992" cy="276999"/>
-                </a:xfrm>
-                <a:prstGeom prst="rect">
-                  <a:avLst/>
-                </a:prstGeom>
-                <a:blipFill rotWithShape="0">
-                  <a:blip r:embed="rId6"/>
-                  <a:stretch>
-                    <a:fillRect l="-1905" t="-2174" r="-6667" b="-32609"/>
-                  </a:stretch>
-                </a:blipFill>
-              </p:spPr>
-              <p:txBody>
-                <a:bodyPr/>
-                <a:lstStyle/>
-                <a:p>
-                  <a:r>
-                    <a:rPr lang="en-US">
-                      <a:noFill/>
-                    </a:rPr>
-                    <a:t> </a:t>
-                  </a:r>
-                </a:p>
-              </p:txBody>
-            </p:sp>
-          </mc:Fallback>
-        </mc:AlternateContent>
-      </p:grpSp>
+      <mc:AlternateContent xmlns:mc="http://schemas.openxmlformats.org/markup-compatibility/2006" xmlns:a14="http://schemas.microsoft.com/office/drawing/2010/main">
+        <mc:Choice Requires="a14">
+          <p:sp>
+            <p:nvSpPr>
+              <p:cNvPr id="6" name="TextBox 5"/>
+              <p:cNvSpPr txBox="1"/>
+              <p:nvPr/>
+            </p:nvSpPr>
+            <p:spPr>
+              <a:xfrm>
+                <a:off x="1382431" y="3585556"/>
+                <a:ext cx="10096931" cy="312650"/>
+              </a:xfrm>
+              <a:prstGeom prst="rect">
+                <a:avLst/>
+              </a:prstGeom>
+              <a:noFill/>
+            </p:spPr>
+            <p:txBody>
+              <a:bodyPr wrap="none" lIns="0" tIns="0" rIns="0" bIns="0" rtlCol="0">
+                <a:spAutoFit/>
+              </a:bodyPr>
+              <a:lstStyle/>
+              <a:p>
+                <a:pPr/>
+                <a14:m>
+                  <m:oMathPara xmlns:m="http://schemas.openxmlformats.org/officeDocument/2006/math">
+                    <m:oMathParaPr>
+                      <m:jc m:val="centerGroup"/>
+                    </m:oMathParaPr>
+                    <m:oMath xmlns:m="http://schemas.openxmlformats.org/officeDocument/2006/math">
+                      <m:sSub>
+                        <m:sSubPr>
+                          <m:ctrlPr>
+                            <a:rPr lang="en-US" b="0" i="1" smtClean="0">
+                              <a:latin typeface="Cambria Math" charset="0"/>
+                              <a:ea typeface="Cambria Math" charset="0"/>
+                              <a:cs typeface="Cambria Math" charset="0"/>
+                            </a:rPr>
+                          </m:ctrlPr>
+                        </m:sSubPr>
+                        <m:e>
+                          <m:r>
+                            <a:rPr lang="en-US" b="0" i="1" smtClean="0">
+                              <a:latin typeface="Cambria Math" charset="0"/>
+                              <a:ea typeface="Cambria Math" charset="0"/>
+                              <a:cs typeface="Cambria Math" charset="0"/>
+                            </a:rPr>
+                            <m:t>𝑃</m:t>
+                          </m:r>
+                          <m:r>
+                            <a:rPr lang="en-US" b="0" i="1" smtClean="0">
+                              <a:latin typeface="Cambria Math" charset="0"/>
+                              <a:ea typeface="Cambria Math" charset="0"/>
+                              <a:cs typeface="Cambria Math" charset="0"/>
+                            </a:rPr>
+                            <m:t>(</m:t>
+                          </m:r>
+                          <m:r>
+                            <a:rPr lang="en-US" b="0" i="1" smtClean="0">
+                              <a:latin typeface="Cambria Math" charset="0"/>
+                              <a:ea typeface="Cambria Math" charset="0"/>
+                              <a:cs typeface="Cambria Math" charset="0"/>
+                            </a:rPr>
+                            <m:t>𝑙𝑒𝑎𝑟𝑛𝑒𝑑</m:t>
+                          </m:r>
+                        </m:e>
+                        <m:sub>
+                          <m:r>
+                            <a:rPr lang="en-US" b="0" i="1" smtClean="0">
+                              <a:latin typeface="Cambria Math" charset="0"/>
+                              <a:ea typeface="Cambria Math" charset="0"/>
+                              <a:cs typeface="Cambria Math" charset="0"/>
+                            </a:rPr>
+                            <m:t>𝑛</m:t>
+                          </m:r>
+                        </m:sub>
+                      </m:sSub>
+                      <m:r>
+                        <a:rPr lang="en-US" b="0" i="1" smtClean="0">
+                          <a:latin typeface="Cambria Math" charset="0"/>
+                          <a:ea typeface="Cambria Math" charset="0"/>
+                          <a:cs typeface="Cambria Math" charset="0"/>
+                        </a:rPr>
+                        <m:t> </m:t>
+                      </m:r>
+                      <m:d>
+                        <m:dPr>
+                          <m:begChr m:val="|"/>
+                          <m:ctrlPr>
+                            <a:rPr lang="en-US" b="0" i="1" smtClean="0">
+                              <a:latin typeface="Cambria Math" charset="0"/>
+                              <a:ea typeface="Cambria Math" charset="0"/>
+                              <a:cs typeface="Cambria Math" charset="0"/>
+                            </a:rPr>
+                          </m:ctrlPr>
+                        </m:dPr>
+                        <m:e>
+                          <m:sSub>
+                            <m:sSubPr>
+                              <m:ctrlPr>
+                                <a:rPr lang="en-US" b="0" i="1" smtClean="0">
+                                  <a:latin typeface="Cambria Math" charset="0"/>
+                                  <a:ea typeface="Cambria Math" charset="0"/>
+                                  <a:cs typeface="Cambria Math" charset="0"/>
+                                </a:rPr>
+                              </m:ctrlPr>
+                            </m:sSubPr>
+                            <m:e>
+                              <m:r>
+                                <a:rPr lang="en-US" b="0" i="1" smtClean="0">
+                                  <a:latin typeface="Cambria Math" charset="0"/>
+                                  <a:ea typeface="Cambria Math" charset="0"/>
+                                  <a:cs typeface="Cambria Math" charset="0"/>
+                                </a:rPr>
+                                <m:t> </m:t>
+                              </m:r>
+                              <m:r>
+                                <a:rPr lang="en-US" b="0" i="1" smtClean="0">
+                                  <a:latin typeface="Cambria Math" charset="0"/>
+                                  <a:ea typeface="Cambria Math" charset="0"/>
+                                  <a:cs typeface="Cambria Math" charset="0"/>
+                                </a:rPr>
+                                <m:t>𝑎𝑛𝑠𝑤𝑒𝑟</m:t>
+                              </m:r>
+                            </m:e>
+                            <m:sub>
+                              <m:r>
+                                <a:rPr lang="en-US" b="0" i="1" smtClean="0">
+                                  <a:latin typeface="Cambria Math" charset="0"/>
+                                  <a:ea typeface="Cambria Math" charset="0"/>
+                                  <a:cs typeface="Cambria Math" charset="0"/>
+                                </a:rPr>
+                                <m:t>𝑛</m:t>
+                              </m:r>
+                            </m:sub>
+                          </m:sSub>
+                        </m:e>
+                      </m:d>
+                      <m:r>
+                        <a:rPr lang="mr-IN" i="1" smtClean="0">
+                          <a:latin typeface="Cambria Math" charset="0"/>
+                          <a:ea typeface="Cambria Math" charset="0"/>
+                          <a:cs typeface="Cambria Math" charset="0"/>
+                        </a:rPr>
+                        <m:t>=</m:t>
+                      </m:r>
+                      <m:sSub>
+                        <m:sSubPr>
+                          <m:ctrlPr>
+                            <a:rPr lang="en-US" i="1">
+                              <a:latin typeface="Cambria Math" charset="0"/>
+                              <a:ea typeface="Cambria Math" charset="0"/>
+                              <a:cs typeface="Cambria Math" charset="0"/>
+                            </a:rPr>
+                          </m:ctrlPr>
+                        </m:sSubPr>
+                        <m:e>
+                          <m:r>
+                            <a:rPr lang="en-US" i="1">
+                              <a:latin typeface="Cambria Math" charset="0"/>
+                              <a:ea typeface="Cambria Math" charset="0"/>
+                              <a:cs typeface="Cambria Math" charset="0"/>
+                            </a:rPr>
+                            <m:t>𝑃</m:t>
+                          </m:r>
+                          <m:r>
+                            <a:rPr lang="en-US" i="1">
+                              <a:latin typeface="Cambria Math" charset="0"/>
+                              <a:ea typeface="Cambria Math" charset="0"/>
+                              <a:cs typeface="Cambria Math" charset="0"/>
+                            </a:rPr>
+                            <m:t>(</m:t>
+                          </m:r>
+                          <m:r>
+                            <a:rPr lang="en-US" i="1">
+                              <a:latin typeface="Cambria Math" charset="0"/>
+                              <a:ea typeface="Cambria Math" charset="0"/>
+                              <a:cs typeface="Cambria Math" charset="0"/>
+                            </a:rPr>
+                            <m:t>𝑙𝑒𝑎𝑟𝑛𝑒𝑑</m:t>
+                          </m:r>
+                        </m:e>
+                        <m:sub>
+                          <m:r>
+                            <a:rPr lang="en-US" i="1">
+                              <a:latin typeface="Cambria Math" charset="0"/>
+                              <a:ea typeface="Cambria Math" charset="0"/>
+                              <a:cs typeface="Cambria Math" charset="0"/>
+                            </a:rPr>
+                            <m:t>𝑛</m:t>
+                          </m:r>
+                          <m:r>
+                            <a:rPr lang="en-US" i="1">
+                              <a:latin typeface="Cambria Math" charset="0"/>
+                              <a:ea typeface="Cambria Math" charset="0"/>
+                              <a:cs typeface="Cambria Math" charset="0"/>
+                            </a:rPr>
+                            <m:t>−1</m:t>
+                          </m:r>
+                        </m:sub>
+                      </m:sSub>
+                      <m:r>
+                        <a:rPr lang="en-US" b="0" i="1" smtClean="0">
+                          <a:latin typeface="Cambria Math" charset="0"/>
+                          <a:ea typeface="Cambria Math" charset="0"/>
+                          <a:cs typeface="Cambria Math" charset="0"/>
+                        </a:rPr>
+                        <m:t> </m:t>
+                      </m:r>
+                      <m:d>
+                        <m:dPr>
+                          <m:begChr m:val="|"/>
+                          <m:ctrlPr>
+                            <a:rPr lang="en-US" i="1">
+                              <a:latin typeface="Cambria Math" charset="0"/>
+                              <a:ea typeface="Cambria Math" charset="0"/>
+                              <a:cs typeface="Cambria Math" charset="0"/>
+                            </a:rPr>
+                          </m:ctrlPr>
+                        </m:dPr>
+                        <m:e>
+                          <m:sSub>
+                            <m:sSubPr>
+                              <m:ctrlPr>
+                                <a:rPr lang="en-US" i="1">
+                                  <a:latin typeface="Cambria Math" charset="0"/>
+                                  <a:ea typeface="Cambria Math" charset="0"/>
+                                  <a:cs typeface="Cambria Math" charset="0"/>
+                                </a:rPr>
+                              </m:ctrlPr>
+                            </m:sSubPr>
+                            <m:e>
+                              <m:r>
+                                <a:rPr lang="en-US" b="0" i="1" smtClean="0">
+                                  <a:latin typeface="Cambria Math" charset="0"/>
+                                  <a:ea typeface="Cambria Math" charset="0"/>
+                                  <a:cs typeface="Cambria Math" charset="0"/>
+                                </a:rPr>
+                                <m:t> </m:t>
+                              </m:r>
+                              <m:r>
+                                <a:rPr lang="en-US" b="0" i="1" smtClean="0">
+                                  <a:latin typeface="Cambria Math" charset="0"/>
+                                  <a:ea typeface="Cambria Math" charset="0"/>
+                                  <a:cs typeface="Cambria Math" charset="0"/>
+                                </a:rPr>
+                                <m:t>𝑎𝑛𝑠𝑤𝑒𝑟</m:t>
+                              </m:r>
+                            </m:e>
+                            <m:sub>
+                              <m:r>
+                                <a:rPr lang="en-US" i="1">
+                                  <a:latin typeface="Cambria Math" charset="0"/>
+                                  <a:ea typeface="Cambria Math" charset="0"/>
+                                  <a:cs typeface="Cambria Math" charset="0"/>
+                                </a:rPr>
+                                <m:t>𝑛</m:t>
+                              </m:r>
+                            </m:sub>
+                          </m:sSub>
+                        </m:e>
+                      </m:d>
+                      <m:r>
+                        <a:rPr lang="en-US" b="0" i="1" smtClean="0">
+                          <a:latin typeface="Cambria Math" charset="0"/>
+                        </a:rPr>
+                        <m:t>+</m:t>
+                      </m:r>
+                      <m:d>
+                        <m:dPr>
+                          <m:ctrlPr>
+                            <a:rPr lang="en-US" b="0" i="1" smtClean="0">
+                              <a:latin typeface="Cambria Math" charset="0"/>
+                            </a:rPr>
+                          </m:ctrlPr>
+                        </m:dPr>
+                        <m:e>
+                          <m:r>
+                            <a:rPr lang="en-US" b="0" i="1" smtClean="0">
+                              <a:latin typeface="Cambria Math" charset="0"/>
+                            </a:rPr>
+                            <m:t>1−</m:t>
+                          </m:r>
+                          <m:sSub>
+                            <m:sSubPr>
+                              <m:ctrlPr>
+                                <a:rPr lang="en-US" i="1">
+                                  <a:latin typeface="Cambria Math" charset="0"/>
+                                  <a:ea typeface="Cambria Math" charset="0"/>
+                                  <a:cs typeface="Cambria Math" charset="0"/>
+                                </a:rPr>
+                              </m:ctrlPr>
+                            </m:sSubPr>
+                            <m:e>
+                              <m:r>
+                                <a:rPr lang="en-US" i="1">
+                                  <a:latin typeface="Cambria Math" charset="0"/>
+                                  <a:ea typeface="Cambria Math" charset="0"/>
+                                  <a:cs typeface="Cambria Math" charset="0"/>
+                                </a:rPr>
+                                <m:t>𝑃</m:t>
+                              </m:r>
+                              <m:r>
+                                <a:rPr lang="en-US" i="1">
+                                  <a:latin typeface="Cambria Math" charset="0"/>
+                                  <a:ea typeface="Cambria Math" charset="0"/>
+                                  <a:cs typeface="Cambria Math" charset="0"/>
+                                </a:rPr>
+                                <m:t>(</m:t>
+                              </m:r>
+                              <m:r>
+                                <a:rPr lang="en-US" i="1">
+                                  <a:latin typeface="Cambria Math" charset="0"/>
+                                  <a:ea typeface="Cambria Math" charset="0"/>
+                                  <a:cs typeface="Cambria Math" charset="0"/>
+                                </a:rPr>
+                                <m:t>𝑙𝑒𝑎𝑟𝑛𝑒𝑑</m:t>
+                              </m:r>
+                            </m:e>
+                            <m:sub>
+                              <m:r>
+                                <a:rPr lang="en-US" i="1">
+                                  <a:latin typeface="Cambria Math" charset="0"/>
+                                  <a:ea typeface="Cambria Math" charset="0"/>
+                                  <a:cs typeface="Cambria Math" charset="0"/>
+                                </a:rPr>
+                                <m:t>𝑛</m:t>
+                              </m:r>
+                              <m:r>
+                                <a:rPr lang="en-US" i="1">
+                                  <a:latin typeface="Cambria Math" charset="0"/>
+                                  <a:ea typeface="Cambria Math" charset="0"/>
+                                  <a:cs typeface="Cambria Math" charset="0"/>
+                                </a:rPr>
+                                <m:t>−1</m:t>
+                              </m:r>
+                            </m:sub>
+                          </m:sSub>
+                          <m:r>
+                            <a:rPr lang="en-US" b="0" i="1" smtClean="0">
+                              <a:latin typeface="Cambria Math" charset="0"/>
+                              <a:ea typeface="Cambria Math" charset="0"/>
+                              <a:cs typeface="Cambria Math" charset="0"/>
+                            </a:rPr>
+                            <m:t> </m:t>
+                          </m:r>
+                          <m:d>
+                            <m:dPr>
+                              <m:begChr m:val="|"/>
+                              <m:ctrlPr>
+                                <a:rPr lang="en-US" i="1">
+                                  <a:latin typeface="Cambria Math" charset="0"/>
+                                  <a:ea typeface="Cambria Math" charset="0"/>
+                                  <a:cs typeface="Cambria Math" charset="0"/>
+                                </a:rPr>
+                              </m:ctrlPr>
+                            </m:dPr>
+                            <m:e>
+                              <m:sSub>
+                                <m:sSubPr>
+                                  <m:ctrlPr>
+                                    <a:rPr lang="en-US" i="1">
+                                      <a:latin typeface="Cambria Math" charset="0"/>
+                                      <a:ea typeface="Cambria Math" charset="0"/>
+                                      <a:cs typeface="Cambria Math" charset="0"/>
+                                    </a:rPr>
+                                  </m:ctrlPr>
+                                </m:sSubPr>
+                                <m:e>
+                                  <m:r>
+                                    <a:rPr lang="en-US" b="0" i="1" smtClean="0">
+                                      <a:latin typeface="Cambria Math" charset="0"/>
+                                      <a:ea typeface="Cambria Math" charset="0"/>
+                                      <a:cs typeface="Cambria Math" charset="0"/>
+                                    </a:rPr>
+                                    <m:t> </m:t>
+                                  </m:r>
+                                  <m:r>
+                                    <a:rPr lang="en-US" b="0" i="1" smtClean="0">
+                                      <a:latin typeface="Cambria Math" charset="0"/>
+                                      <a:ea typeface="Cambria Math" charset="0"/>
+                                      <a:cs typeface="Cambria Math" charset="0"/>
+                                    </a:rPr>
+                                    <m:t>𝑎𝑛𝑠𝑤𝑒𝑟</m:t>
+                                  </m:r>
+                                </m:e>
+                                <m:sub>
+                                  <m:r>
+                                    <a:rPr lang="en-US" i="1">
+                                      <a:latin typeface="Cambria Math" charset="0"/>
+                                      <a:ea typeface="Cambria Math" charset="0"/>
+                                      <a:cs typeface="Cambria Math" charset="0"/>
+                                    </a:rPr>
+                                    <m:t>𝑛</m:t>
+                                  </m:r>
+                                </m:sub>
+                              </m:sSub>
+                            </m:e>
+                          </m:d>
+                        </m:e>
+                      </m:d>
+                      <m:r>
+                        <a:rPr lang="en-US" b="0" i="1" smtClean="0">
+                          <a:latin typeface="Cambria Math" charset="0"/>
+                        </a:rPr>
+                        <m:t>∗</m:t>
+                      </m:r>
+                      <m:r>
+                        <a:rPr lang="en-US" b="0" i="1" smtClean="0">
+                          <a:latin typeface="Cambria Math" charset="0"/>
+                        </a:rPr>
+                        <m:t>𝑃</m:t>
+                      </m:r>
+                      <m:d>
+                        <m:dPr>
+                          <m:ctrlPr>
+                            <a:rPr lang="en-US" b="0" i="1" smtClean="0">
+                              <a:latin typeface="Cambria Math" charset="0"/>
+                            </a:rPr>
+                          </m:ctrlPr>
+                        </m:dPr>
+                        <m:e>
+                          <m:r>
+                            <a:rPr lang="en-US" b="0" i="1" smtClean="0">
+                              <a:latin typeface="Cambria Math" charset="0"/>
+                            </a:rPr>
+                            <m:t>𝑤𝑖𝑙𝑙</m:t>
+                          </m:r>
+                          <m:r>
+                            <a:rPr lang="en-US" b="0" i="1" smtClean="0">
+                              <a:latin typeface="Cambria Math" charset="0"/>
+                            </a:rPr>
+                            <m:t> </m:t>
+                          </m:r>
+                          <m:r>
+                            <a:rPr lang="en-US" b="0" i="1" smtClean="0">
+                              <a:latin typeface="Cambria Math" charset="0"/>
+                            </a:rPr>
+                            <m:t>𝑙𝑒𝑎𝑟𝑛</m:t>
+                          </m:r>
+                        </m:e>
+                      </m:d>
+                    </m:oMath>
+                  </m:oMathPara>
+                </a14:m>
+                <a:endParaRPr lang="en-US" b="0" dirty="0" smtClean="0"/>
+              </a:p>
+            </p:txBody>
+          </p:sp>
+        </mc:Choice>
+        <mc:Fallback xmlns="">
+          <p:sp>
+            <p:nvSpPr>
+              <p:cNvPr id="6" name="TextBox 5"/>
+              <p:cNvSpPr txBox="1">
+                <a:spLocks noRot="1" noChangeAspect="1" noMove="1" noResize="1" noEditPoints="1" noAdjustHandles="1" noChangeArrowheads="1" noChangeShapeType="1" noTextEdit="1"/>
+              </p:cNvSpPr>
+              <p:nvPr/>
+            </p:nvSpPr>
+            <p:spPr>
+              <a:xfrm>
+                <a:off x="1382431" y="3585556"/>
+                <a:ext cx="10096931" cy="312650"/>
+              </a:xfrm>
+              <a:prstGeom prst="rect">
+                <a:avLst/>
+              </a:prstGeom>
+              <a:blipFill rotWithShape="0">
+                <a:blip r:embed="rId5"/>
+                <a:stretch>
+                  <a:fillRect l="-60" t="-121569" b="-156863"/>
+                </a:stretch>
+              </a:blipFill>
+            </p:spPr>
+            <p:txBody>
+              <a:bodyPr/>
+              <a:lstStyle/>
+              <a:p>
+                <a:r>
+                  <a:rPr lang="en-US">
+                    <a:noFill/>
+                  </a:rPr>
+                  <a:t> </a:t>
+                </a:r>
+              </a:p>
+            </p:txBody>
+          </p:sp>
+        </mc:Fallback>
+      </mc:AlternateContent>
     </p:spTree>
     <p:extLst>
       <p:ext uri="{BB962C8B-B14F-4D97-AF65-F5344CB8AC3E}">

</xml_diff>

<commit_message>
Adding mini balloons... fix formatting later
</commit_message>
<xml_diff>
--- a/images/images.pptx
+++ b/images/images.pptx
@@ -5,12 +5,13 @@
     <p:sldMasterId id="2147483648" r:id="rId1"/>
   </p:sldMasterIdLst>
   <p:notesMasterIdLst>
-    <p:notesMasterId r:id="rId5"/>
+    <p:notesMasterId r:id="rId6"/>
   </p:notesMasterIdLst>
   <p:sldIdLst>
     <p:sldId id="256" r:id="rId2"/>
-    <p:sldId id="257" r:id="rId3"/>
-    <p:sldId id="258" r:id="rId4"/>
+    <p:sldId id="259" r:id="rId3"/>
+    <p:sldId id="257" r:id="rId4"/>
+    <p:sldId id="258" r:id="rId5"/>
   </p:sldIdLst>
   <p:sldSz cx="12192000" cy="6858000"/>
   <p:notesSz cx="6858000" cy="9144000"/>
@@ -532,7 +533,7 @@
           <a:p>
             <a:fld id="{8BBAF27D-DF97-D04C-B9CE-CDB00DECCB36}" type="slidenum">
               <a:rPr lang="en-US" smtClean="0"/>
-              <a:t>3</a:t>
+              <a:t>4</a:t>
             </a:fld>
             <a:endParaRPr lang="en-US"/>
           </a:p>
@@ -4532,6 +4533,1855 @@
 </file>
 
 <file path=ppt/slides/slide2.xml><?xml version="1.0" encoding="utf-8"?>
+<p:sld xmlns:a="http://schemas.openxmlformats.org/drawingml/2006/main" xmlns:r="http://schemas.openxmlformats.org/officeDocument/2006/relationships" xmlns:p="http://schemas.openxmlformats.org/presentationml/2006/main">
+  <p:cSld>
+    <p:spTree>
+      <p:nvGrpSpPr>
+        <p:cNvPr id="1" name=""/>
+        <p:cNvGrpSpPr/>
+        <p:nvPr/>
+      </p:nvGrpSpPr>
+      <p:grpSpPr>
+        <a:xfrm>
+          <a:off x="0" y="0"/>
+          <a:ext cx="0" cy="0"/>
+          <a:chOff x="0" y="0"/>
+          <a:chExt cx="0" cy="0"/>
+        </a:xfrm>
+      </p:grpSpPr>
+      <p:grpSp>
+        <p:nvGrpSpPr>
+          <p:cNvPr id="15" name="Group 14"/>
+          <p:cNvGrpSpPr/>
+          <p:nvPr/>
+        </p:nvGrpSpPr>
+        <p:grpSpPr>
+          <a:xfrm>
+            <a:off x="2824122" y="639272"/>
+            <a:ext cx="3657600" cy="3657600"/>
+            <a:chOff x="2824122" y="639272"/>
+            <a:chExt cx="3657600" cy="3657600"/>
+          </a:xfrm>
+        </p:grpSpPr>
+        <p:grpSp>
+          <p:nvGrpSpPr>
+            <p:cNvPr id="4" name="Group 3"/>
+            <p:cNvGrpSpPr/>
+            <p:nvPr/>
+          </p:nvGrpSpPr>
+          <p:grpSpPr>
+            <a:xfrm>
+              <a:off x="3630644" y="998866"/>
+              <a:ext cx="2044557" cy="2938413"/>
+              <a:chOff x="3708971" y="1479476"/>
+              <a:chExt cx="2044557" cy="2938413"/>
+            </a:xfrm>
+            <a:solidFill>
+              <a:schemeClr val="accent2">
+                <a:lumMod val="40000"/>
+                <a:lumOff val="60000"/>
+              </a:schemeClr>
+            </a:solidFill>
+          </p:grpSpPr>
+          <p:sp>
+            <p:nvSpPr>
+              <p:cNvPr id="5" name="Trapezoid 4"/>
+              <p:cNvSpPr/>
+              <p:nvPr/>
+            </p:nvSpPr>
+            <p:spPr>
+              <a:xfrm flipV="1">
+                <a:off x="4376788" y="3883632"/>
+                <a:ext cx="708917" cy="534257"/>
+              </a:xfrm>
+              <a:prstGeom prst="trapezoid">
+                <a:avLst/>
+              </a:prstGeom>
+              <a:grpFill/>
+              <a:ln>
+                <a:noFill/>
+              </a:ln>
+            </p:spPr>
+            <p:style>
+              <a:lnRef idx="2">
+                <a:schemeClr val="accent1">
+                  <a:shade val="50000"/>
+                </a:schemeClr>
+              </a:lnRef>
+              <a:fillRef idx="1">
+                <a:schemeClr val="accent1"/>
+              </a:fillRef>
+              <a:effectRef idx="0">
+                <a:schemeClr val="accent1"/>
+              </a:effectRef>
+              <a:fontRef idx="minor">
+                <a:schemeClr val="lt1"/>
+              </a:fontRef>
+            </p:style>
+            <p:txBody>
+              <a:bodyPr rtlCol="0" anchor="ctr"/>
+              <a:lstStyle/>
+              <a:p>
+                <a:pPr algn="ctr"/>
+                <a:endParaRPr lang="en-US"/>
+              </a:p>
+            </p:txBody>
+          </p:sp>
+          <p:cxnSp>
+            <p:nvCxnSpPr>
+              <p:cNvPr id="6" name="Straight Connector 5"/>
+              <p:cNvCxnSpPr/>
+              <p:nvPr/>
+            </p:nvCxnSpPr>
+            <p:spPr>
+              <a:xfrm>
+                <a:off x="4376788" y="3493213"/>
+                <a:ext cx="134741" cy="431515"/>
+              </a:xfrm>
+              <a:prstGeom prst="line">
+                <a:avLst/>
+              </a:prstGeom>
+              <a:grpFill/>
+              <a:ln w="38100">
+                <a:solidFill>
+                  <a:schemeClr val="accent2">
+                    <a:lumMod val="40000"/>
+                    <a:lumOff val="60000"/>
+                  </a:schemeClr>
+                </a:solidFill>
+              </a:ln>
+            </p:spPr>
+            <p:style>
+              <a:lnRef idx="1">
+                <a:schemeClr val="accent1"/>
+              </a:lnRef>
+              <a:fillRef idx="0">
+                <a:schemeClr val="accent1"/>
+              </a:fillRef>
+              <a:effectRef idx="0">
+                <a:schemeClr val="accent1"/>
+              </a:effectRef>
+              <a:fontRef idx="minor">
+                <a:schemeClr val="tx1"/>
+              </a:fontRef>
+            </p:style>
+          </p:cxnSp>
+          <p:cxnSp>
+            <p:nvCxnSpPr>
+              <p:cNvPr id="7" name="Straight Connector 6"/>
+              <p:cNvCxnSpPr/>
+              <p:nvPr/>
+            </p:nvCxnSpPr>
+            <p:spPr>
+              <a:xfrm flipH="1">
+                <a:off x="4926244" y="3493213"/>
+                <a:ext cx="134741" cy="431515"/>
+              </a:xfrm>
+              <a:prstGeom prst="line">
+                <a:avLst/>
+              </a:prstGeom>
+              <a:grpFill/>
+              <a:ln w="38100">
+                <a:solidFill>
+                  <a:schemeClr val="accent2">
+                    <a:lumMod val="40000"/>
+                    <a:lumOff val="60000"/>
+                  </a:schemeClr>
+                </a:solidFill>
+              </a:ln>
+            </p:spPr>
+            <p:style>
+              <a:lnRef idx="1">
+                <a:schemeClr val="accent1"/>
+              </a:lnRef>
+              <a:fillRef idx="0">
+                <a:schemeClr val="accent1"/>
+              </a:fillRef>
+              <a:effectRef idx="0">
+                <a:schemeClr val="accent1"/>
+              </a:effectRef>
+              <a:fontRef idx="minor">
+                <a:schemeClr val="tx1"/>
+              </a:fontRef>
+            </p:style>
+          </p:cxnSp>
+          <p:grpSp>
+            <p:nvGrpSpPr>
+              <p:cNvPr id="8" name="Group 7"/>
+              <p:cNvGrpSpPr/>
+              <p:nvPr/>
+            </p:nvGrpSpPr>
+            <p:grpSpPr>
+              <a:xfrm>
+                <a:off x="3708971" y="1479476"/>
+                <a:ext cx="2044557" cy="2137027"/>
+                <a:chOff x="3708971" y="1479476"/>
+                <a:chExt cx="2044557" cy="2137027"/>
+              </a:xfrm>
+              <a:grpFill/>
+            </p:grpSpPr>
+            <p:sp>
+              <p:nvSpPr>
+                <p:cNvPr id="9" name="Oval 8"/>
+                <p:cNvSpPr/>
+                <p:nvPr/>
+              </p:nvSpPr>
+              <p:spPr>
+                <a:xfrm>
+                  <a:off x="3708971" y="1479478"/>
+                  <a:ext cx="2044557" cy="2137025"/>
+                </a:xfrm>
+                <a:prstGeom prst="ellipse">
+                  <a:avLst/>
+                </a:prstGeom>
+                <a:grpFill/>
+                <a:ln>
+                  <a:noFill/>
+                </a:ln>
+              </p:spPr>
+              <p:style>
+                <a:lnRef idx="2">
+                  <a:schemeClr val="accent1">
+                    <a:shade val="50000"/>
+                  </a:schemeClr>
+                </a:lnRef>
+                <a:fillRef idx="1">
+                  <a:schemeClr val="accent1"/>
+                </a:fillRef>
+                <a:effectRef idx="0">
+                  <a:schemeClr val="accent1"/>
+                </a:effectRef>
+                <a:fontRef idx="minor">
+                  <a:schemeClr val="lt1"/>
+                </a:fontRef>
+              </p:style>
+              <p:txBody>
+                <a:bodyPr rtlCol="0" anchor="ctr"/>
+                <a:lstStyle/>
+                <a:p>
+                  <a:pPr algn="ctr"/>
+                  <a:endParaRPr lang="en-US"/>
+                </a:p>
+              </p:txBody>
+            </p:sp>
+            <p:sp>
+              <p:nvSpPr>
+                <p:cNvPr id="10" name="Oval 9"/>
+                <p:cNvSpPr/>
+                <p:nvPr/>
+              </p:nvSpPr>
+              <p:spPr>
+                <a:xfrm>
+                  <a:off x="3929008" y="1479477"/>
+                  <a:ext cx="1604481" cy="2137025"/>
+                </a:xfrm>
+                <a:prstGeom prst="ellipse">
+                  <a:avLst/>
+                </a:prstGeom>
+                <a:solidFill>
+                  <a:srgbClr val="FFFFFF">
+                    <a:alpha val="69804"/>
+                  </a:srgbClr>
+                </a:solidFill>
+                <a:ln>
+                  <a:noFill/>
+                </a:ln>
+              </p:spPr>
+              <p:style>
+                <a:lnRef idx="2">
+                  <a:schemeClr val="accent1">
+                    <a:shade val="50000"/>
+                  </a:schemeClr>
+                </a:lnRef>
+                <a:fillRef idx="1">
+                  <a:schemeClr val="accent1"/>
+                </a:fillRef>
+                <a:effectRef idx="0">
+                  <a:schemeClr val="accent1"/>
+                </a:effectRef>
+                <a:fontRef idx="minor">
+                  <a:schemeClr val="lt1"/>
+                </a:fontRef>
+              </p:style>
+              <p:txBody>
+                <a:bodyPr rtlCol="0" anchor="ctr"/>
+                <a:lstStyle/>
+                <a:p>
+                  <a:pPr algn="ctr"/>
+                  <a:endParaRPr lang="en-US"/>
+                </a:p>
+              </p:txBody>
+            </p:sp>
+            <p:sp>
+              <p:nvSpPr>
+                <p:cNvPr id="11" name="Oval 10"/>
+                <p:cNvSpPr/>
+                <p:nvPr/>
+              </p:nvSpPr>
+              <p:spPr>
+                <a:xfrm>
+                  <a:off x="4218824" y="1479476"/>
+                  <a:ext cx="1024848" cy="2137025"/>
+                </a:xfrm>
+                <a:prstGeom prst="ellipse">
+                  <a:avLst/>
+                </a:prstGeom>
+                <a:grpFill/>
+                <a:ln>
+                  <a:noFill/>
+                </a:ln>
+              </p:spPr>
+              <p:style>
+                <a:lnRef idx="2">
+                  <a:schemeClr val="accent1">
+                    <a:shade val="50000"/>
+                  </a:schemeClr>
+                </a:lnRef>
+                <a:fillRef idx="1">
+                  <a:schemeClr val="accent1"/>
+                </a:fillRef>
+                <a:effectRef idx="0">
+                  <a:schemeClr val="accent1"/>
+                </a:effectRef>
+                <a:fontRef idx="minor">
+                  <a:schemeClr val="lt1"/>
+                </a:fontRef>
+              </p:style>
+              <p:txBody>
+                <a:bodyPr rtlCol="0" anchor="ctr"/>
+                <a:lstStyle/>
+                <a:p>
+                  <a:pPr algn="ctr"/>
+                  <a:endParaRPr lang="en-US" dirty="0"/>
+                </a:p>
+              </p:txBody>
+            </p:sp>
+            <p:sp>
+              <p:nvSpPr>
+                <p:cNvPr id="12" name="Oval 11"/>
+                <p:cNvSpPr/>
+                <p:nvPr/>
+              </p:nvSpPr>
+              <p:spPr>
+                <a:xfrm>
+                  <a:off x="4511529" y="1479476"/>
+                  <a:ext cx="439437" cy="2137025"/>
+                </a:xfrm>
+                <a:prstGeom prst="ellipse">
+                  <a:avLst/>
+                </a:prstGeom>
+                <a:solidFill>
+                  <a:srgbClr val="FFFFFF">
+                    <a:alpha val="69804"/>
+                  </a:srgbClr>
+                </a:solidFill>
+                <a:ln>
+                  <a:noFill/>
+                </a:ln>
+              </p:spPr>
+              <p:style>
+                <a:lnRef idx="2">
+                  <a:schemeClr val="accent1">
+                    <a:shade val="50000"/>
+                  </a:schemeClr>
+                </a:lnRef>
+                <a:fillRef idx="1">
+                  <a:schemeClr val="accent1"/>
+                </a:fillRef>
+                <a:effectRef idx="0">
+                  <a:schemeClr val="accent1"/>
+                </a:effectRef>
+                <a:fontRef idx="minor">
+                  <a:schemeClr val="lt1"/>
+                </a:fontRef>
+              </p:style>
+              <p:txBody>
+                <a:bodyPr rtlCol="0" anchor="ctr"/>
+                <a:lstStyle/>
+                <a:p>
+                  <a:pPr algn="ctr"/>
+                  <a:endParaRPr lang="en-US"/>
+                </a:p>
+              </p:txBody>
+            </p:sp>
+          </p:grpSp>
+        </p:grpSp>
+        <p:sp>
+          <p:nvSpPr>
+            <p:cNvPr id="14" name="Rectangle 13"/>
+            <p:cNvSpPr/>
+            <p:nvPr/>
+          </p:nvSpPr>
+          <p:spPr>
+            <a:xfrm>
+              <a:off x="2824122" y="639272"/>
+              <a:ext cx="3657600" cy="3657600"/>
+            </a:xfrm>
+            <a:prstGeom prst="rect">
+              <a:avLst/>
+            </a:prstGeom>
+            <a:noFill/>
+            <a:ln>
+              <a:noFill/>
+            </a:ln>
+          </p:spPr>
+          <p:style>
+            <a:lnRef idx="2">
+              <a:schemeClr val="accent1">
+                <a:shade val="50000"/>
+              </a:schemeClr>
+            </a:lnRef>
+            <a:fillRef idx="1">
+              <a:schemeClr val="accent1"/>
+            </a:fillRef>
+            <a:effectRef idx="0">
+              <a:schemeClr val="accent1"/>
+            </a:effectRef>
+            <a:fontRef idx="minor">
+              <a:schemeClr val="lt1"/>
+            </a:fontRef>
+          </p:style>
+          <p:txBody>
+            <a:bodyPr rtlCol="0" anchor="ctr"/>
+            <a:lstStyle/>
+            <a:p>
+              <a:pPr algn="ctr"/>
+              <a:endParaRPr lang="en-US"/>
+            </a:p>
+          </p:txBody>
+        </p:sp>
+      </p:grpSp>
+      <p:grpSp>
+        <p:nvGrpSpPr>
+          <p:cNvPr id="18" name="Group 17"/>
+          <p:cNvGrpSpPr/>
+          <p:nvPr/>
+        </p:nvGrpSpPr>
+        <p:grpSpPr>
+          <a:xfrm>
+            <a:off x="5724690" y="197478"/>
+            <a:ext cx="2044557" cy="2938413"/>
+            <a:chOff x="3708971" y="1479476"/>
+            <a:chExt cx="2044557" cy="2938413"/>
+          </a:xfrm>
+          <a:solidFill>
+            <a:schemeClr val="accent2">
+              <a:lumMod val="40000"/>
+              <a:lumOff val="60000"/>
+            </a:schemeClr>
+          </a:solidFill>
+        </p:grpSpPr>
+        <p:cxnSp>
+          <p:nvCxnSpPr>
+            <p:cNvPr id="21" name="Straight Connector 20"/>
+            <p:cNvCxnSpPr/>
+            <p:nvPr/>
+          </p:nvCxnSpPr>
+          <p:spPr>
+            <a:xfrm>
+              <a:off x="4376788" y="3493213"/>
+              <a:ext cx="134741" cy="431515"/>
+            </a:xfrm>
+            <a:prstGeom prst="line">
+              <a:avLst/>
+            </a:prstGeom>
+            <a:grpFill/>
+            <a:ln w="38100">
+              <a:solidFill>
+                <a:schemeClr val="accent5">
+                  <a:lumMod val="60000"/>
+                  <a:lumOff val="40000"/>
+                </a:schemeClr>
+              </a:solidFill>
+            </a:ln>
+          </p:spPr>
+          <p:style>
+            <a:lnRef idx="1">
+              <a:schemeClr val="accent1"/>
+            </a:lnRef>
+            <a:fillRef idx="0">
+              <a:schemeClr val="accent1"/>
+            </a:fillRef>
+            <a:effectRef idx="0">
+              <a:schemeClr val="accent1"/>
+            </a:effectRef>
+            <a:fontRef idx="minor">
+              <a:schemeClr val="tx1"/>
+            </a:fontRef>
+          </p:style>
+        </p:cxnSp>
+        <p:cxnSp>
+          <p:nvCxnSpPr>
+            <p:cNvPr id="22" name="Straight Connector 21"/>
+            <p:cNvCxnSpPr/>
+            <p:nvPr/>
+          </p:nvCxnSpPr>
+          <p:spPr>
+            <a:xfrm flipH="1">
+              <a:off x="4926244" y="3493213"/>
+              <a:ext cx="134741" cy="431515"/>
+            </a:xfrm>
+            <a:prstGeom prst="line">
+              <a:avLst/>
+            </a:prstGeom>
+            <a:grpFill/>
+            <a:ln w="38100">
+              <a:solidFill>
+                <a:schemeClr val="accent5">
+                  <a:lumMod val="60000"/>
+                  <a:lumOff val="40000"/>
+                </a:schemeClr>
+              </a:solidFill>
+            </a:ln>
+          </p:spPr>
+          <p:style>
+            <a:lnRef idx="1">
+              <a:schemeClr val="accent1"/>
+            </a:lnRef>
+            <a:fillRef idx="0">
+              <a:schemeClr val="accent1"/>
+            </a:fillRef>
+            <a:effectRef idx="0">
+              <a:schemeClr val="accent1"/>
+            </a:effectRef>
+            <a:fontRef idx="minor">
+              <a:schemeClr val="tx1"/>
+            </a:fontRef>
+          </p:style>
+        </p:cxnSp>
+        <p:grpSp>
+          <p:nvGrpSpPr>
+            <p:cNvPr id="23" name="Group 22"/>
+            <p:cNvGrpSpPr/>
+            <p:nvPr/>
+          </p:nvGrpSpPr>
+          <p:grpSpPr>
+            <a:xfrm>
+              <a:off x="3708971" y="1479476"/>
+              <a:ext cx="2044557" cy="2137027"/>
+              <a:chOff x="3708971" y="1479476"/>
+              <a:chExt cx="2044557" cy="2137027"/>
+            </a:xfrm>
+            <a:grpFill/>
+          </p:grpSpPr>
+          <p:sp>
+            <p:nvSpPr>
+              <p:cNvPr id="24" name="Oval 23"/>
+              <p:cNvSpPr/>
+              <p:nvPr/>
+            </p:nvSpPr>
+            <p:spPr>
+              <a:xfrm>
+                <a:off x="3708971" y="1479478"/>
+                <a:ext cx="2044557" cy="2137025"/>
+              </a:xfrm>
+              <a:prstGeom prst="ellipse">
+                <a:avLst/>
+              </a:prstGeom>
+              <a:grpFill/>
+              <a:ln>
+                <a:noFill/>
+              </a:ln>
+            </p:spPr>
+            <p:style>
+              <a:lnRef idx="2">
+                <a:schemeClr val="accent1">
+                  <a:shade val="50000"/>
+                </a:schemeClr>
+              </a:lnRef>
+              <a:fillRef idx="1">
+                <a:schemeClr val="accent1"/>
+              </a:fillRef>
+              <a:effectRef idx="0">
+                <a:schemeClr val="accent1"/>
+              </a:effectRef>
+              <a:fontRef idx="minor">
+                <a:schemeClr val="lt1"/>
+              </a:fontRef>
+            </p:style>
+            <p:txBody>
+              <a:bodyPr rtlCol="0" anchor="ctr"/>
+              <a:lstStyle/>
+              <a:p>
+                <a:pPr algn="ctr"/>
+                <a:endParaRPr lang="en-US"/>
+              </a:p>
+            </p:txBody>
+          </p:sp>
+          <p:sp>
+            <p:nvSpPr>
+              <p:cNvPr id="25" name="Oval 24"/>
+              <p:cNvSpPr/>
+              <p:nvPr/>
+            </p:nvSpPr>
+            <p:spPr>
+              <a:xfrm>
+                <a:off x="3929008" y="1479477"/>
+                <a:ext cx="1604481" cy="2137025"/>
+              </a:xfrm>
+              <a:prstGeom prst="ellipse">
+                <a:avLst/>
+              </a:prstGeom>
+              <a:solidFill>
+                <a:srgbClr val="FFFFFF">
+                  <a:alpha val="69804"/>
+                </a:srgbClr>
+              </a:solidFill>
+              <a:ln>
+                <a:noFill/>
+              </a:ln>
+            </p:spPr>
+            <p:style>
+              <a:lnRef idx="2">
+                <a:schemeClr val="accent1">
+                  <a:shade val="50000"/>
+                </a:schemeClr>
+              </a:lnRef>
+              <a:fillRef idx="1">
+                <a:schemeClr val="accent1"/>
+              </a:fillRef>
+              <a:effectRef idx="0">
+                <a:schemeClr val="accent1"/>
+              </a:effectRef>
+              <a:fontRef idx="minor">
+                <a:schemeClr val="lt1"/>
+              </a:fontRef>
+            </p:style>
+            <p:txBody>
+              <a:bodyPr rtlCol="0" anchor="ctr"/>
+              <a:lstStyle/>
+              <a:p>
+                <a:pPr algn="ctr"/>
+                <a:endParaRPr lang="en-US"/>
+              </a:p>
+            </p:txBody>
+          </p:sp>
+          <p:sp>
+            <p:nvSpPr>
+              <p:cNvPr id="26" name="Oval 25"/>
+              <p:cNvSpPr/>
+              <p:nvPr/>
+            </p:nvSpPr>
+            <p:spPr>
+              <a:xfrm>
+                <a:off x="4218824" y="1479476"/>
+                <a:ext cx="1024848" cy="2137025"/>
+              </a:xfrm>
+              <a:prstGeom prst="ellipse">
+                <a:avLst/>
+              </a:prstGeom>
+              <a:grpFill/>
+              <a:ln>
+                <a:noFill/>
+              </a:ln>
+            </p:spPr>
+            <p:style>
+              <a:lnRef idx="2">
+                <a:schemeClr val="accent1">
+                  <a:shade val="50000"/>
+                </a:schemeClr>
+              </a:lnRef>
+              <a:fillRef idx="1">
+                <a:schemeClr val="accent1"/>
+              </a:fillRef>
+              <a:effectRef idx="0">
+                <a:schemeClr val="accent1"/>
+              </a:effectRef>
+              <a:fontRef idx="minor">
+                <a:schemeClr val="lt1"/>
+              </a:fontRef>
+            </p:style>
+            <p:txBody>
+              <a:bodyPr rtlCol="0" anchor="ctr"/>
+              <a:lstStyle/>
+              <a:p>
+                <a:pPr algn="ctr"/>
+                <a:endParaRPr lang="en-US" dirty="0"/>
+              </a:p>
+            </p:txBody>
+          </p:sp>
+          <p:sp>
+            <p:nvSpPr>
+              <p:cNvPr id="27" name="Oval 26"/>
+              <p:cNvSpPr/>
+              <p:nvPr/>
+            </p:nvSpPr>
+            <p:spPr>
+              <a:xfrm>
+                <a:off x="4511529" y="1479476"/>
+                <a:ext cx="439437" cy="2137025"/>
+              </a:xfrm>
+              <a:prstGeom prst="ellipse">
+                <a:avLst/>
+              </a:prstGeom>
+              <a:solidFill>
+                <a:srgbClr val="FFFFFF">
+                  <a:alpha val="69804"/>
+                </a:srgbClr>
+              </a:solidFill>
+              <a:ln>
+                <a:noFill/>
+              </a:ln>
+            </p:spPr>
+            <p:style>
+              <a:lnRef idx="2">
+                <a:schemeClr val="accent1">
+                  <a:shade val="50000"/>
+                </a:schemeClr>
+              </a:lnRef>
+              <a:fillRef idx="1">
+                <a:schemeClr val="accent1"/>
+              </a:fillRef>
+              <a:effectRef idx="0">
+                <a:schemeClr val="accent1"/>
+              </a:effectRef>
+              <a:fontRef idx="minor">
+                <a:schemeClr val="lt1"/>
+              </a:fontRef>
+            </p:style>
+            <p:txBody>
+              <a:bodyPr rtlCol="0" anchor="ctr"/>
+              <a:lstStyle/>
+              <a:p>
+                <a:pPr algn="ctr"/>
+                <a:endParaRPr lang="en-US"/>
+              </a:p>
+            </p:txBody>
+          </p:sp>
+        </p:grpSp>
+        <p:sp>
+          <p:nvSpPr>
+            <p:cNvPr id="20" name="Trapezoid 19"/>
+            <p:cNvSpPr/>
+            <p:nvPr/>
+          </p:nvSpPr>
+          <p:spPr>
+            <a:xfrm flipV="1">
+              <a:off x="4376788" y="3883632"/>
+              <a:ext cx="708917" cy="534257"/>
+            </a:xfrm>
+            <a:prstGeom prst="trapezoid">
+              <a:avLst/>
+            </a:prstGeom>
+            <a:grpFill/>
+            <a:ln>
+              <a:noFill/>
+            </a:ln>
+          </p:spPr>
+          <p:style>
+            <a:lnRef idx="2">
+              <a:schemeClr val="accent1">
+                <a:shade val="50000"/>
+              </a:schemeClr>
+            </a:lnRef>
+            <a:fillRef idx="1">
+              <a:schemeClr val="accent1"/>
+            </a:fillRef>
+            <a:effectRef idx="0">
+              <a:schemeClr val="accent1"/>
+            </a:effectRef>
+            <a:fontRef idx="minor">
+              <a:schemeClr val="lt1"/>
+            </a:fontRef>
+          </p:style>
+          <p:txBody>
+            <a:bodyPr rtlCol="0" anchor="ctr"/>
+            <a:lstStyle/>
+            <a:p>
+              <a:pPr algn="ctr"/>
+              <a:endParaRPr lang="en-US"/>
+            </a:p>
+          </p:txBody>
+        </p:sp>
+      </p:grpSp>
+      <p:grpSp>
+        <p:nvGrpSpPr>
+          <p:cNvPr id="28" name="Group 27"/>
+          <p:cNvGrpSpPr/>
+          <p:nvPr/>
+        </p:nvGrpSpPr>
+        <p:grpSpPr>
+          <a:xfrm>
+            <a:off x="8950834" y="865296"/>
+            <a:ext cx="2044557" cy="2938413"/>
+            <a:chOff x="3708971" y="1479476"/>
+            <a:chExt cx="2044557" cy="2938413"/>
+          </a:xfrm>
+          <a:solidFill>
+            <a:schemeClr val="accent2">
+              <a:lumMod val="40000"/>
+              <a:lumOff val="60000"/>
+            </a:schemeClr>
+          </a:solidFill>
+        </p:grpSpPr>
+        <p:cxnSp>
+          <p:nvCxnSpPr>
+            <p:cNvPr id="30" name="Straight Connector 29"/>
+            <p:cNvCxnSpPr/>
+            <p:nvPr/>
+          </p:nvCxnSpPr>
+          <p:spPr>
+            <a:xfrm>
+              <a:off x="4376788" y="3493213"/>
+              <a:ext cx="134741" cy="431515"/>
+            </a:xfrm>
+            <a:prstGeom prst="line">
+              <a:avLst/>
+            </a:prstGeom>
+            <a:grpFill/>
+            <a:ln w="38100">
+              <a:solidFill>
+                <a:schemeClr val="accent6">
+                  <a:lumMod val="40000"/>
+                  <a:lumOff val="60000"/>
+                </a:schemeClr>
+              </a:solidFill>
+            </a:ln>
+          </p:spPr>
+          <p:style>
+            <a:lnRef idx="1">
+              <a:schemeClr val="accent1"/>
+            </a:lnRef>
+            <a:fillRef idx="0">
+              <a:schemeClr val="accent1"/>
+            </a:fillRef>
+            <a:effectRef idx="0">
+              <a:schemeClr val="accent1"/>
+            </a:effectRef>
+            <a:fontRef idx="minor">
+              <a:schemeClr val="tx1"/>
+            </a:fontRef>
+          </p:style>
+        </p:cxnSp>
+        <p:cxnSp>
+          <p:nvCxnSpPr>
+            <p:cNvPr id="31" name="Straight Connector 30"/>
+            <p:cNvCxnSpPr/>
+            <p:nvPr/>
+          </p:nvCxnSpPr>
+          <p:spPr>
+            <a:xfrm flipH="1">
+              <a:off x="4926244" y="3493213"/>
+              <a:ext cx="134741" cy="431515"/>
+            </a:xfrm>
+            <a:prstGeom prst="line">
+              <a:avLst/>
+            </a:prstGeom>
+            <a:grpFill/>
+            <a:ln w="38100">
+              <a:solidFill>
+                <a:schemeClr val="accent6">
+                  <a:lumMod val="40000"/>
+                  <a:lumOff val="60000"/>
+                </a:schemeClr>
+              </a:solidFill>
+            </a:ln>
+          </p:spPr>
+          <p:style>
+            <a:lnRef idx="1">
+              <a:schemeClr val="accent1"/>
+            </a:lnRef>
+            <a:fillRef idx="0">
+              <a:schemeClr val="accent1"/>
+            </a:fillRef>
+            <a:effectRef idx="0">
+              <a:schemeClr val="accent1"/>
+            </a:effectRef>
+            <a:fontRef idx="minor">
+              <a:schemeClr val="tx1"/>
+            </a:fontRef>
+          </p:style>
+        </p:cxnSp>
+        <p:grpSp>
+          <p:nvGrpSpPr>
+            <p:cNvPr id="32" name="Group 31"/>
+            <p:cNvGrpSpPr/>
+            <p:nvPr/>
+          </p:nvGrpSpPr>
+          <p:grpSpPr>
+            <a:xfrm>
+              <a:off x="3708971" y="1479476"/>
+              <a:ext cx="2044557" cy="2137027"/>
+              <a:chOff x="3708971" y="1479476"/>
+              <a:chExt cx="2044557" cy="2137027"/>
+            </a:xfrm>
+            <a:grpFill/>
+          </p:grpSpPr>
+          <p:sp>
+            <p:nvSpPr>
+              <p:cNvPr id="33" name="Oval 32"/>
+              <p:cNvSpPr/>
+              <p:nvPr/>
+            </p:nvSpPr>
+            <p:spPr>
+              <a:xfrm>
+                <a:off x="3708971" y="1479478"/>
+                <a:ext cx="2044557" cy="2137025"/>
+              </a:xfrm>
+              <a:prstGeom prst="ellipse">
+                <a:avLst/>
+              </a:prstGeom>
+              <a:solidFill>
+                <a:schemeClr val="accent4">
+                  <a:lumMod val="40000"/>
+                  <a:lumOff val="60000"/>
+                </a:schemeClr>
+              </a:solidFill>
+              <a:ln>
+                <a:noFill/>
+              </a:ln>
+            </p:spPr>
+            <p:style>
+              <a:lnRef idx="2">
+                <a:schemeClr val="accent1">
+                  <a:shade val="50000"/>
+                </a:schemeClr>
+              </a:lnRef>
+              <a:fillRef idx="1">
+                <a:schemeClr val="accent1"/>
+              </a:fillRef>
+              <a:effectRef idx="0">
+                <a:schemeClr val="accent1"/>
+              </a:effectRef>
+              <a:fontRef idx="minor">
+                <a:schemeClr val="lt1"/>
+              </a:fontRef>
+            </p:style>
+            <p:txBody>
+              <a:bodyPr rtlCol="0" anchor="ctr"/>
+              <a:lstStyle/>
+              <a:p>
+                <a:pPr algn="ctr"/>
+                <a:endParaRPr lang="en-US"/>
+              </a:p>
+            </p:txBody>
+          </p:sp>
+          <p:sp>
+            <p:nvSpPr>
+              <p:cNvPr id="34" name="Oval 33"/>
+              <p:cNvSpPr/>
+              <p:nvPr/>
+            </p:nvSpPr>
+            <p:spPr>
+              <a:xfrm>
+                <a:off x="3929008" y="1479477"/>
+                <a:ext cx="1604481" cy="2137025"/>
+              </a:xfrm>
+              <a:prstGeom prst="ellipse">
+                <a:avLst/>
+              </a:prstGeom>
+              <a:solidFill>
+                <a:srgbClr val="FFFFFF">
+                  <a:alpha val="69804"/>
+                </a:srgbClr>
+              </a:solidFill>
+              <a:ln>
+                <a:noFill/>
+              </a:ln>
+            </p:spPr>
+            <p:style>
+              <a:lnRef idx="2">
+                <a:schemeClr val="accent1">
+                  <a:shade val="50000"/>
+                </a:schemeClr>
+              </a:lnRef>
+              <a:fillRef idx="1">
+                <a:schemeClr val="accent1"/>
+              </a:fillRef>
+              <a:effectRef idx="0">
+                <a:schemeClr val="accent1"/>
+              </a:effectRef>
+              <a:fontRef idx="minor">
+                <a:schemeClr val="lt1"/>
+              </a:fontRef>
+            </p:style>
+            <p:txBody>
+              <a:bodyPr rtlCol="0" anchor="ctr"/>
+              <a:lstStyle/>
+              <a:p>
+                <a:pPr algn="ctr"/>
+                <a:endParaRPr lang="en-US"/>
+              </a:p>
+            </p:txBody>
+          </p:sp>
+          <p:sp>
+            <p:nvSpPr>
+              <p:cNvPr id="35" name="Oval 34"/>
+              <p:cNvSpPr/>
+              <p:nvPr/>
+            </p:nvSpPr>
+            <p:spPr>
+              <a:xfrm>
+                <a:off x="4218824" y="1479476"/>
+                <a:ext cx="1024848" cy="2137025"/>
+              </a:xfrm>
+              <a:prstGeom prst="ellipse">
+                <a:avLst/>
+              </a:prstGeom>
+              <a:solidFill>
+                <a:schemeClr val="accent4">
+                  <a:lumMod val="40000"/>
+                  <a:lumOff val="60000"/>
+                </a:schemeClr>
+              </a:solidFill>
+              <a:ln>
+                <a:noFill/>
+              </a:ln>
+            </p:spPr>
+            <p:style>
+              <a:lnRef idx="2">
+                <a:schemeClr val="accent1">
+                  <a:shade val="50000"/>
+                </a:schemeClr>
+              </a:lnRef>
+              <a:fillRef idx="1">
+                <a:schemeClr val="accent1"/>
+              </a:fillRef>
+              <a:effectRef idx="0">
+                <a:schemeClr val="accent1"/>
+              </a:effectRef>
+              <a:fontRef idx="minor">
+                <a:schemeClr val="lt1"/>
+              </a:fontRef>
+            </p:style>
+            <p:txBody>
+              <a:bodyPr rtlCol="0" anchor="ctr"/>
+              <a:lstStyle/>
+              <a:p>
+                <a:pPr algn="ctr"/>
+                <a:endParaRPr lang="en-US" dirty="0"/>
+              </a:p>
+            </p:txBody>
+          </p:sp>
+          <p:sp>
+            <p:nvSpPr>
+              <p:cNvPr id="36" name="Oval 35"/>
+              <p:cNvSpPr/>
+              <p:nvPr/>
+            </p:nvSpPr>
+            <p:spPr>
+              <a:xfrm>
+                <a:off x="4511529" y="1479476"/>
+                <a:ext cx="439437" cy="2137025"/>
+              </a:xfrm>
+              <a:prstGeom prst="ellipse">
+                <a:avLst/>
+              </a:prstGeom>
+              <a:solidFill>
+                <a:srgbClr val="FFFFFF">
+                  <a:alpha val="69804"/>
+                </a:srgbClr>
+              </a:solidFill>
+              <a:ln>
+                <a:noFill/>
+              </a:ln>
+            </p:spPr>
+            <p:style>
+              <a:lnRef idx="2">
+                <a:schemeClr val="accent1">
+                  <a:shade val="50000"/>
+                </a:schemeClr>
+              </a:lnRef>
+              <a:fillRef idx="1">
+                <a:schemeClr val="accent1"/>
+              </a:fillRef>
+              <a:effectRef idx="0">
+                <a:schemeClr val="accent1"/>
+              </a:effectRef>
+              <a:fontRef idx="minor">
+                <a:schemeClr val="lt1"/>
+              </a:fontRef>
+            </p:style>
+            <p:txBody>
+              <a:bodyPr rtlCol="0" anchor="ctr"/>
+              <a:lstStyle/>
+              <a:p>
+                <a:pPr algn="ctr"/>
+                <a:endParaRPr lang="en-US"/>
+              </a:p>
+            </p:txBody>
+          </p:sp>
+        </p:grpSp>
+        <p:sp>
+          <p:nvSpPr>
+            <p:cNvPr id="29" name="Trapezoid 28"/>
+            <p:cNvSpPr/>
+            <p:nvPr/>
+          </p:nvSpPr>
+          <p:spPr>
+            <a:xfrm flipV="1">
+              <a:off x="4376788" y="3883632"/>
+              <a:ext cx="708917" cy="534257"/>
+            </a:xfrm>
+            <a:prstGeom prst="trapezoid">
+              <a:avLst/>
+            </a:prstGeom>
+            <a:solidFill>
+              <a:schemeClr val="accent4">
+                <a:lumMod val="40000"/>
+                <a:lumOff val="60000"/>
+              </a:schemeClr>
+            </a:solidFill>
+            <a:ln>
+              <a:noFill/>
+            </a:ln>
+          </p:spPr>
+          <p:style>
+            <a:lnRef idx="2">
+              <a:schemeClr val="accent1">
+                <a:shade val="50000"/>
+              </a:schemeClr>
+            </a:lnRef>
+            <a:fillRef idx="1">
+              <a:schemeClr val="accent1"/>
+            </a:fillRef>
+            <a:effectRef idx="0">
+              <a:schemeClr val="accent1"/>
+            </a:effectRef>
+            <a:fontRef idx="minor">
+              <a:schemeClr val="lt1"/>
+            </a:fontRef>
+          </p:style>
+          <p:txBody>
+            <a:bodyPr rtlCol="0" anchor="ctr"/>
+            <a:lstStyle/>
+            <a:p>
+              <a:pPr algn="ctr"/>
+              <a:endParaRPr lang="en-US"/>
+            </a:p>
+          </p:txBody>
+        </p:sp>
+      </p:grpSp>
+      <p:grpSp>
+        <p:nvGrpSpPr>
+          <p:cNvPr id="37" name="Group 36"/>
+          <p:cNvGrpSpPr/>
+          <p:nvPr/>
+        </p:nvGrpSpPr>
+        <p:grpSpPr>
+          <a:xfrm>
+            <a:off x="7301499" y="1265990"/>
+            <a:ext cx="2044557" cy="2938413"/>
+            <a:chOff x="3708971" y="1479476"/>
+            <a:chExt cx="2044557" cy="2938413"/>
+          </a:xfrm>
+          <a:solidFill>
+            <a:schemeClr val="accent2">
+              <a:lumMod val="40000"/>
+              <a:lumOff val="60000"/>
+            </a:schemeClr>
+          </a:solidFill>
+        </p:grpSpPr>
+        <p:cxnSp>
+          <p:nvCxnSpPr>
+            <p:cNvPr id="39" name="Straight Connector 38"/>
+            <p:cNvCxnSpPr/>
+            <p:nvPr/>
+          </p:nvCxnSpPr>
+          <p:spPr>
+            <a:xfrm>
+              <a:off x="4376788" y="3493213"/>
+              <a:ext cx="134741" cy="431515"/>
+            </a:xfrm>
+            <a:prstGeom prst="line">
+              <a:avLst/>
+            </a:prstGeom>
+            <a:grpFill/>
+            <a:ln w="38100">
+              <a:solidFill>
+                <a:schemeClr val="accent2">
+                  <a:lumMod val="40000"/>
+                  <a:lumOff val="60000"/>
+                </a:schemeClr>
+              </a:solidFill>
+            </a:ln>
+          </p:spPr>
+          <p:style>
+            <a:lnRef idx="1">
+              <a:schemeClr val="accent1"/>
+            </a:lnRef>
+            <a:fillRef idx="0">
+              <a:schemeClr val="accent1"/>
+            </a:fillRef>
+            <a:effectRef idx="0">
+              <a:schemeClr val="accent1"/>
+            </a:effectRef>
+            <a:fontRef idx="minor">
+              <a:schemeClr val="tx1"/>
+            </a:fontRef>
+          </p:style>
+        </p:cxnSp>
+        <p:cxnSp>
+          <p:nvCxnSpPr>
+            <p:cNvPr id="40" name="Straight Connector 39"/>
+            <p:cNvCxnSpPr/>
+            <p:nvPr/>
+          </p:nvCxnSpPr>
+          <p:spPr>
+            <a:xfrm flipH="1">
+              <a:off x="4926244" y="3493213"/>
+              <a:ext cx="134741" cy="431515"/>
+            </a:xfrm>
+            <a:prstGeom prst="line">
+              <a:avLst/>
+            </a:prstGeom>
+            <a:grpFill/>
+            <a:ln w="38100">
+              <a:solidFill>
+                <a:schemeClr val="accent2">
+                  <a:lumMod val="40000"/>
+                  <a:lumOff val="60000"/>
+                </a:schemeClr>
+              </a:solidFill>
+            </a:ln>
+          </p:spPr>
+          <p:style>
+            <a:lnRef idx="1">
+              <a:schemeClr val="accent1"/>
+            </a:lnRef>
+            <a:fillRef idx="0">
+              <a:schemeClr val="accent1"/>
+            </a:fillRef>
+            <a:effectRef idx="0">
+              <a:schemeClr val="accent1"/>
+            </a:effectRef>
+            <a:fontRef idx="minor">
+              <a:schemeClr val="tx1"/>
+            </a:fontRef>
+          </p:style>
+        </p:cxnSp>
+        <p:grpSp>
+          <p:nvGrpSpPr>
+            <p:cNvPr id="41" name="Group 40"/>
+            <p:cNvGrpSpPr/>
+            <p:nvPr/>
+          </p:nvGrpSpPr>
+          <p:grpSpPr>
+            <a:xfrm>
+              <a:off x="3708971" y="1479476"/>
+              <a:ext cx="2044557" cy="2137027"/>
+              <a:chOff x="3708971" y="1479476"/>
+              <a:chExt cx="2044557" cy="2137027"/>
+            </a:xfrm>
+            <a:grpFill/>
+          </p:grpSpPr>
+          <p:sp>
+            <p:nvSpPr>
+              <p:cNvPr id="42" name="Oval 41"/>
+              <p:cNvSpPr/>
+              <p:nvPr/>
+            </p:nvSpPr>
+            <p:spPr>
+              <a:xfrm>
+                <a:off x="3708971" y="1479478"/>
+                <a:ext cx="2044557" cy="2137025"/>
+              </a:xfrm>
+              <a:prstGeom prst="ellipse">
+                <a:avLst/>
+              </a:prstGeom>
+              <a:solidFill>
+                <a:schemeClr val="accent6">
+                  <a:lumMod val="40000"/>
+                  <a:lumOff val="60000"/>
+                </a:schemeClr>
+              </a:solidFill>
+              <a:ln>
+                <a:noFill/>
+              </a:ln>
+            </p:spPr>
+            <p:style>
+              <a:lnRef idx="2">
+                <a:schemeClr val="accent1">
+                  <a:shade val="50000"/>
+                </a:schemeClr>
+              </a:lnRef>
+              <a:fillRef idx="1">
+                <a:schemeClr val="accent1"/>
+              </a:fillRef>
+              <a:effectRef idx="0">
+                <a:schemeClr val="accent1"/>
+              </a:effectRef>
+              <a:fontRef idx="minor">
+                <a:schemeClr val="lt1"/>
+              </a:fontRef>
+            </p:style>
+            <p:txBody>
+              <a:bodyPr rtlCol="0" anchor="ctr"/>
+              <a:lstStyle/>
+              <a:p>
+                <a:pPr algn="ctr"/>
+                <a:endParaRPr lang="en-US"/>
+              </a:p>
+            </p:txBody>
+          </p:sp>
+          <p:sp>
+            <p:nvSpPr>
+              <p:cNvPr id="43" name="Oval 42"/>
+              <p:cNvSpPr/>
+              <p:nvPr/>
+            </p:nvSpPr>
+            <p:spPr>
+              <a:xfrm>
+                <a:off x="3929008" y="1479477"/>
+                <a:ext cx="1604481" cy="2137025"/>
+              </a:xfrm>
+              <a:prstGeom prst="ellipse">
+                <a:avLst/>
+              </a:prstGeom>
+              <a:solidFill>
+                <a:srgbClr val="FFFFFF">
+                  <a:alpha val="69804"/>
+                </a:srgbClr>
+              </a:solidFill>
+              <a:ln>
+                <a:noFill/>
+              </a:ln>
+            </p:spPr>
+            <p:style>
+              <a:lnRef idx="2">
+                <a:schemeClr val="accent1">
+                  <a:shade val="50000"/>
+                </a:schemeClr>
+              </a:lnRef>
+              <a:fillRef idx="1">
+                <a:schemeClr val="accent1"/>
+              </a:fillRef>
+              <a:effectRef idx="0">
+                <a:schemeClr val="accent1"/>
+              </a:effectRef>
+              <a:fontRef idx="minor">
+                <a:schemeClr val="lt1"/>
+              </a:fontRef>
+            </p:style>
+            <p:txBody>
+              <a:bodyPr rtlCol="0" anchor="ctr"/>
+              <a:lstStyle/>
+              <a:p>
+                <a:pPr algn="ctr"/>
+                <a:endParaRPr lang="en-US"/>
+              </a:p>
+            </p:txBody>
+          </p:sp>
+          <p:sp>
+            <p:nvSpPr>
+              <p:cNvPr id="44" name="Oval 43"/>
+              <p:cNvSpPr/>
+              <p:nvPr/>
+            </p:nvSpPr>
+            <p:spPr>
+              <a:xfrm>
+                <a:off x="4218824" y="1479476"/>
+                <a:ext cx="1024848" cy="2137025"/>
+              </a:xfrm>
+              <a:prstGeom prst="ellipse">
+                <a:avLst/>
+              </a:prstGeom>
+              <a:solidFill>
+                <a:schemeClr val="accent6">
+                  <a:lumMod val="40000"/>
+                  <a:lumOff val="60000"/>
+                </a:schemeClr>
+              </a:solidFill>
+              <a:ln>
+                <a:noFill/>
+              </a:ln>
+            </p:spPr>
+            <p:style>
+              <a:lnRef idx="2">
+                <a:schemeClr val="accent1">
+                  <a:shade val="50000"/>
+                </a:schemeClr>
+              </a:lnRef>
+              <a:fillRef idx="1">
+                <a:schemeClr val="accent1"/>
+              </a:fillRef>
+              <a:effectRef idx="0">
+                <a:schemeClr val="accent1"/>
+              </a:effectRef>
+              <a:fontRef idx="minor">
+                <a:schemeClr val="lt1"/>
+              </a:fontRef>
+            </p:style>
+            <p:txBody>
+              <a:bodyPr rtlCol="0" anchor="ctr"/>
+              <a:lstStyle/>
+              <a:p>
+                <a:pPr algn="ctr"/>
+                <a:endParaRPr lang="en-US" dirty="0"/>
+              </a:p>
+            </p:txBody>
+          </p:sp>
+          <p:sp>
+            <p:nvSpPr>
+              <p:cNvPr id="45" name="Oval 44"/>
+              <p:cNvSpPr/>
+              <p:nvPr/>
+            </p:nvSpPr>
+            <p:spPr>
+              <a:xfrm>
+                <a:off x="4511529" y="1479476"/>
+                <a:ext cx="439437" cy="2137025"/>
+              </a:xfrm>
+              <a:prstGeom prst="ellipse">
+                <a:avLst/>
+              </a:prstGeom>
+              <a:solidFill>
+                <a:srgbClr val="FFFFFF">
+                  <a:alpha val="69804"/>
+                </a:srgbClr>
+              </a:solidFill>
+              <a:ln>
+                <a:noFill/>
+              </a:ln>
+            </p:spPr>
+            <p:style>
+              <a:lnRef idx="2">
+                <a:schemeClr val="accent1">
+                  <a:shade val="50000"/>
+                </a:schemeClr>
+              </a:lnRef>
+              <a:fillRef idx="1">
+                <a:schemeClr val="accent1"/>
+              </a:fillRef>
+              <a:effectRef idx="0">
+                <a:schemeClr val="accent1"/>
+              </a:effectRef>
+              <a:fontRef idx="minor">
+                <a:schemeClr val="lt1"/>
+              </a:fontRef>
+            </p:style>
+            <p:txBody>
+              <a:bodyPr rtlCol="0" anchor="ctr"/>
+              <a:lstStyle/>
+              <a:p>
+                <a:pPr algn="ctr"/>
+                <a:endParaRPr lang="en-US"/>
+              </a:p>
+            </p:txBody>
+          </p:sp>
+        </p:grpSp>
+        <p:sp>
+          <p:nvSpPr>
+            <p:cNvPr id="38" name="Trapezoid 37"/>
+            <p:cNvSpPr/>
+            <p:nvPr/>
+          </p:nvSpPr>
+          <p:spPr>
+            <a:xfrm flipV="1">
+              <a:off x="4376788" y="3883632"/>
+              <a:ext cx="708917" cy="534257"/>
+            </a:xfrm>
+            <a:prstGeom prst="trapezoid">
+              <a:avLst/>
+            </a:prstGeom>
+            <a:solidFill>
+              <a:schemeClr val="accent6">
+                <a:lumMod val="40000"/>
+                <a:lumOff val="60000"/>
+              </a:schemeClr>
+            </a:solidFill>
+            <a:ln>
+              <a:noFill/>
+            </a:ln>
+          </p:spPr>
+          <p:style>
+            <a:lnRef idx="2">
+              <a:schemeClr val="accent1">
+                <a:shade val="50000"/>
+              </a:schemeClr>
+            </a:lnRef>
+            <a:fillRef idx="1">
+              <a:schemeClr val="accent1"/>
+            </a:fillRef>
+            <a:effectRef idx="0">
+              <a:schemeClr val="accent1"/>
+            </a:effectRef>
+            <a:fontRef idx="minor">
+              <a:schemeClr val="lt1"/>
+            </a:fontRef>
+          </p:style>
+          <p:txBody>
+            <a:bodyPr rtlCol="0" anchor="ctr"/>
+            <a:lstStyle/>
+            <a:p>
+              <a:pPr algn="ctr"/>
+              <a:endParaRPr lang="en-US"/>
+            </a:p>
+          </p:txBody>
+        </p:sp>
+      </p:grpSp>
+      <p:grpSp>
+        <p:nvGrpSpPr>
+          <p:cNvPr id="46" name="Group 45"/>
+          <p:cNvGrpSpPr/>
+          <p:nvPr/>
+        </p:nvGrpSpPr>
+        <p:grpSpPr>
+          <a:xfrm>
+            <a:off x="1207191" y="598167"/>
+            <a:ext cx="2044557" cy="2938413"/>
+            <a:chOff x="3708971" y="1479476"/>
+            <a:chExt cx="2044557" cy="2938413"/>
+          </a:xfrm>
+          <a:solidFill>
+            <a:schemeClr val="accent2">
+              <a:lumMod val="40000"/>
+              <a:lumOff val="60000"/>
+            </a:schemeClr>
+          </a:solidFill>
+        </p:grpSpPr>
+        <p:cxnSp>
+          <p:nvCxnSpPr>
+            <p:cNvPr id="48" name="Straight Connector 47"/>
+            <p:cNvCxnSpPr/>
+            <p:nvPr/>
+          </p:nvCxnSpPr>
+          <p:spPr>
+            <a:xfrm>
+              <a:off x="4376788" y="3493213"/>
+              <a:ext cx="134741" cy="431515"/>
+            </a:xfrm>
+            <a:prstGeom prst="line">
+              <a:avLst/>
+            </a:prstGeom>
+            <a:grpFill/>
+            <a:ln w="38100">
+              <a:solidFill>
+                <a:schemeClr val="accent4">
+                  <a:lumMod val="40000"/>
+                  <a:lumOff val="60000"/>
+                </a:schemeClr>
+              </a:solidFill>
+            </a:ln>
+          </p:spPr>
+          <p:style>
+            <a:lnRef idx="1">
+              <a:schemeClr val="accent1"/>
+            </a:lnRef>
+            <a:fillRef idx="0">
+              <a:schemeClr val="accent1"/>
+            </a:fillRef>
+            <a:effectRef idx="0">
+              <a:schemeClr val="accent1"/>
+            </a:effectRef>
+            <a:fontRef idx="minor">
+              <a:schemeClr val="tx1"/>
+            </a:fontRef>
+          </p:style>
+        </p:cxnSp>
+        <p:cxnSp>
+          <p:nvCxnSpPr>
+            <p:cNvPr id="49" name="Straight Connector 48"/>
+            <p:cNvCxnSpPr/>
+            <p:nvPr/>
+          </p:nvCxnSpPr>
+          <p:spPr>
+            <a:xfrm flipH="1">
+              <a:off x="4926244" y="3493213"/>
+              <a:ext cx="134741" cy="431515"/>
+            </a:xfrm>
+            <a:prstGeom prst="line">
+              <a:avLst/>
+            </a:prstGeom>
+            <a:grpFill/>
+            <a:ln w="38100">
+              <a:solidFill>
+                <a:schemeClr val="accent4">
+                  <a:lumMod val="40000"/>
+                  <a:lumOff val="60000"/>
+                </a:schemeClr>
+              </a:solidFill>
+            </a:ln>
+          </p:spPr>
+          <p:style>
+            <a:lnRef idx="1">
+              <a:schemeClr val="accent1"/>
+            </a:lnRef>
+            <a:fillRef idx="0">
+              <a:schemeClr val="accent1"/>
+            </a:fillRef>
+            <a:effectRef idx="0">
+              <a:schemeClr val="accent1"/>
+            </a:effectRef>
+            <a:fontRef idx="minor">
+              <a:schemeClr val="tx1"/>
+            </a:fontRef>
+          </p:style>
+        </p:cxnSp>
+        <p:grpSp>
+          <p:nvGrpSpPr>
+            <p:cNvPr id="50" name="Group 49"/>
+            <p:cNvGrpSpPr/>
+            <p:nvPr/>
+          </p:nvGrpSpPr>
+          <p:grpSpPr>
+            <a:xfrm>
+              <a:off x="3708971" y="1479476"/>
+              <a:ext cx="2044557" cy="2137027"/>
+              <a:chOff x="3708971" y="1479476"/>
+              <a:chExt cx="2044557" cy="2137027"/>
+            </a:xfrm>
+            <a:grpFill/>
+          </p:grpSpPr>
+          <p:sp>
+            <p:nvSpPr>
+              <p:cNvPr id="51" name="Oval 50"/>
+              <p:cNvSpPr/>
+              <p:nvPr/>
+            </p:nvSpPr>
+            <p:spPr>
+              <a:xfrm>
+                <a:off x="3708971" y="1479478"/>
+                <a:ext cx="2044557" cy="2137025"/>
+              </a:xfrm>
+              <a:prstGeom prst="ellipse">
+                <a:avLst/>
+              </a:prstGeom>
+              <a:solidFill>
+                <a:schemeClr val="accent5">
+                  <a:lumMod val="60000"/>
+                  <a:lumOff val="40000"/>
+                </a:schemeClr>
+              </a:solidFill>
+              <a:ln>
+                <a:noFill/>
+              </a:ln>
+            </p:spPr>
+            <p:style>
+              <a:lnRef idx="2">
+                <a:schemeClr val="accent1">
+                  <a:shade val="50000"/>
+                </a:schemeClr>
+              </a:lnRef>
+              <a:fillRef idx="1">
+                <a:schemeClr val="accent1"/>
+              </a:fillRef>
+              <a:effectRef idx="0">
+                <a:schemeClr val="accent1"/>
+              </a:effectRef>
+              <a:fontRef idx="minor">
+                <a:schemeClr val="lt1"/>
+              </a:fontRef>
+            </p:style>
+            <p:txBody>
+              <a:bodyPr rtlCol="0" anchor="ctr"/>
+              <a:lstStyle/>
+              <a:p>
+                <a:pPr algn="ctr"/>
+                <a:endParaRPr lang="en-US"/>
+              </a:p>
+            </p:txBody>
+          </p:sp>
+          <p:sp>
+            <p:nvSpPr>
+              <p:cNvPr id="52" name="Oval 51"/>
+              <p:cNvSpPr/>
+              <p:nvPr/>
+            </p:nvSpPr>
+            <p:spPr>
+              <a:xfrm>
+                <a:off x="3929008" y="1479477"/>
+                <a:ext cx="1604481" cy="2137025"/>
+              </a:xfrm>
+              <a:prstGeom prst="ellipse">
+                <a:avLst/>
+              </a:prstGeom>
+              <a:solidFill>
+                <a:srgbClr val="FFFFFF">
+                  <a:alpha val="69804"/>
+                </a:srgbClr>
+              </a:solidFill>
+              <a:ln>
+                <a:noFill/>
+              </a:ln>
+            </p:spPr>
+            <p:style>
+              <a:lnRef idx="2">
+                <a:schemeClr val="accent1">
+                  <a:shade val="50000"/>
+                </a:schemeClr>
+              </a:lnRef>
+              <a:fillRef idx="1">
+                <a:schemeClr val="accent1"/>
+              </a:fillRef>
+              <a:effectRef idx="0">
+                <a:schemeClr val="accent1"/>
+              </a:effectRef>
+              <a:fontRef idx="minor">
+                <a:schemeClr val="lt1"/>
+              </a:fontRef>
+            </p:style>
+            <p:txBody>
+              <a:bodyPr rtlCol="0" anchor="ctr"/>
+              <a:lstStyle/>
+              <a:p>
+                <a:pPr algn="ctr"/>
+                <a:endParaRPr lang="en-US"/>
+              </a:p>
+            </p:txBody>
+          </p:sp>
+          <p:sp>
+            <p:nvSpPr>
+              <p:cNvPr id="53" name="Oval 52"/>
+              <p:cNvSpPr/>
+              <p:nvPr/>
+            </p:nvSpPr>
+            <p:spPr>
+              <a:xfrm>
+                <a:off x="4218824" y="1479476"/>
+                <a:ext cx="1024848" cy="2137025"/>
+              </a:xfrm>
+              <a:prstGeom prst="ellipse">
+                <a:avLst/>
+              </a:prstGeom>
+              <a:solidFill>
+                <a:schemeClr val="accent5">
+                  <a:lumMod val="60000"/>
+                  <a:lumOff val="40000"/>
+                </a:schemeClr>
+              </a:solidFill>
+              <a:ln>
+                <a:noFill/>
+              </a:ln>
+            </p:spPr>
+            <p:style>
+              <a:lnRef idx="2">
+                <a:schemeClr val="accent1">
+                  <a:shade val="50000"/>
+                </a:schemeClr>
+              </a:lnRef>
+              <a:fillRef idx="1">
+                <a:schemeClr val="accent1"/>
+              </a:fillRef>
+              <a:effectRef idx="0">
+                <a:schemeClr val="accent1"/>
+              </a:effectRef>
+              <a:fontRef idx="minor">
+                <a:schemeClr val="lt1"/>
+              </a:fontRef>
+            </p:style>
+            <p:txBody>
+              <a:bodyPr rtlCol="0" anchor="ctr"/>
+              <a:lstStyle/>
+              <a:p>
+                <a:pPr algn="ctr"/>
+                <a:endParaRPr lang="en-US" dirty="0"/>
+              </a:p>
+            </p:txBody>
+          </p:sp>
+          <p:sp>
+            <p:nvSpPr>
+              <p:cNvPr id="54" name="Oval 53"/>
+              <p:cNvSpPr/>
+              <p:nvPr/>
+            </p:nvSpPr>
+            <p:spPr>
+              <a:xfrm>
+                <a:off x="4511529" y="1479476"/>
+                <a:ext cx="439437" cy="2137025"/>
+              </a:xfrm>
+              <a:prstGeom prst="ellipse">
+                <a:avLst/>
+              </a:prstGeom>
+              <a:solidFill>
+                <a:srgbClr val="FFFFFF">
+                  <a:alpha val="69804"/>
+                </a:srgbClr>
+              </a:solidFill>
+              <a:ln>
+                <a:noFill/>
+              </a:ln>
+            </p:spPr>
+            <p:style>
+              <a:lnRef idx="2">
+                <a:schemeClr val="accent1">
+                  <a:shade val="50000"/>
+                </a:schemeClr>
+              </a:lnRef>
+              <a:fillRef idx="1">
+                <a:schemeClr val="accent1"/>
+              </a:fillRef>
+              <a:effectRef idx="0">
+                <a:schemeClr val="accent1"/>
+              </a:effectRef>
+              <a:fontRef idx="minor">
+                <a:schemeClr val="lt1"/>
+              </a:fontRef>
+            </p:style>
+            <p:txBody>
+              <a:bodyPr rtlCol="0" anchor="ctr"/>
+              <a:lstStyle/>
+              <a:p>
+                <a:pPr algn="ctr"/>
+                <a:endParaRPr lang="en-US"/>
+              </a:p>
+            </p:txBody>
+          </p:sp>
+        </p:grpSp>
+        <p:sp>
+          <p:nvSpPr>
+            <p:cNvPr id="47" name="Trapezoid 46"/>
+            <p:cNvSpPr/>
+            <p:nvPr/>
+          </p:nvSpPr>
+          <p:spPr>
+            <a:xfrm flipV="1">
+              <a:off x="4376788" y="3883632"/>
+              <a:ext cx="708917" cy="534257"/>
+            </a:xfrm>
+            <a:prstGeom prst="trapezoid">
+              <a:avLst/>
+            </a:prstGeom>
+            <a:solidFill>
+              <a:schemeClr val="accent5">
+                <a:lumMod val="60000"/>
+                <a:lumOff val="40000"/>
+              </a:schemeClr>
+            </a:solidFill>
+            <a:ln>
+              <a:noFill/>
+            </a:ln>
+          </p:spPr>
+          <p:style>
+            <a:lnRef idx="2">
+              <a:schemeClr val="accent1">
+                <a:shade val="50000"/>
+              </a:schemeClr>
+            </a:lnRef>
+            <a:fillRef idx="1">
+              <a:schemeClr val="accent1"/>
+            </a:fillRef>
+            <a:effectRef idx="0">
+              <a:schemeClr val="accent1"/>
+            </a:effectRef>
+            <a:fontRef idx="minor">
+              <a:schemeClr val="lt1"/>
+            </a:fontRef>
+          </p:style>
+          <p:txBody>
+            <a:bodyPr rtlCol="0" anchor="ctr"/>
+            <a:lstStyle/>
+            <a:p>
+              <a:pPr algn="ctr"/>
+              <a:endParaRPr lang="en-US"/>
+            </a:p>
+          </p:txBody>
+        </p:sp>
+      </p:grpSp>
+    </p:spTree>
+    <p:extLst>
+      <p:ext uri="{BB962C8B-B14F-4D97-AF65-F5344CB8AC3E}">
+        <p14:creationId xmlns:p14="http://schemas.microsoft.com/office/powerpoint/2010/main" val="720288755"/>
+      </p:ext>
+    </p:extLst>
+  </p:cSld>
+  <p:clrMapOvr>
+    <a:masterClrMapping/>
+  </p:clrMapOvr>
+</p:sld>
+</file>
+
+<file path=ppt/slides/slide3.xml><?xml version="1.0" encoding="utf-8"?>
 <p:sld xmlns:a="http://schemas.openxmlformats.org/drawingml/2006/main" xmlns:r="http://schemas.openxmlformats.org/officeDocument/2006/relationships" xmlns:p="http://schemas.openxmlformats.org/presentationml/2006/main">
   <p:cSld>
     <p:spTree>
@@ -5475,7 +7325,7 @@
 </p:sld>
 </file>
 
-<file path=ppt/slides/slide3.xml><?xml version="1.0" encoding="utf-8"?>
+<file path=ppt/slides/slide4.xml><?xml version="1.0" encoding="utf-8"?>
 <p:sld xmlns:a="http://schemas.openxmlformats.org/drawingml/2006/main" xmlns:r="http://schemas.openxmlformats.org/officeDocument/2006/relationships" xmlns:p="http://schemas.openxmlformats.org/presentationml/2006/main">
   <p:cSld>
     <p:spTree>
@@ -6476,8 +8326,8 @@
           </p:sp>
         </mc:Fallback>
       </mc:AlternateContent>
-      <mc:AlternateContent xmlns:mc="http://schemas.openxmlformats.org/markup-compatibility/2006" xmlns:a14="http://schemas.microsoft.com/office/drawing/2010/main">
-        <mc:Choice Requires="a14">
+      <mc:AlternateContent xmlns:mc="http://schemas.openxmlformats.org/markup-compatibility/2006">
+        <mc:Choice xmlns:a14="http://schemas.microsoft.com/office/drawing/2010/main" Requires="a14">
           <p:sp>
             <p:nvSpPr>
               <p:cNvPr id="6" name="TextBox 5"/>
@@ -6927,7 +8777,7 @@
             </p:txBody>
           </p:sp>
         </mc:Choice>
-        <mc:Fallback xmlns="">
+        <mc:Fallback>
           <p:sp>
             <p:nvSpPr>
               <p:cNvPr id="6" name="TextBox 5"/>

</xml_diff>

<commit_message>
Adding mini balloon border @ top and favicon!
</commit_message>
<xml_diff>
--- a/images/images.pptx
+++ b/images/images.pptx
@@ -200,7 +200,7 @@
           <a:p>
             <a:fld id="{886F97ED-8CED-CA4C-AC21-E9F1C6F3A2C0}" type="datetimeFigureOut">
               <a:rPr lang="en-US" smtClean="0"/>
-              <a:t>7/19/19</a:t>
+              <a:t>7/19/2019</a:t>
             </a:fld>
             <a:endParaRPr lang="en-US"/>
           </a:p>
@@ -264,38 +264,37 @@
           <a:p>
             <a:pPr lvl="0"/>
             <a:r>
-              <a:rPr lang="en-US" smtClean="0"/>
+              <a:rPr lang="en-US"/>
               <a:t>Click to edit Master text styles</a:t>
             </a:r>
           </a:p>
           <a:p>
             <a:pPr lvl="1"/>
             <a:r>
-              <a:rPr lang="en-US" smtClean="0"/>
+              <a:rPr lang="en-US"/>
               <a:t>Second level</a:t>
             </a:r>
           </a:p>
           <a:p>
             <a:pPr lvl="2"/>
             <a:r>
-              <a:rPr lang="en-US" smtClean="0"/>
+              <a:rPr lang="en-US"/>
               <a:t>Third level</a:t>
             </a:r>
           </a:p>
           <a:p>
             <a:pPr lvl="3"/>
             <a:r>
-              <a:rPr lang="en-US" smtClean="0"/>
+              <a:rPr lang="en-US"/>
               <a:t>Fourth level</a:t>
             </a:r>
           </a:p>
           <a:p>
             <a:pPr lvl="4"/>
             <a:r>
-              <a:rPr lang="en-US" smtClean="0"/>
+              <a:rPr lang="en-US"/>
               <a:t>Fifth level</a:t>
             </a:r>
-            <a:endParaRPr lang="en-US"/>
           </a:p>
         </p:txBody>
       </p:sp>
@@ -594,10 +593,9 @@
           </a:lstStyle>
           <a:p>
             <a:r>
-              <a:rPr lang="en-US" smtClean="0"/>
+              <a:rPr lang="en-US"/>
               <a:t>Click to edit Master title style</a:t>
             </a:r>
-            <a:endParaRPr lang="en-US"/>
           </a:p>
         </p:txBody>
       </p:sp>
@@ -659,10 +657,9 @@
           </a:lstStyle>
           <a:p>
             <a:r>
-              <a:rPr lang="en-US" smtClean="0"/>
+              <a:rPr lang="en-US"/>
               <a:t>Click to edit Master subtitle style</a:t>
             </a:r>
-            <a:endParaRPr lang="en-US"/>
           </a:p>
         </p:txBody>
       </p:sp>
@@ -683,7 +680,7 @@
           <a:p>
             <a:fld id="{65BA97D1-A630-FB46-8B2C-2E138AAEAE44}" type="datetimeFigureOut">
               <a:rPr lang="en-US" smtClean="0"/>
-              <a:t>7/19/19</a:t>
+              <a:t>7/19/2019</a:t>
             </a:fld>
             <a:endParaRPr lang="en-US"/>
           </a:p>
@@ -777,10 +774,9 @@
           <a:lstStyle/>
           <a:p>
             <a:r>
-              <a:rPr lang="en-US" smtClean="0"/>
+              <a:rPr lang="en-US"/>
               <a:t>Click to edit Master title style</a:t>
             </a:r>
-            <a:endParaRPr lang="en-US"/>
           </a:p>
         </p:txBody>
       </p:sp>
@@ -801,38 +797,37 @@
           <a:p>
             <a:pPr lvl="0"/>
             <a:r>
-              <a:rPr lang="en-US" smtClean="0"/>
+              <a:rPr lang="en-US"/>
               <a:t>Click to edit Master text styles</a:t>
             </a:r>
           </a:p>
           <a:p>
             <a:pPr lvl="1"/>
             <a:r>
-              <a:rPr lang="en-US" smtClean="0"/>
+              <a:rPr lang="en-US"/>
               <a:t>Second level</a:t>
             </a:r>
           </a:p>
           <a:p>
             <a:pPr lvl="2"/>
             <a:r>
-              <a:rPr lang="en-US" smtClean="0"/>
+              <a:rPr lang="en-US"/>
               <a:t>Third level</a:t>
             </a:r>
           </a:p>
           <a:p>
             <a:pPr lvl="3"/>
             <a:r>
-              <a:rPr lang="en-US" smtClean="0"/>
+              <a:rPr lang="en-US"/>
               <a:t>Fourth level</a:t>
             </a:r>
           </a:p>
           <a:p>
             <a:pPr lvl="4"/>
             <a:r>
-              <a:rPr lang="en-US" smtClean="0"/>
+              <a:rPr lang="en-US"/>
               <a:t>Fifth level</a:t>
             </a:r>
-            <a:endParaRPr lang="en-US"/>
           </a:p>
         </p:txBody>
       </p:sp>
@@ -853,7 +848,7 @@
           <a:p>
             <a:fld id="{65BA97D1-A630-FB46-8B2C-2E138AAEAE44}" type="datetimeFigureOut">
               <a:rPr lang="en-US" smtClean="0"/>
-              <a:t>7/19/19</a:t>
+              <a:t>7/19/2019</a:t>
             </a:fld>
             <a:endParaRPr lang="en-US"/>
           </a:p>
@@ -952,10 +947,9 @@
           <a:lstStyle/>
           <a:p>
             <a:r>
-              <a:rPr lang="en-US" smtClean="0"/>
+              <a:rPr lang="en-US"/>
               <a:t>Click to edit Master title style</a:t>
             </a:r>
-            <a:endParaRPr lang="en-US"/>
           </a:p>
         </p:txBody>
       </p:sp>
@@ -981,38 +975,37 @@
           <a:p>
             <a:pPr lvl="0"/>
             <a:r>
-              <a:rPr lang="en-US" smtClean="0"/>
+              <a:rPr lang="en-US"/>
               <a:t>Click to edit Master text styles</a:t>
             </a:r>
           </a:p>
           <a:p>
             <a:pPr lvl="1"/>
             <a:r>
-              <a:rPr lang="en-US" smtClean="0"/>
+              <a:rPr lang="en-US"/>
               <a:t>Second level</a:t>
             </a:r>
           </a:p>
           <a:p>
             <a:pPr lvl="2"/>
             <a:r>
-              <a:rPr lang="en-US" smtClean="0"/>
+              <a:rPr lang="en-US"/>
               <a:t>Third level</a:t>
             </a:r>
           </a:p>
           <a:p>
             <a:pPr lvl="3"/>
             <a:r>
-              <a:rPr lang="en-US" smtClean="0"/>
+              <a:rPr lang="en-US"/>
               <a:t>Fourth level</a:t>
             </a:r>
           </a:p>
           <a:p>
             <a:pPr lvl="4"/>
             <a:r>
-              <a:rPr lang="en-US" smtClean="0"/>
+              <a:rPr lang="en-US"/>
               <a:t>Fifth level</a:t>
             </a:r>
-            <a:endParaRPr lang="en-US"/>
           </a:p>
         </p:txBody>
       </p:sp>
@@ -1033,7 +1026,7 @@
           <a:p>
             <a:fld id="{65BA97D1-A630-FB46-8B2C-2E138AAEAE44}" type="datetimeFigureOut">
               <a:rPr lang="en-US" smtClean="0"/>
-              <a:t>7/19/19</a:t>
+              <a:t>7/19/2019</a:t>
             </a:fld>
             <a:endParaRPr lang="en-US"/>
           </a:p>
@@ -1127,10 +1120,9 @@
           <a:lstStyle/>
           <a:p>
             <a:r>
-              <a:rPr lang="en-US" smtClean="0"/>
+              <a:rPr lang="en-US"/>
               <a:t>Click to edit Master title style</a:t>
             </a:r>
-            <a:endParaRPr lang="en-US"/>
           </a:p>
         </p:txBody>
       </p:sp>
@@ -1151,38 +1143,37 @@
           <a:p>
             <a:pPr lvl="0"/>
             <a:r>
-              <a:rPr lang="en-US" smtClean="0"/>
+              <a:rPr lang="en-US"/>
               <a:t>Click to edit Master text styles</a:t>
             </a:r>
           </a:p>
           <a:p>
             <a:pPr lvl="1"/>
             <a:r>
-              <a:rPr lang="en-US" smtClean="0"/>
+              <a:rPr lang="en-US"/>
               <a:t>Second level</a:t>
             </a:r>
           </a:p>
           <a:p>
             <a:pPr lvl="2"/>
             <a:r>
-              <a:rPr lang="en-US" smtClean="0"/>
+              <a:rPr lang="en-US"/>
               <a:t>Third level</a:t>
             </a:r>
           </a:p>
           <a:p>
             <a:pPr lvl="3"/>
             <a:r>
-              <a:rPr lang="en-US" smtClean="0"/>
+              <a:rPr lang="en-US"/>
               <a:t>Fourth level</a:t>
             </a:r>
           </a:p>
           <a:p>
             <a:pPr lvl="4"/>
             <a:r>
-              <a:rPr lang="en-US" smtClean="0"/>
+              <a:rPr lang="en-US"/>
               <a:t>Fifth level</a:t>
             </a:r>
-            <a:endParaRPr lang="en-US"/>
           </a:p>
         </p:txBody>
       </p:sp>
@@ -1203,7 +1194,7 @@
           <a:p>
             <a:fld id="{65BA97D1-A630-FB46-8B2C-2E138AAEAE44}" type="datetimeFigureOut">
               <a:rPr lang="en-US" smtClean="0"/>
-              <a:t>7/19/19</a:t>
+              <a:t>7/19/2019</a:t>
             </a:fld>
             <a:endParaRPr lang="en-US"/>
           </a:p>
@@ -1306,10 +1297,9 @@
           </a:lstStyle>
           <a:p>
             <a:r>
-              <a:rPr lang="en-US" smtClean="0"/>
+              <a:rPr lang="en-US"/>
               <a:t>Click to edit Master title style</a:t>
             </a:r>
-            <a:endParaRPr lang="en-US"/>
           </a:p>
         </p:txBody>
       </p:sp>
@@ -1426,7 +1416,7 @@
           <a:p>
             <a:pPr lvl="0"/>
             <a:r>
-              <a:rPr lang="en-US" smtClean="0"/>
+              <a:rPr lang="en-US"/>
               <a:t>Click to edit Master text styles</a:t>
             </a:r>
           </a:p>
@@ -1449,7 +1439,7 @@
           <a:p>
             <a:fld id="{65BA97D1-A630-FB46-8B2C-2E138AAEAE44}" type="datetimeFigureOut">
               <a:rPr lang="en-US" smtClean="0"/>
-              <a:t>7/19/19</a:t>
+              <a:t>7/19/2019</a:t>
             </a:fld>
             <a:endParaRPr lang="en-US"/>
           </a:p>
@@ -1543,10 +1533,9 @@
           <a:lstStyle/>
           <a:p>
             <a:r>
-              <a:rPr lang="en-US" smtClean="0"/>
+              <a:rPr lang="en-US"/>
               <a:t>Click to edit Master title style</a:t>
             </a:r>
-            <a:endParaRPr lang="en-US"/>
           </a:p>
         </p:txBody>
       </p:sp>
@@ -1572,38 +1561,37 @@
           <a:p>
             <a:pPr lvl="0"/>
             <a:r>
-              <a:rPr lang="en-US" smtClean="0"/>
+              <a:rPr lang="en-US"/>
               <a:t>Click to edit Master text styles</a:t>
             </a:r>
           </a:p>
           <a:p>
             <a:pPr lvl="1"/>
             <a:r>
-              <a:rPr lang="en-US" smtClean="0"/>
+              <a:rPr lang="en-US"/>
               <a:t>Second level</a:t>
             </a:r>
           </a:p>
           <a:p>
             <a:pPr lvl="2"/>
             <a:r>
-              <a:rPr lang="en-US" smtClean="0"/>
+              <a:rPr lang="en-US"/>
               <a:t>Third level</a:t>
             </a:r>
           </a:p>
           <a:p>
             <a:pPr lvl="3"/>
             <a:r>
-              <a:rPr lang="en-US" smtClean="0"/>
+              <a:rPr lang="en-US"/>
               <a:t>Fourth level</a:t>
             </a:r>
           </a:p>
           <a:p>
             <a:pPr lvl="4"/>
             <a:r>
-              <a:rPr lang="en-US" smtClean="0"/>
+              <a:rPr lang="en-US"/>
               <a:t>Fifth level</a:t>
             </a:r>
-            <a:endParaRPr lang="en-US"/>
           </a:p>
         </p:txBody>
       </p:sp>
@@ -1629,38 +1617,37 @@
           <a:p>
             <a:pPr lvl="0"/>
             <a:r>
-              <a:rPr lang="en-US" smtClean="0"/>
+              <a:rPr lang="en-US"/>
               <a:t>Click to edit Master text styles</a:t>
             </a:r>
           </a:p>
           <a:p>
             <a:pPr lvl="1"/>
             <a:r>
-              <a:rPr lang="en-US" smtClean="0"/>
+              <a:rPr lang="en-US"/>
               <a:t>Second level</a:t>
             </a:r>
           </a:p>
           <a:p>
             <a:pPr lvl="2"/>
             <a:r>
-              <a:rPr lang="en-US" smtClean="0"/>
+              <a:rPr lang="en-US"/>
               <a:t>Third level</a:t>
             </a:r>
           </a:p>
           <a:p>
             <a:pPr lvl="3"/>
             <a:r>
-              <a:rPr lang="en-US" smtClean="0"/>
+              <a:rPr lang="en-US"/>
               <a:t>Fourth level</a:t>
             </a:r>
           </a:p>
           <a:p>
             <a:pPr lvl="4"/>
             <a:r>
-              <a:rPr lang="en-US" smtClean="0"/>
+              <a:rPr lang="en-US"/>
               <a:t>Fifth level</a:t>
             </a:r>
-            <a:endParaRPr lang="en-US"/>
           </a:p>
         </p:txBody>
       </p:sp>
@@ -1681,7 +1668,7 @@
           <a:p>
             <a:fld id="{65BA97D1-A630-FB46-8B2C-2E138AAEAE44}" type="datetimeFigureOut">
               <a:rPr lang="en-US" smtClean="0"/>
-              <a:t>7/19/19</a:t>
+              <a:t>7/19/2019</a:t>
             </a:fld>
             <a:endParaRPr lang="en-US"/>
           </a:p>
@@ -1780,10 +1767,9 @@
           <a:lstStyle/>
           <a:p>
             <a:r>
-              <a:rPr lang="en-US" smtClean="0"/>
+              <a:rPr lang="en-US"/>
               <a:t>Click to edit Master title style</a:t>
             </a:r>
-            <a:endParaRPr lang="en-US"/>
           </a:p>
         </p:txBody>
       </p:sp>
@@ -1846,7 +1832,7 @@
           <a:p>
             <a:pPr lvl="0"/>
             <a:r>
-              <a:rPr lang="en-US" smtClean="0"/>
+              <a:rPr lang="en-US"/>
               <a:t>Click to edit Master text styles</a:t>
             </a:r>
           </a:p>
@@ -1874,38 +1860,37 @@
           <a:p>
             <a:pPr lvl="0"/>
             <a:r>
-              <a:rPr lang="en-US" smtClean="0"/>
+              <a:rPr lang="en-US"/>
               <a:t>Click to edit Master text styles</a:t>
             </a:r>
           </a:p>
           <a:p>
             <a:pPr lvl="1"/>
             <a:r>
-              <a:rPr lang="en-US" smtClean="0"/>
+              <a:rPr lang="en-US"/>
               <a:t>Second level</a:t>
             </a:r>
           </a:p>
           <a:p>
             <a:pPr lvl="2"/>
             <a:r>
-              <a:rPr lang="en-US" smtClean="0"/>
+              <a:rPr lang="en-US"/>
               <a:t>Third level</a:t>
             </a:r>
           </a:p>
           <a:p>
             <a:pPr lvl="3"/>
             <a:r>
-              <a:rPr lang="en-US" smtClean="0"/>
+              <a:rPr lang="en-US"/>
               <a:t>Fourth level</a:t>
             </a:r>
           </a:p>
           <a:p>
             <a:pPr lvl="4"/>
             <a:r>
-              <a:rPr lang="en-US" smtClean="0"/>
+              <a:rPr lang="en-US"/>
               <a:t>Fifth level</a:t>
             </a:r>
-            <a:endParaRPr lang="en-US"/>
           </a:p>
         </p:txBody>
       </p:sp>
@@ -1968,7 +1953,7 @@
           <a:p>
             <a:pPr lvl="0"/>
             <a:r>
-              <a:rPr lang="en-US" smtClean="0"/>
+              <a:rPr lang="en-US"/>
               <a:t>Click to edit Master text styles</a:t>
             </a:r>
           </a:p>
@@ -1996,38 +1981,37 @@
           <a:p>
             <a:pPr lvl="0"/>
             <a:r>
-              <a:rPr lang="en-US" smtClean="0"/>
+              <a:rPr lang="en-US"/>
               <a:t>Click to edit Master text styles</a:t>
             </a:r>
           </a:p>
           <a:p>
             <a:pPr lvl="1"/>
             <a:r>
-              <a:rPr lang="en-US" smtClean="0"/>
+              <a:rPr lang="en-US"/>
               <a:t>Second level</a:t>
             </a:r>
           </a:p>
           <a:p>
             <a:pPr lvl="2"/>
             <a:r>
-              <a:rPr lang="en-US" smtClean="0"/>
+              <a:rPr lang="en-US"/>
               <a:t>Third level</a:t>
             </a:r>
           </a:p>
           <a:p>
             <a:pPr lvl="3"/>
             <a:r>
-              <a:rPr lang="en-US" smtClean="0"/>
+              <a:rPr lang="en-US"/>
               <a:t>Fourth level</a:t>
             </a:r>
           </a:p>
           <a:p>
             <a:pPr lvl="4"/>
             <a:r>
-              <a:rPr lang="en-US" smtClean="0"/>
+              <a:rPr lang="en-US"/>
               <a:t>Fifth level</a:t>
             </a:r>
-            <a:endParaRPr lang="en-US"/>
           </a:p>
         </p:txBody>
       </p:sp>
@@ -2048,7 +2032,7 @@
           <a:p>
             <a:fld id="{65BA97D1-A630-FB46-8B2C-2E138AAEAE44}" type="datetimeFigureOut">
               <a:rPr lang="en-US" smtClean="0"/>
-              <a:t>7/19/19</a:t>
+              <a:t>7/19/2019</a:t>
             </a:fld>
             <a:endParaRPr lang="en-US"/>
           </a:p>
@@ -2142,10 +2126,9 @@
           <a:lstStyle/>
           <a:p>
             <a:r>
-              <a:rPr lang="en-US" smtClean="0"/>
+              <a:rPr lang="en-US"/>
               <a:t>Click to edit Master title style</a:t>
             </a:r>
-            <a:endParaRPr lang="en-US"/>
           </a:p>
         </p:txBody>
       </p:sp>
@@ -2166,7 +2149,7 @@
           <a:p>
             <a:fld id="{65BA97D1-A630-FB46-8B2C-2E138AAEAE44}" type="datetimeFigureOut">
               <a:rPr lang="en-US" smtClean="0"/>
-              <a:t>7/19/19</a:t>
+              <a:t>7/19/2019</a:t>
             </a:fld>
             <a:endParaRPr lang="en-US"/>
           </a:p>
@@ -2261,7 +2244,7 @@
           <a:p>
             <a:fld id="{65BA97D1-A630-FB46-8B2C-2E138AAEAE44}" type="datetimeFigureOut">
               <a:rPr lang="en-US" smtClean="0"/>
-              <a:t>7/19/19</a:t>
+              <a:t>7/19/2019</a:t>
             </a:fld>
             <a:endParaRPr lang="en-US"/>
           </a:p>
@@ -2364,10 +2347,9 @@
           </a:lstStyle>
           <a:p>
             <a:r>
-              <a:rPr lang="en-US" smtClean="0"/>
+              <a:rPr lang="en-US"/>
               <a:t>Click to edit Master title style</a:t>
             </a:r>
-            <a:endParaRPr lang="en-US"/>
           </a:p>
         </p:txBody>
       </p:sp>
@@ -2421,38 +2403,37 @@
           <a:p>
             <a:pPr lvl="0"/>
             <a:r>
-              <a:rPr lang="en-US" smtClean="0"/>
+              <a:rPr lang="en-US"/>
               <a:t>Click to edit Master text styles</a:t>
             </a:r>
           </a:p>
           <a:p>
             <a:pPr lvl="1"/>
             <a:r>
-              <a:rPr lang="en-US" smtClean="0"/>
+              <a:rPr lang="en-US"/>
               <a:t>Second level</a:t>
             </a:r>
           </a:p>
           <a:p>
             <a:pPr lvl="2"/>
             <a:r>
-              <a:rPr lang="en-US" smtClean="0"/>
+              <a:rPr lang="en-US"/>
               <a:t>Third level</a:t>
             </a:r>
           </a:p>
           <a:p>
             <a:pPr lvl="3"/>
             <a:r>
-              <a:rPr lang="en-US" smtClean="0"/>
+              <a:rPr lang="en-US"/>
               <a:t>Fourth level</a:t>
             </a:r>
           </a:p>
           <a:p>
             <a:pPr lvl="4"/>
             <a:r>
-              <a:rPr lang="en-US" smtClean="0"/>
+              <a:rPr lang="en-US"/>
               <a:t>Fifth level</a:t>
             </a:r>
-            <a:endParaRPr lang="en-US"/>
           </a:p>
         </p:txBody>
       </p:sp>
@@ -2515,7 +2496,7 @@
           <a:p>
             <a:pPr lvl="0"/>
             <a:r>
-              <a:rPr lang="en-US" smtClean="0"/>
+              <a:rPr lang="en-US"/>
               <a:t>Click to edit Master text styles</a:t>
             </a:r>
           </a:p>
@@ -2538,7 +2519,7 @@
           <a:p>
             <a:fld id="{65BA97D1-A630-FB46-8B2C-2E138AAEAE44}" type="datetimeFigureOut">
               <a:rPr lang="en-US" smtClean="0"/>
-              <a:t>7/19/19</a:t>
+              <a:t>7/19/2019</a:t>
             </a:fld>
             <a:endParaRPr lang="en-US"/>
           </a:p>
@@ -2641,10 +2622,9 @@
           </a:lstStyle>
           <a:p>
             <a:r>
-              <a:rPr lang="en-US" smtClean="0"/>
+              <a:rPr lang="en-US"/>
               <a:t>Click to edit Master title style</a:t>
             </a:r>
-            <a:endParaRPr lang="en-US"/>
           </a:p>
         </p:txBody>
       </p:sp>
@@ -2768,7 +2748,7 @@
           <a:p>
             <a:pPr lvl="0"/>
             <a:r>
-              <a:rPr lang="en-US" smtClean="0"/>
+              <a:rPr lang="en-US"/>
               <a:t>Click to edit Master text styles</a:t>
             </a:r>
           </a:p>
@@ -2791,7 +2771,7 @@
           <a:p>
             <a:fld id="{65BA97D1-A630-FB46-8B2C-2E138AAEAE44}" type="datetimeFigureOut">
               <a:rPr lang="en-US" smtClean="0"/>
-              <a:t>7/19/19</a:t>
+              <a:t>7/19/2019</a:t>
             </a:fld>
             <a:endParaRPr lang="en-US"/>
           </a:p>
@@ -2900,10 +2880,9 @@
           <a:lstStyle/>
           <a:p>
             <a:r>
-              <a:rPr lang="en-US" smtClean="0"/>
+              <a:rPr lang="en-US"/>
               <a:t>Click to edit Master title style</a:t>
             </a:r>
-            <a:endParaRPr lang="en-US"/>
           </a:p>
         </p:txBody>
       </p:sp>
@@ -2934,38 +2913,37 @@
           <a:p>
             <a:pPr lvl="0"/>
             <a:r>
-              <a:rPr lang="en-US" smtClean="0"/>
+              <a:rPr lang="en-US"/>
               <a:t>Click to edit Master text styles</a:t>
             </a:r>
           </a:p>
           <a:p>
             <a:pPr lvl="1"/>
             <a:r>
-              <a:rPr lang="en-US" smtClean="0"/>
+              <a:rPr lang="en-US"/>
               <a:t>Second level</a:t>
             </a:r>
           </a:p>
           <a:p>
             <a:pPr lvl="2"/>
             <a:r>
-              <a:rPr lang="en-US" smtClean="0"/>
+              <a:rPr lang="en-US"/>
               <a:t>Third level</a:t>
             </a:r>
           </a:p>
           <a:p>
             <a:pPr lvl="3"/>
             <a:r>
-              <a:rPr lang="en-US" smtClean="0"/>
+              <a:rPr lang="en-US"/>
               <a:t>Fourth level</a:t>
             </a:r>
           </a:p>
           <a:p>
             <a:pPr lvl="4"/>
             <a:r>
-              <a:rPr lang="en-US" smtClean="0"/>
+              <a:rPr lang="en-US"/>
               <a:t>Fifth level</a:t>
             </a:r>
-            <a:endParaRPr lang="en-US"/>
           </a:p>
         </p:txBody>
       </p:sp>
@@ -3004,7 +2982,7 @@
           <a:p>
             <a:fld id="{65BA97D1-A630-FB46-8B2C-2E138AAEAE44}" type="datetimeFigureOut">
               <a:rPr lang="en-US" smtClean="0"/>
-              <a:t>7/19/19</a:t>
+              <a:t>7/19/2019</a:t>
             </a:fld>
             <a:endParaRPr lang="en-US"/>
           </a:p>
@@ -4504,18 +4482,13 @@
           <a:lstStyle/>
           <a:p>
             <a:r>
-              <a:rPr lang="en-US" spc="300" dirty="0" smtClean="0">
+              <a:rPr lang="en-US" spc="300" dirty="0">
                 <a:latin typeface="Karla" charset="0"/>
                 <a:ea typeface="Karla" charset="0"/>
                 <a:cs typeface="Karla" charset="0"/>
               </a:rPr>
               <a:t>LET’S BEGIN!</a:t>
             </a:r>
-            <a:endParaRPr lang="en-US" spc="300" dirty="0">
-              <a:latin typeface="Karla" charset="0"/>
-              <a:ea typeface="Karla" charset="0"/>
-              <a:cs typeface="Karla" charset="0"/>
-            </a:endParaRPr>
           </a:p>
         </p:txBody>
       </p:sp>
@@ -7312,6 +7285,66 @@
           </a:p>
         </p:txBody>
       </p:sp>
+      <p:pic>
+        <p:nvPicPr>
+          <p:cNvPr id="3" name="Picture 2" descr="A close up of a logo&#10;&#10;Description automatically generated">
+            <a:extLst>
+              <a:ext uri="{FF2B5EF4-FFF2-40B4-BE49-F238E27FC236}">
+                <a16:creationId xmlns:a16="http://schemas.microsoft.com/office/drawing/2014/main" id="{7FD19419-6A4B-41DE-AC66-D972DAC3C689}"/>
+              </a:ext>
+            </a:extLst>
+          </p:cNvPr>
+          <p:cNvPicPr>
+            <a:picLocks noChangeAspect="1"/>
+          </p:cNvPicPr>
+          <p:nvPr/>
+        </p:nvPicPr>
+        <p:blipFill>
+          <a:blip r:embed="rId2"/>
+          <a:stretch>
+            <a:fillRect/>
+          </a:stretch>
+        </p:blipFill>
+        <p:spPr>
+          <a:xfrm>
+            <a:off x="87363" y="4508038"/>
+            <a:ext cx="18288000" cy="1113614"/>
+          </a:xfrm>
+          <a:prstGeom prst="rect">
+            <a:avLst/>
+          </a:prstGeom>
+        </p:spPr>
+      </p:pic>
+      <p:pic>
+        <p:nvPicPr>
+          <p:cNvPr id="5" name="Picture 4" descr="A close up of a logo&#10;&#10;Description automatically generated">
+            <a:extLst>
+              <a:ext uri="{FF2B5EF4-FFF2-40B4-BE49-F238E27FC236}">
+                <a16:creationId xmlns:a16="http://schemas.microsoft.com/office/drawing/2014/main" id="{C21F5B15-02F7-45B8-B46B-FFE3C6970006}"/>
+              </a:ext>
+            </a:extLst>
+          </p:cNvPr>
+          <p:cNvPicPr>
+            <a:picLocks noChangeAspect="1"/>
+          </p:cNvPicPr>
+          <p:nvPr/>
+        </p:nvPicPr>
+        <p:blipFill>
+          <a:blip r:embed="rId3"/>
+          <a:stretch>
+            <a:fillRect/>
+          </a:stretch>
+        </p:blipFill>
+        <p:spPr>
+          <a:xfrm>
+            <a:off x="0" y="5455568"/>
+            <a:ext cx="18288000" cy="1237035"/>
+          </a:xfrm>
+          <a:prstGeom prst="rect">
+            <a:avLst/>
+          </a:prstGeom>
+        </p:spPr>
+      </p:pic>
     </p:spTree>
     <p:extLst>
       <p:ext uri="{BB962C8B-B14F-4D97-AF65-F5344CB8AC3E}">
@@ -7342,8 +7375,8 @@
           <a:chExt cx="0" cy="0"/>
         </a:xfrm>
       </p:grpSpPr>
-      <mc:AlternateContent xmlns:mc="http://schemas.openxmlformats.org/markup-compatibility/2006">
-        <mc:Choice xmlns:a14="http://schemas.microsoft.com/office/drawing/2010/main" Requires="a14">
+      <mc:AlternateContent xmlns:mc="http://schemas.openxmlformats.org/markup-compatibility/2006" xmlns:a14="http://schemas.microsoft.com/office/drawing/2010/main">
+        <mc:Choice Requires="a14">
           <p:sp>
             <p:nvSpPr>
               <p:cNvPr id="4" name="TextBox 3"/>
@@ -7377,7 +7410,7 @@
                         <m:sSubPr>
                           <m:ctrlPr>
                             <a:rPr lang="en-US" b="0" i="1" smtClean="0">
-                              <a:latin typeface="Cambria Math" charset="0"/>
+                              <a:latin typeface="Cambria Math" panose="02040503050406030204" pitchFamily="18" charset="0"/>
                               <a:ea typeface="Cambria Math" charset="0"/>
                               <a:cs typeface="Cambria Math" charset="0"/>
                             </a:rPr>
@@ -7440,7 +7473,7 @@
                         <m:sSubPr>
                           <m:ctrlPr>
                             <a:rPr lang="en-US" b="0" i="1" smtClean="0">
-                              <a:latin typeface="Cambria Math" charset="0"/>
+                              <a:latin typeface="Cambria Math" panose="02040503050406030204" pitchFamily="18" charset="0"/>
                               <a:ea typeface="Cambria Math" charset="0"/>
                               <a:cs typeface="Cambria Math" charset="0"/>
                             </a:rPr>
@@ -7487,7 +7520,7 @@
                         <m:fPr>
                           <m:ctrlPr>
                             <a:rPr lang="mr-IN" i="1" smtClean="0">
-                              <a:latin typeface="Cambria Math" charset="0"/>
+                              <a:latin typeface="Cambria Math" panose="02040503050406030204" pitchFamily="18" charset="0"/>
                             </a:rPr>
                           </m:ctrlPr>
                         </m:fPr>
@@ -7502,7 +7535,7 @@
                             <m:dPr>
                               <m:ctrlPr>
                                 <a:rPr lang="en-US" b="0" i="1" smtClean="0">
-                                  <a:latin typeface="Cambria Math" charset="0"/>
+                                  <a:latin typeface="Cambria Math" panose="02040503050406030204" pitchFamily="18" charset="0"/>
                                 </a:rPr>
                               </m:ctrlPr>
                             </m:dPr>
@@ -7511,7 +7544,7 @@
                                 <m:sSubPr>
                                   <m:ctrlPr>
                                     <a:rPr lang="en-US" b="0" i="1" smtClean="0">
-                                      <a:latin typeface="Cambria Math" charset="0"/>
+                                      <a:latin typeface="Cambria Math" panose="02040503050406030204" pitchFamily="18" charset="0"/>
                                     </a:rPr>
                                   </m:ctrlPr>
                                 </m:sSubPr>
@@ -7520,13 +7553,7 @@
                                     <a:rPr lang="en-US" b="0" i="1" smtClean="0">
                                       <a:latin typeface="Cambria Math" charset="0"/>
                                     </a:rPr>
-                                    <m:t>𝑘𝑛</m:t>
-                                  </m:r>
-                                  <m:r>
-                                    <a:rPr lang="en-US" b="0" i="1" smtClean="0">
-                                      <a:latin typeface="Cambria Math" charset="0"/>
-                                    </a:rPr>
-                                    <m:t>𝑜𝑤𝑛</m:t>
+                                    <m:t>𝑘𝑛𝑜𝑤𝑛</m:t>
                                   </m:r>
                                 </m:e>
                                 <m:sub>
@@ -7562,7 +7589,7 @@
                             <m:dPr>
                               <m:ctrlPr>
                                 <a:rPr lang="en-US" b="0" i="1" smtClean="0">
-                                  <a:latin typeface="Cambria Math" charset="0"/>
+                                  <a:latin typeface="Cambria Math" panose="02040503050406030204" pitchFamily="18" charset="0"/>
                                 </a:rPr>
                               </m:ctrlPr>
                             </m:dPr>
@@ -7593,7 +7620,7 @@
                             <m:dPr>
                               <m:ctrlPr>
                                 <a:rPr lang="en-US" b="0" i="1" smtClean="0">
-                                  <a:latin typeface="Cambria Math" charset="0"/>
+                                  <a:latin typeface="Cambria Math" panose="02040503050406030204" pitchFamily="18" charset="0"/>
                                 </a:rPr>
                               </m:ctrlPr>
                             </m:dPr>
@@ -7602,7 +7629,7 @@
                                 <m:sSubPr>
                                   <m:ctrlPr>
                                     <a:rPr lang="en-US" b="0" i="1" smtClean="0">
-                                      <a:latin typeface="Cambria Math" charset="0"/>
+                                      <a:latin typeface="Cambria Math" panose="02040503050406030204" pitchFamily="18" charset="0"/>
                                     </a:rPr>
                                   </m:ctrlPr>
                                 </m:sSubPr>
@@ -7611,13 +7638,7 @@
                                     <a:rPr lang="en-US" b="0" i="1" smtClean="0">
                                       <a:latin typeface="Cambria Math" charset="0"/>
                                     </a:rPr>
-                                    <m:t>𝑘𝑛</m:t>
-                                  </m:r>
-                                  <m:r>
-                                    <a:rPr lang="en-US" b="0" i="1" smtClean="0">
-                                      <a:latin typeface="Cambria Math" charset="0"/>
-                                    </a:rPr>
-                                    <m:t>𝑜𝑤𝑛</m:t>
+                                    <m:t>𝑘𝑛𝑜𝑤𝑛</m:t>
                                   </m:r>
                                 </m:e>
                                 <m:sub>
@@ -7647,7 +7668,7 @@
                             <m:dPr>
                               <m:ctrlPr>
                                 <a:rPr lang="en-US" i="1">
-                                  <a:latin typeface="Cambria Math" charset="0"/>
+                                  <a:latin typeface="Cambria Math" panose="02040503050406030204" pitchFamily="18" charset="0"/>
                                 </a:rPr>
                               </m:ctrlPr>
                             </m:dPr>
@@ -7668,7 +7689,7 @@
                                 <m:dPr>
                                   <m:ctrlPr>
                                     <a:rPr lang="en-US" i="1">
-                                      <a:latin typeface="Cambria Math" charset="0"/>
+                                      <a:latin typeface="Cambria Math" panose="02040503050406030204" pitchFamily="18" charset="0"/>
                                     </a:rPr>
                                   </m:ctrlPr>
                                 </m:dPr>
@@ -7693,7 +7714,7 @@
                             <m:dPr>
                               <m:ctrlPr>
                                 <a:rPr lang="en-US" b="0" i="1" smtClean="0">
-                                  <a:latin typeface="Cambria Math" charset="0"/>
+                                  <a:latin typeface="Cambria Math" panose="02040503050406030204" pitchFamily="18" charset="0"/>
                                 </a:rPr>
                               </m:ctrlPr>
                             </m:dPr>
@@ -7714,7 +7735,7 @@
                                 <m:dPr>
                                   <m:ctrlPr>
                                     <a:rPr lang="en-US" i="1">
-                                      <a:latin typeface="Cambria Math" charset="0"/>
+                                      <a:latin typeface="Cambria Math" panose="02040503050406030204" pitchFamily="18" charset="0"/>
                                     </a:rPr>
                                   </m:ctrlPr>
                                 </m:dPr>
@@ -7723,7 +7744,7 @@
                                     <m:sSubPr>
                                       <m:ctrlPr>
                                         <a:rPr lang="en-US" i="1">
-                                          <a:latin typeface="Cambria Math" charset="0"/>
+                                          <a:latin typeface="Cambria Math" panose="02040503050406030204" pitchFamily="18" charset="0"/>
                                         </a:rPr>
                                       </m:ctrlPr>
                                     </m:sSubPr>
@@ -7800,7 +7821,7 @@
             </p:txBody>
           </p:sp>
         </mc:Choice>
-        <mc:Fallback>
+        <mc:Fallback xmlns="">
           <p:sp>
             <p:nvSpPr>
               <p:cNvPr id="4" name="TextBox 3"/>
@@ -7839,8 +7860,8 @@
           </p:sp>
         </mc:Fallback>
       </mc:AlternateContent>
-      <mc:AlternateContent xmlns:mc="http://schemas.openxmlformats.org/markup-compatibility/2006">
-        <mc:Choice xmlns:a14="http://schemas.microsoft.com/office/drawing/2010/main" Requires="a14">
+      <mc:AlternateContent xmlns:mc="http://schemas.openxmlformats.org/markup-compatibility/2006" xmlns:a14="http://schemas.microsoft.com/office/drawing/2010/main">
+        <mc:Choice Requires="a14">
           <p:sp>
             <p:nvSpPr>
               <p:cNvPr id="5" name="TextBox 4"/>
@@ -7874,7 +7895,7 @@
                         <m:sSubPr>
                           <m:ctrlPr>
                             <a:rPr lang="en-US" b="0" i="1" smtClean="0">
-                              <a:latin typeface="Cambria Math" charset="0"/>
+                              <a:latin typeface="Cambria Math" panose="02040503050406030204" pitchFamily="18" charset="0"/>
                               <a:ea typeface="Cambria Math" charset="0"/>
                               <a:cs typeface="Cambria Math" charset="0"/>
                             </a:rPr>
@@ -7937,7 +7958,7 @@
                         <m:sSubPr>
                           <m:ctrlPr>
                             <a:rPr lang="en-US" b="0" i="1" smtClean="0">
-                              <a:latin typeface="Cambria Math" charset="0"/>
+                              <a:latin typeface="Cambria Math" panose="02040503050406030204" pitchFamily="18" charset="0"/>
                               <a:ea typeface="Cambria Math" charset="0"/>
                               <a:cs typeface="Cambria Math" charset="0"/>
                             </a:rPr>
@@ -7992,7 +8013,7 @@
                         <m:fPr>
                           <m:ctrlPr>
                             <a:rPr lang="mr-IN" i="1" smtClean="0">
-                              <a:latin typeface="Cambria Math" charset="0"/>
+                              <a:latin typeface="Cambria Math" panose="02040503050406030204" pitchFamily="18" charset="0"/>
                             </a:rPr>
                           </m:ctrlPr>
                         </m:fPr>
@@ -8007,7 +8028,7 @@
                             <m:dPr>
                               <m:ctrlPr>
                                 <a:rPr lang="en-US" b="0" i="1" smtClean="0">
-                                  <a:latin typeface="Cambria Math" charset="0"/>
+                                  <a:latin typeface="Cambria Math" panose="02040503050406030204" pitchFamily="18" charset="0"/>
                                 </a:rPr>
                               </m:ctrlPr>
                             </m:dPr>
@@ -8016,7 +8037,7 @@
                                 <m:sSubPr>
                                   <m:ctrlPr>
                                     <a:rPr lang="en-US" b="0" i="1" smtClean="0">
-                                      <a:latin typeface="Cambria Math" charset="0"/>
+                                      <a:latin typeface="Cambria Math" panose="02040503050406030204" pitchFamily="18" charset="0"/>
                                     </a:rPr>
                                   </m:ctrlPr>
                                 </m:sSubPr>
@@ -8025,13 +8046,7 @@
                                     <a:rPr lang="en-US" b="0" i="1" smtClean="0">
                                       <a:latin typeface="Cambria Math" charset="0"/>
                                     </a:rPr>
-                                    <m:t>𝑘𝑛</m:t>
-                                  </m:r>
-                                  <m:r>
-                                    <a:rPr lang="en-US" b="0" i="1" smtClean="0">
-                                      <a:latin typeface="Cambria Math" charset="0"/>
-                                    </a:rPr>
-                                    <m:t>𝑜𝑤𝑛</m:t>
+                                    <m:t>𝑘𝑛𝑜𝑤𝑛</m:t>
                                   </m:r>
                                 </m:e>
                                 <m:sub>
@@ -8067,7 +8082,7 @@
                             <m:dPr>
                               <m:ctrlPr>
                                 <a:rPr lang="en-US" b="0" i="1" smtClean="0">
-                                  <a:latin typeface="Cambria Math" charset="0"/>
+                                  <a:latin typeface="Cambria Math" panose="02040503050406030204" pitchFamily="18" charset="0"/>
                                 </a:rPr>
                               </m:ctrlPr>
                             </m:dPr>
@@ -8092,7 +8107,7 @@
                             <m:dPr>
                               <m:ctrlPr>
                                 <a:rPr lang="en-US" b="0" i="1" smtClean="0">
-                                  <a:latin typeface="Cambria Math" charset="0"/>
+                                  <a:latin typeface="Cambria Math" panose="02040503050406030204" pitchFamily="18" charset="0"/>
                                 </a:rPr>
                               </m:ctrlPr>
                             </m:dPr>
@@ -8101,7 +8116,7 @@
                                 <m:sSubPr>
                                   <m:ctrlPr>
                                     <a:rPr lang="en-US" b="0" i="1" smtClean="0">
-                                      <a:latin typeface="Cambria Math" charset="0"/>
+                                      <a:latin typeface="Cambria Math" panose="02040503050406030204" pitchFamily="18" charset="0"/>
                                     </a:rPr>
                                   </m:ctrlPr>
                                 </m:sSubPr>
@@ -8110,13 +8125,7 @@
                                     <a:rPr lang="en-US" b="0" i="1" smtClean="0">
                                       <a:latin typeface="Cambria Math" charset="0"/>
                                     </a:rPr>
-                                    <m:t>𝑘𝑛</m:t>
-                                  </m:r>
-                                  <m:r>
-                                    <a:rPr lang="en-US" b="0" i="1" smtClean="0">
-                                      <a:latin typeface="Cambria Math" charset="0"/>
-                                    </a:rPr>
-                                    <m:t>𝑜𝑤𝑛</m:t>
+                                    <m:t>𝑘𝑛𝑜𝑤𝑛</m:t>
                                   </m:r>
                                 </m:e>
                                 <m:sub>
@@ -8152,7 +8161,7 @@
                             <m:dPr>
                               <m:ctrlPr>
                                 <a:rPr lang="en-US" i="1">
-                                  <a:latin typeface="Cambria Math" charset="0"/>
+                                  <a:latin typeface="Cambria Math" panose="02040503050406030204" pitchFamily="18" charset="0"/>
                                 </a:rPr>
                               </m:ctrlPr>
                             </m:dPr>
@@ -8175,7 +8184,7 @@
                             <m:dPr>
                               <m:ctrlPr>
                                 <a:rPr lang="en-US" b="0" i="1" smtClean="0">
-                                  <a:latin typeface="Cambria Math" charset="0"/>
+                                  <a:latin typeface="Cambria Math" panose="02040503050406030204" pitchFamily="18" charset="0"/>
                                 </a:rPr>
                               </m:ctrlPr>
                             </m:dPr>
@@ -8196,7 +8205,7 @@
                                 <m:dPr>
                                   <m:ctrlPr>
                                     <a:rPr lang="en-US" i="1">
-                                      <a:latin typeface="Cambria Math" charset="0"/>
+                                      <a:latin typeface="Cambria Math" panose="02040503050406030204" pitchFamily="18" charset="0"/>
                                     </a:rPr>
                                   </m:ctrlPr>
                                 </m:dPr>
@@ -8205,7 +8214,7 @@
                                     <m:sSubPr>
                                       <m:ctrlPr>
                                         <a:rPr lang="en-US" i="1">
-                                          <a:latin typeface="Cambria Math" charset="0"/>
+                                          <a:latin typeface="Cambria Math" panose="02040503050406030204" pitchFamily="18" charset="0"/>
                                         </a:rPr>
                                       </m:ctrlPr>
                                     </m:sSubPr>
@@ -8258,7 +8267,7 @@
                             <m:dPr>
                               <m:ctrlPr>
                                 <a:rPr lang="en-US" b="0" i="1" smtClean="0">
-                                  <a:latin typeface="Cambria Math" charset="0"/>
+                                  <a:latin typeface="Cambria Math" panose="02040503050406030204" pitchFamily="18" charset="0"/>
                                 </a:rPr>
                               </m:ctrlPr>
                             </m:dPr>
@@ -8287,7 +8296,7 @@
             </p:txBody>
           </p:sp>
         </mc:Choice>
-        <mc:Fallback>
+        <mc:Fallback xmlns="">
           <p:sp>
             <p:nvSpPr>
               <p:cNvPr id="5" name="TextBox 4"/>
@@ -8326,8 +8335,8 @@
           </p:sp>
         </mc:Fallback>
       </mc:AlternateContent>
-      <mc:AlternateContent xmlns:mc="http://schemas.openxmlformats.org/markup-compatibility/2006">
-        <mc:Choice xmlns:a14="http://schemas.microsoft.com/office/drawing/2010/main" Requires="a14">
+      <mc:AlternateContent xmlns:mc="http://schemas.openxmlformats.org/markup-compatibility/2006" xmlns:a14="http://schemas.microsoft.com/office/drawing/2010/main">
+        <mc:Choice Requires="a14">
           <p:sp>
             <p:nvSpPr>
               <p:cNvPr id="6" name="TextBox 5"/>
@@ -8361,7 +8370,7 @@
                         <m:sSubPr>
                           <m:ctrlPr>
                             <a:rPr lang="en-US" b="0" i="1" smtClean="0">
-                              <a:latin typeface="Cambria Math" charset="0"/>
+                              <a:latin typeface="Cambria Math" panose="02040503050406030204" pitchFamily="18" charset="0"/>
                               <a:ea typeface="Cambria Math" charset="0"/>
                               <a:cs typeface="Cambria Math" charset="0"/>
                             </a:rPr>
@@ -8417,7 +8426,7 @@
                           <m:begChr m:val="|"/>
                           <m:ctrlPr>
                             <a:rPr lang="en-US" b="0" i="1" smtClean="0">
-                              <a:latin typeface="Cambria Math" charset="0"/>
+                              <a:latin typeface="Cambria Math" panose="02040503050406030204" pitchFamily="18" charset="0"/>
                               <a:ea typeface="Cambria Math" charset="0"/>
                               <a:cs typeface="Cambria Math" charset="0"/>
                             </a:rPr>
@@ -8428,7 +8437,7 @@
                             <m:sSubPr>
                               <m:ctrlPr>
                                 <a:rPr lang="en-US" b="0" i="1" smtClean="0">
-                                  <a:latin typeface="Cambria Math" charset="0"/>
+                                  <a:latin typeface="Cambria Math" panose="02040503050406030204" pitchFamily="18" charset="0"/>
                                   <a:ea typeface="Cambria Math" charset="0"/>
                                   <a:cs typeface="Cambria Math" charset="0"/>
                                 </a:rPr>
@@ -8477,7 +8486,7 @@
                         <m:sSubPr>
                           <m:ctrlPr>
                             <a:rPr lang="en-US" i="1">
-                              <a:latin typeface="Cambria Math" charset="0"/>
+                              <a:latin typeface="Cambria Math" panose="02040503050406030204" pitchFamily="18" charset="0"/>
                               <a:ea typeface="Cambria Math" charset="0"/>
                               <a:cs typeface="Cambria Math" charset="0"/>
                             </a:rPr>
@@ -8541,7 +8550,7 @@
                           <m:begChr m:val="|"/>
                           <m:ctrlPr>
                             <a:rPr lang="en-US" i="1">
-                              <a:latin typeface="Cambria Math" charset="0"/>
+                              <a:latin typeface="Cambria Math" panose="02040503050406030204" pitchFamily="18" charset="0"/>
                               <a:ea typeface="Cambria Math" charset="0"/>
                               <a:cs typeface="Cambria Math" charset="0"/>
                             </a:rPr>
@@ -8552,7 +8561,7 @@
                             <m:sSubPr>
                               <m:ctrlPr>
                                 <a:rPr lang="en-US" i="1">
-                                  <a:latin typeface="Cambria Math" charset="0"/>
+                                  <a:latin typeface="Cambria Math" panose="02040503050406030204" pitchFamily="18" charset="0"/>
                                   <a:ea typeface="Cambria Math" charset="0"/>
                                   <a:cs typeface="Cambria Math" charset="0"/>
                                 </a:rPr>
@@ -8599,7 +8608,7 @@
                         <m:dPr>
                           <m:ctrlPr>
                             <a:rPr lang="en-US" b="0" i="1" smtClean="0">
-                              <a:latin typeface="Cambria Math" charset="0"/>
+                              <a:latin typeface="Cambria Math" panose="02040503050406030204" pitchFamily="18" charset="0"/>
                             </a:rPr>
                           </m:ctrlPr>
                         </m:dPr>
@@ -8614,7 +8623,7 @@
                             <m:sSubPr>
                               <m:ctrlPr>
                                 <a:rPr lang="en-US" i="1">
-                                  <a:latin typeface="Cambria Math" charset="0"/>
+                                  <a:latin typeface="Cambria Math" panose="02040503050406030204" pitchFamily="18" charset="0"/>
                                   <a:ea typeface="Cambria Math" charset="0"/>
                                   <a:cs typeface="Cambria Math" charset="0"/>
                                 </a:rPr>
@@ -8678,7 +8687,7 @@
                               <m:begChr m:val="|"/>
                               <m:ctrlPr>
                                 <a:rPr lang="en-US" i="1">
-                                  <a:latin typeface="Cambria Math" charset="0"/>
+                                  <a:latin typeface="Cambria Math" panose="02040503050406030204" pitchFamily="18" charset="0"/>
                                   <a:ea typeface="Cambria Math" charset="0"/>
                                   <a:cs typeface="Cambria Math" charset="0"/>
                                 </a:rPr>
@@ -8689,7 +8698,7 @@
                                 <m:sSubPr>
                                   <m:ctrlPr>
                                     <a:rPr lang="en-US" i="1">
-                                      <a:latin typeface="Cambria Math" charset="0"/>
+                                      <a:latin typeface="Cambria Math" panose="02040503050406030204" pitchFamily="18" charset="0"/>
                                       <a:ea typeface="Cambria Math" charset="0"/>
                                       <a:cs typeface="Cambria Math" charset="0"/>
                                     </a:rPr>
@@ -8744,7 +8753,7 @@
                         <m:dPr>
                           <m:ctrlPr>
                             <a:rPr lang="en-US" b="0" i="1" smtClean="0">
-                              <a:latin typeface="Cambria Math" charset="0"/>
+                              <a:latin typeface="Cambria Math" panose="02040503050406030204" pitchFamily="18" charset="0"/>
                             </a:rPr>
                           </m:ctrlPr>
                         </m:dPr>
@@ -8772,12 +8781,12 @@
                     </m:oMath>
                   </m:oMathPara>
                 </a14:m>
-                <a:endParaRPr lang="en-US" b="0" dirty="0" smtClean="0"/>
+                <a:endParaRPr lang="en-US" b="0" dirty="0"/>
               </a:p>
             </p:txBody>
           </p:sp>
         </mc:Choice>
-        <mc:Fallback>
+        <mc:Fallback xmlns="">
           <p:sp>
             <p:nvSpPr>
               <p:cNvPr id="6" name="TextBox 5"/>

</xml_diff>

<commit_message>
Change mastery pop up and improve image quality of balloon / clouds.
</commit_message>
<xml_diff>
--- a/images/images.pptx
+++ b/images/images.pptx
@@ -201,7 +201,7 @@
           <a:p>
             <a:fld id="{886F97ED-8CED-CA4C-AC21-E9F1C6F3A2C0}" type="datetimeFigureOut">
               <a:rPr lang="en-US" smtClean="0"/>
-              <a:t>7/20/2019</a:t>
+              <a:t>7/22/2019</a:t>
             </a:fld>
             <a:endParaRPr lang="en-US"/>
           </a:p>
@@ -681,7 +681,7 @@
           <a:p>
             <a:fld id="{65BA97D1-A630-FB46-8B2C-2E138AAEAE44}" type="datetimeFigureOut">
               <a:rPr lang="en-US" smtClean="0"/>
-              <a:t>7/20/2019</a:t>
+              <a:t>7/22/2019</a:t>
             </a:fld>
             <a:endParaRPr lang="en-US"/>
           </a:p>
@@ -849,7 +849,7 @@
           <a:p>
             <a:fld id="{65BA97D1-A630-FB46-8B2C-2E138AAEAE44}" type="datetimeFigureOut">
               <a:rPr lang="en-US" smtClean="0"/>
-              <a:t>7/20/2019</a:t>
+              <a:t>7/22/2019</a:t>
             </a:fld>
             <a:endParaRPr lang="en-US"/>
           </a:p>
@@ -1027,7 +1027,7 @@
           <a:p>
             <a:fld id="{65BA97D1-A630-FB46-8B2C-2E138AAEAE44}" type="datetimeFigureOut">
               <a:rPr lang="en-US" smtClean="0"/>
-              <a:t>7/20/2019</a:t>
+              <a:t>7/22/2019</a:t>
             </a:fld>
             <a:endParaRPr lang="en-US"/>
           </a:p>
@@ -1195,7 +1195,7 @@
           <a:p>
             <a:fld id="{65BA97D1-A630-FB46-8B2C-2E138AAEAE44}" type="datetimeFigureOut">
               <a:rPr lang="en-US" smtClean="0"/>
-              <a:t>7/20/2019</a:t>
+              <a:t>7/22/2019</a:t>
             </a:fld>
             <a:endParaRPr lang="en-US"/>
           </a:p>
@@ -1440,7 +1440,7 @@
           <a:p>
             <a:fld id="{65BA97D1-A630-FB46-8B2C-2E138AAEAE44}" type="datetimeFigureOut">
               <a:rPr lang="en-US" smtClean="0"/>
-              <a:t>7/20/2019</a:t>
+              <a:t>7/22/2019</a:t>
             </a:fld>
             <a:endParaRPr lang="en-US"/>
           </a:p>
@@ -1669,7 +1669,7 @@
           <a:p>
             <a:fld id="{65BA97D1-A630-FB46-8B2C-2E138AAEAE44}" type="datetimeFigureOut">
               <a:rPr lang="en-US" smtClean="0"/>
-              <a:t>7/20/2019</a:t>
+              <a:t>7/22/2019</a:t>
             </a:fld>
             <a:endParaRPr lang="en-US"/>
           </a:p>
@@ -2033,7 +2033,7 @@
           <a:p>
             <a:fld id="{65BA97D1-A630-FB46-8B2C-2E138AAEAE44}" type="datetimeFigureOut">
               <a:rPr lang="en-US" smtClean="0"/>
-              <a:t>7/20/2019</a:t>
+              <a:t>7/22/2019</a:t>
             </a:fld>
             <a:endParaRPr lang="en-US"/>
           </a:p>
@@ -2150,7 +2150,7 @@
           <a:p>
             <a:fld id="{65BA97D1-A630-FB46-8B2C-2E138AAEAE44}" type="datetimeFigureOut">
               <a:rPr lang="en-US" smtClean="0"/>
-              <a:t>7/20/2019</a:t>
+              <a:t>7/22/2019</a:t>
             </a:fld>
             <a:endParaRPr lang="en-US"/>
           </a:p>
@@ -2245,7 +2245,7 @@
           <a:p>
             <a:fld id="{65BA97D1-A630-FB46-8B2C-2E138AAEAE44}" type="datetimeFigureOut">
               <a:rPr lang="en-US" smtClean="0"/>
-              <a:t>7/20/2019</a:t>
+              <a:t>7/22/2019</a:t>
             </a:fld>
             <a:endParaRPr lang="en-US"/>
           </a:p>
@@ -2520,7 +2520,7 @@
           <a:p>
             <a:fld id="{65BA97D1-A630-FB46-8B2C-2E138AAEAE44}" type="datetimeFigureOut">
               <a:rPr lang="en-US" smtClean="0"/>
-              <a:t>7/20/2019</a:t>
+              <a:t>7/22/2019</a:t>
             </a:fld>
             <a:endParaRPr lang="en-US"/>
           </a:p>
@@ -2772,7 +2772,7 @@
           <a:p>
             <a:fld id="{65BA97D1-A630-FB46-8B2C-2E138AAEAE44}" type="datetimeFigureOut">
               <a:rPr lang="en-US" smtClean="0"/>
-              <a:t>7/20/2019</a:t>
+              <a:t>7/22/2019</a:t>
             </a:fld>
             <a:endParaRPr lang="en-US"/>
           </a:p>
@@ -2983,7 +2983,7 @@
           <a:p>
             <a:fld id="{65BA97D1-A630-FB46-8B2C-2E138AAEAE44}" type="datetimeFigureOut">
               <a:rPr lang="en-US" smtClean="0"/>
-              <a:t>7/20/2019</a:t>
+              <a:t>7/22/2019</a:t>
             </a:fld>
             <a:endParaRPr lang="en-US"/>
           </a:p>
@@ -3477,348 +3477,6 @@
           </a:p>
         </p:txBody>
       </p:sp>
-      <p:grpSp>
-        <p:nvGrpSpPr>
-          <p:cNvPr id="15" name="Group 14"/>
-          <p:cNvGrpSpPr/>
-          <p:nvPr/>
-        </p:nvGrpSpPr>
-        <p:grpSpPr>
-          <a:xfrm>
-            <a:off x="1636785" y="1282935"/>
-            <a:ext cx="2044557" cy="2938413"/>
-            <a:chOff x="3708971" y="1479476"/>
-            <a:chExt cx="2044557" cy="2938413"/>
-          </a:xfrm>
-        </p:grpSpPr>
-        <p:sp>
-          <p:nvSpPr>
-            <p:cNvPr id="8" name="Trapezoid 7"/>
-            <p:cNvSpPr/>
-            <p:nvPr/>
-          </p:nvSpPr>
-          <p:spPr>
-            <a:xfrm flipV="1">
-              <a:off x="4376788" y="3883632"/>
-              <a:ext cx="708917" cy="534257"/>
-            </a:xfrm>
-            <a:prstGeom prst="trapezoid">
-              <a:avLst/>
-            </a:prstGeom>
-            <a:solidFill>
-              <a:srgbClr val="947A69"/>
-            </a:solidFill>
-            <a:ln>
-              <a:noFill/>
-            </a:ln>
-          </p:spPr>
-          <p:style>
-            <a:lnRef idx="2">
-              <a:schemeClr val="accent1">
-                <a:shade val="50000"/>
-              </a:schemeClr>
-            </a:lnRef>
-            <a:fillRef idx="1">
-              <a:schemeClr val="accent1"/>
-            </a:fillRef>
-            <a:effectRef idx="0">
-              <a:schemeClr val="accent1"/>
-            </a:effectRef>
-            <a:fontRef idx="minor">
-              <a:schemeClr val="lt1"/>
-            </a:fontRef>
-          </p:style>
-          <p:txBody>
-            <a:bodyPr rtlCol="0" anchor="ctr"/>
-            <a:lstStyle/>
-            <a:p>
-              <a:pPr algn="ctr"/>
-              <a:endParaRPr lang="en-US"/>
-            </a:p>
-          </p:txBody>
-        </p:sp>
-        <p:cxnSp>
-          <p:nvCxnSpPr>
-            <p:cNvPr id="3" name="Straight Connector 2"/>
-            <p:cNvCxnSpPr/>
-            <p:nvPr/>
-          </p:nvCxnSpPr>
-          <p:spPr>
-            <a:xfrm>
-              <a:off x="4376788" y="3493213"/>
-              <a:ext cx="134741" cy="431515"/>
-            </a:xfrm>
-            <a:prstGeom prst="line">
-              <a:avLst/>
-            </a:prstGeom>
-            <a:ln w="38100">
-              <a:solidFill>
-                <a:srgbClr val="947A69"/>
-              </a:solidFill>
-            </a:ln>
-          </p:spPr>
-          <p:style>
-            <a:lnRef idx="1">
-              <a:schemeClr val="accent1"/>
-            </a:lnRef>
-            <a:fillRef idx="0">
-              <a:schemeClr val="accent1"/>
-            </a:fillRef>
-            <a:effectRef idx="0">
-              <a:schemeClr val="accent1"/>
-            </a:effectRef>
-            <a:fontRef idx="minor">
-              <a:schemeClr val="tx1"/>
-            </a:fontRef>
-          </p:style>
-        </p:cxnSp>
-        <p:cxnSp>
-          <p:nvCxnSpPr>
-            <p:cNvPr id="13" name="Straight Connector 12"/>
-            <p:cNvCxnSpPr/>
-            <p:nvPr/>
-          </p:nvCxnSpPr>
-          <p:spPr>
-            <a:xfrm flipH="1">
-              <a:off x="4926244" y="3493213"/>
-              <a:ext cx="134741" cy="431515"/>
-            </a:xfrm>
-            <a:prstGeom prst="line">
-              <a:avLst/>
-            </a:prstGeom>
-            <a:ln w="38100">
-              <a:solidFill>
-                <a:srgbClr val="947A69"/>
-              </a:solidFill>
-            </a:ln>
-          </p:spPr>
-          <p:style>
-            <a:lnRef idx="1">
-              <a:schemeClr val="accent1"/>
-            </a:lnRef>
-            <a:fillRef idx="0">
-              <a:schemeClr val="accent1"/>
-            </a:fillRef>
-            <a:effectRef idx="0">
-              <a:schemeClr val="accent1"/>
-            </a:effectRef>
-            <a:fontRef idx="minor">
-              <a:schemeClr val="tx1"/>
-            </a:fontRef>
-          </p:style>
-        </p:cxnSp>
-        <p:grpSp>
-          <p:nvGrpSpPr>
-            <p:cNvPr id="14" name="Group 13"/>
-            <p:cNvGrpSpPr/>
-            <p:nvPr/>
-          </p:nvGrpSpPr>
-          <p:grpSpPr>
-            <a:xfrm>
-              <a:off x="3708971" y="1479476"/>
-              <a:ext cx="2044557" cy="2137027"/>
-              <a:chOff x="3708971" y="1479476"/>
-              <a:chExt cx="2044557" cy="2137027"/>
-            </a:xfrm>
-          </p:grpSpPr>
-          <p:sp>
-            <p:nvSpPr>
-              <p:cNvPr id="4" name="Oval 3"/>
-              <p:cNvSpPr/>
-              <p:nvPr/>
-            </p:nvSpPr>
-            <p:spPr>
-              <a:xfrm>
-                <a:off x="3708971" y="1479478"/>
-                <a:ext cx="2044557" cy="2137025"/>
-              </a:xfrm>
-              <a:prstGeom prst="ellipse">
-                <a:avLst/>
-              </a:prstGeom>
-              <a:solidFill>
-                <a:schemeClr val="accent5">
-                  <a:lumMod val="60000"/>
-                  <a:lumOff val="40000"/>
-                </a:schemeClr>
-              </a:solidFill>
-              <a:ln>
-                <a:noFill/>
-              </a:ln>
-            </p:spPr>
-            <p:style>
-              <a:lnRef idx="2">
-                <a:schemeClr val="accent1">
-                  <a:shade val="50000"/>
-                </a:schemeClr>
-              </a:lnRef>
-              <a:fillRef idx="1">
-                <a:schemeClr val="accent1"/>
-              </a:fillRef>
-              <a:effectRef idx="0">
-                <a:schemeClr val="accent1"/>
-              </a:effectRef>
-              <a:fontRef idx="minor">
-                <a:schemeClr val="lt1"/>
-              </a:fontRef>
-            </p:style>
-            <p:txBody>
-              <a:bodyPr rtlCol="0" anchor="ctr"/>
-              <a:lstStyle/>
-              <a:p>
-                <a:pPr algn="ctr"/>
-                <a:endParaRPr lang="en-US"/>
-              </a:p>
-            </p:txBody>
-          </p:sp>
-          <p:sp>
-            <p:nvSpPr>
-              <p:cNvPr id="5" name="Oval 4"/>
-              <p:cNvSpPr/>
-              <p:nvPr/>
-            </p:nvSpPr>
-            <p:spPr>
-              <a:xfrm>
-                <a:off x="3929008" y="1479477"/>
-                <a:ext cx="1604481" cy="2137025"/>
-              </a:xfrm>
-              <a:prstGeom prst="ellipse">
-                <a:avLst/>
-              </a:prstGeom>
-              <a:solidFill>
-                <a:schemeClr val="accent6">
-                  <a:lumMod val="40000"/>
-                  <a:lumOff val="60000"/>
-                </a:schemeClr>
-              </a:solidFill>
-              <a:ln>
-                <a:noFill/>
-              </a:ln>
-            </p:spPr>
-            <p:style>
-              <a:lnRef idx="2">
-                <a:schemeClr val="accent1">
-                  <a:shade val="50000"/>
-                </a:schemeClr>
-              </a:lnRef>
-              <a:fillRef idx="1">
-                <a:schemeClr val="accent1"/>
-              </a:fillRef>
-              <a:effectRef idx="0">
-                <a:schemeClr val="accent1"/>
-              </a:effectRef>
-              <a:fontRef idx="minor">
-                <a:schemeClr val="lt1"/>
-              </a:fontRef>
-            </p:style>
-            <p:txBody>
-              <a:bodyPr rtlCol="0" anchor="ctr"/>
-              <a:lstStyle/>
-              <a:p>
-                <a:pPr algn="ctr"/>
-                <a:endParaRPr lang="en-US"/>
-              </a:p>
-            </p:txBody>
-          </p:sp>
-          <p:sp>
-            <p:nvSpPr>
-              <p:cNvPr id="6" name="Oval 5"/>
-              <p:cNvSpPr/>
-              <p:nvPr/>
-            </p:nvSpPr>
-            <p:spPr>
-              <a:xfrm>
-                <a:off x="4218824" y="1479476"/>
-                <a:ext cx="1024848" cy="2137025"/>
-              </a:xfrm>
-              <a:prstGeom prst="ellipse">
-                <a:avLst/>
-              </a:prstGeom>
-              <a:solidFill>
-                <a:schemeClr val="accent4">
-                  <a:lumMod val="40000"/>
-                  <a:lumOff val="60000"/>
-                </a:schemeClr>
-              </a:solidFill>
-              <a:ln>
-                <a:noFill/>
-              </a:ln>
-            </p:spPr>
-            <p:style>
-              <a:lnRef idx="2">
-                <a:schemeClr val="accent1">
-                  <a:shade val="50000"/>
-                </a:schemeClr>
-              </a:lnRef>
-              <a:fillRef idx="1">
-                <a:schemeClr val="accent1"/>
-              </a:fillRef>
-              <a:effectRef idx="0">
-                <a:schemeClr val="accent1"/>
-              </a:effectRef>
-              <a:fontRef idx="minor">
-                <a:schemeClr val="lt1"/>
-              </a:fontRef>
-            </p:style>
-            <p:txBody>
-              <a:bodyPr rtlCol="0" anchor="ctr"/>
-              <a:lstStyle/>
-              <a:p>
-                <a:pPr algn="ctr"/>
-                <a:endParaRPr lang="en-US" dirty="0"/>
-              </a:p>
-            </p:txBody>
-          </p:sp>
-          <p:sp>
-            <p:nvSpPr>
-              <p:cNvPr id="7" name="Oval 6"/>
-              <p:cNvSpPr/>
-              <p:nvPr/>
-            </p:nvSpPr>
-            <p:spPr>
-              <a:xfrm>
-                <a:off x="4511529" y="1479476"/>
-                <a:ext cx="439437" cy="2137025"/>
-              </a:xfrm>
-              <a:prstGeom prst="ellipse">
-                <a:avLst/>
-              </a:prstGeom>
-              <a:solidFill>
-                <a:schemeClr val="accent2">
-                  <a:lumMod val="40000"/>
-                  <a:lumOff val="60000"/>
-                </a:schemeClr>
-              </a:solidFill>
-              <a:ln>
-                <a:noFill/>
-              </a:ln>
-            </p:spPr>
-            <p:style>
-              <a:lnRef idx="2">
-                <a:schemeClr val="accent1">
-                  <a:shade val="50000"/>
-                </a:schemeClr>
-              </a:lnRef>
-              <a:fillRef idx="1">
-                <a:schemeClr val="accent1"/>
-              </a:fillRef>
-              <a:effectRef idx="0">
-                <a:schemeClr val="accent1"/>
-              </a:effectRef>
-              <a:fontRef idx="minor">
-                <a:schemeClr val="lt1"/>
-              </a:fontRef>
-            </p:style>
-            <p:txBody>
-              <a:bodyPr rtlCol="0" anchor="ctr"/>
-              <a:lstStyle/>
-              <a:p>
-                <a:pPr algn="ctr"/>
-                <a:endParaRPr lang="en-US"/>
-              </a:p>
-            </p:txBody>
-          </p:sp>
-        </p:grpSp>
-      </p:grpSp>
       <p:sp>
         <p:nvSpPr>
           <p:cNvPr id="18" name="Freeform 17"/>
@@ -4115,21 +3773,2236 @@
       </p:sp>
       <p:grpSp>
         <p:nvGrpSpPr>
-          <p:cNvPr id="16" name="Group 15"/>
+          <p:cNvPr id="104" name="Group 103">
+            <a:extLst>
+              <a:ext uri="{FF2B5EF4-FFF2-40B4-BE49-F238E27FC236}">
+                <a16:creationId xmlns:a16="http://schemas.microsoft.com/office/drawing/2014/main" id="{F02777BD-1EE1-4EE7-9975-4FDD9940295D}"/>
+              </a:ext>
+            </a:extLst>
+          </p:cNvPr>
+          <p:cNvGrpSpPr>
+            <a:grpSpLocks noChangeAspect="1"/>
+          </p:cNvGrpSpPr>
+          <p:nvPr/>
+        </p:nvGrpSpPr>
+        <p:grpSpPr>
+          <a:xfrm>
+            <a:off x="2047777" y="-2537938"/>
+            <a:ext cx="5029200" cy="8105287"/>
+            <a:chOff x="1239931" y="-353088"/>
+            <a:chExt cx="2834640" cy="4568436"/>
+          </a:xfrm>
+        </p:grpSpPr>
+        <p:grpSp>
+          <p:nvGrpSpPr>
+            <p:cNvPr id="15" name="Group 14"/>
+            <p:cNvGrpSpPr/>
+            <p:nvPr/>
+          </p:nvGrpSpPr>
+          <p:grpSpPr>
+            <a:xfrm>
+              <a:off x="1636785" y="1276935"/>
+              <a:ext cx="2044557" cy="2938413"/>
+              <a:chOff x="3708971" y="1479476"/>
+              <a:chExt cx="2044557" cy="2938413"/>
+            </a:xfrm>
+          </p:grpSpPr>
+          <p:sp>
+            <p:nvSpPr>
+              <p:cNvPr id="8" name="Trapezoid 7"/>
+              <p:cNvSpPr/>
+              <p:nvPr/>
+            </p:nvSpPr>
+            <p:spPr>
+              <a:xfrm flipV="1">
+                <a:off x="4376788" y="3883632"/>
+                <a:ext cx="708917" cy="534257"/>
+              </a:xfrm>
+              <a:prstGeom prst="trapezoid">
+                <a:avLst/>
+              </a:prstGeom>
+              <a:solidFill>
+                <a:srgbClr val="947A69"/>
+              </a:solidFill>
+              <a:ln>
+                <a:noFill/>
+              </a:ln>
+            </p:spPr>
+            <p:style>
+              <a:lnRef idx="2">
+                <a:schemeClr val="accent1">
+                  <a:shade val="50000"/>
+                </a:schemeClr>
+              </a:lnRef>
+              <a:fillRef idx="1">
+                <a:schemeClr val="accent1"/>
+              </a:fillRef>
+              <a:effectRef idx="0">
+                <a:schemeClr val="accent1"/>
+              </a:effectRef>
+              <a:fontRef idx="minor">
+                <a:schemeClr val="lt1"/>
+              </a:fontRef>
+            </p:style>
+            <p:txBody>
+              <a:bodyPr rtlCol="0" anchor="ctr"/>
+              <a:lstStyle/>
+              <a:p>
+                <a:pPr algn="ctr"/>
+                <a:endParaRPr lang="en-US" sz="1600"/>
+              </a:p>
+            </p:txBody>
+          </p:sp>
+          <p:cxnSp>
+            <p:nvCxnSpPr>
+              <p:cNvPr id="3" name="Straight Connector 2"/>
+              <p:cNvCxnSpPr/>
+              <p:nvPr/>
+            </p:nvCxnSpPr>
+            <p:spPr>
+              <a:xfrm>
+                <a:off x="4376788" y="3493212"/>
+                <a:ext cx="134741" cy="431515"/>
+              </a:xfrm>
+              <a:prstGeom prst="line">
+                <a:avLst/>
+              </a:prstGeom>
+              <a:ln w="76200">
+                <a:solidFill>
+                  <a:srgbClr val="947A69"/>
+                </a:solidFill>
+              </a:ln>
+            </p:spPr>
+            <p:style>
+              <a:lnRef idx="1">
+                <a:schemeClr val="accent1"/>
+              </a:lnRef>
+              <a:fillRef idx="0">
+                <a:schemeClr val="accent1"/>
+              </a:fillRef>
+              <a:effectRef idx="0">
+                <a:schemeClr val="accent1"/>
+              </a:effectRef>
+              <a:fontRef idx="minor">
+                <a:schemeClr val="tx1"/>
+              </a:fontRef>
+            </p:style>
+          </p:cxnSp>
+          <p:cxnSp>
+            <p:nvCxnSpPr>
+              <p:cNvPr id="13" name="Straight Connector 12"/>
+              <p:cNvCxnSpPr/>
+              <p:nvPr/>
+            </p:nvCxnSpPr>
+            <p:spPr>
+              <a:xfrm flipH="1">
+                <a:off x="4926244" y="3493213"/>
+                <a:ext cx="134741" cy="431515"/>
+              </a:xfrm>
+              <a:prstGeom prst="line">
+                <a:avLst/>
+              </a:prstGeom>
+              <a:ln w="76200">
+                <a:solidFill>
+                  <a:srgbClr val="947A69"/>
+                </a:solidFill>
+              </a:ln>
+            </p:spPr>
+            <p:style>
+              <a:lnRef idx="1">
+                <a:schemeClr val="accent1"/>
+              </a:lnRef>
+              <a:fillRef idx="0">
+                <a:schemeClr val="accent1"/>
+              </a:fillRef>
+              <a:effectRef idx="0">
+                <a:schemeClr val="accent1"/>
+              </a:effectRef>
+              <a:fontRef idx="minor">
+                <a:schemeClr val="tx1"/>
+              </a:fontRef>
+            </p:style>
+          </p:cxnSp>
+          <p:grpSp>
+            <p:nvGrpSpPr>
+              <p:cNvPr id="14" name="Group 13"/>
+              <p:cNvGrpSpPr/>
+              <p:nvPr/>
+            </p:nvGrpSpPr>
+            <p:grpSpPr>
+              <a:xfrm>
+                <a:off x="3708971" y="1479476"/>
+                <a:ext cx="2044557" cy="2137027"/>
+                <a:chOff x="3708971" y="1479476"/>
+                <a:chExt cx="2044557" cy="2137027"/>
+              </a:xfrm>
+            </p:grpSpPr>
+            <p:sp>
+              <p:nvSpPr>
+                <p:cNvPr id="4" name="Oval 3"/>
+                <p:cNvSpPr/>
+                <p:nvPr/>
+              </p:nvSpPr>
+              <p:spPr>
+                <a:xfrm>
+                  <a:off x="3708971" y="1479478"/>
+                  <a:ext cx="2044557" cy="2137025"/>
+                </a:xfrm>
+                <a:prstGeom prst="ellipse">
+                  <a:avLst/>
+                </a:prstGeom>
+                <a:solidFill>
+                  <a:schemeClr val="accent5">
+                    <a:lumMod val="60000"/>
+                    <a:lumOff val="40000"/>
+                  </a:schemeClr>
+                </a:solidFill>
+                <a:ln>
+                  <a:noFill/>
+                </a:ln>
+              </p:spPr>
+              <p:style>
+                <a:lnRef idx="2">
+                  <a:schemeClr val="accent1">
+                    <a:shade val="50000"/>
+                  </a:schemeClr>
+                </a:lnRef>
+                <a:fillRef idx="1">
+                  <a:schemeClr val="accent1"/>
+                </a:fillRef>
+                <a:effectRef idx="0">
+                  <a:schemeClr val="accent1"/>
+                </a:effectRef>
+                <a:fontRef idx="minor">
+                  <a:schemeClr val="lt1"/>
+                </a:fontRef>
+              </p:style>
+              <p:txBody>
+                <a:bodyPr rtlCol="0" anchor="ctr"/>
+                <a:lstStyle/>
+                <a:p>
+                  <a:pPr algn="ctr"/>
+                  <a:endParaRPr lang="en-US" sz="1600" dirty="0"/>
+                </a:p>
+              </p:txBody>
+            </p:sp>
+            <p:sp>
+              <p:nvSpPr>
+                <p:cNvPr id="5" name="Oval 4"/>
+                <p:cNvSpPr/>
+                <p:nvPr/>
+              </p:nvSpPr>
+              <p:spPr>
+                <a:xfrm>
+                  <a:off x="3929008" y="1479477"/>
+                  <a:ext cx="1604481" cy="2137025"/>
+                </a:xfrm>
+                <a:prstGeom prst="ellipse">
+                  <a:avLst/>
+                </a:prstGeom>
+                <a:solidFill>
+                  <a:schemeClr val="accent6">
+                    <a:lumMod val="40000"/>
+                    <a:lumOff val="60000"/>
+                  </a:schemeClr>
+                </a:solidFill>
+                <a:ln>
+                  <a:noFill/>
+                </a:ln>
+              </p:spPr>
+              <p:style>
+                <a:lnRef idx="2">
+                  <a:schemeClr val="accent1">
+                    <a:shade val="50000"/>
+                  </a:schemeClr>
+                </a:lnRef>
+                <a:fillRef idx="1">
+                  <a:schemeClr val="accent1"/>
+                </a:fillRef>
+                <a:effectRef idx="0">
+                  <a:schemeClr val="accent1"/>
+                </a:effectRef>
+                <a:fontRef idx="minor">
+                  <a:schemeClr val="lt1"/>
+                </a:fontRef>
+              </p:style>
+              <p:txBody>
+                <a:bodyPr rtlCol="0" anchor="ctr"/>
+                <a:lstStyle/>
+                <a:p>
+                  <a:pPr algn="ctr"/>
+                  <a:endParaRPr lang="en-US" sz="1600" dirty="0"/>
+                </a:p>
+              </p:txBody>
+            </p:sp>
+            <p:sp>
+              <p:nvSpPr>
+                <p:cNvPr id="6" name="Oval 5"/>
+                <p:cNvSpPr/>
+                <p:nvPr/>
+              </p:nvSpPr>
+              <p:spPr>
+                <a:xfrm>
+                  <a:off x="4218824" y="1479476"/>
+                  <a:ext cx="1024848" cy="2137025"/>
+                </a:xfrm>
+                <a:prstGeom prst="ellipse">
+                  <a:avLst/>
+                </a:prstGeom>
+                <a:solidFill>
+                  <a:schemeClr val="accent4">
+                    <a:lumMod val="40000"/>
+                    <a:lumOff val="60000"/>
+                  </a:schemeClr>
+                </a:solidFill>
+                <a:ln>
+                  <a:noFill/>
+                </a:ln>
+              </p:spPr>
+              <p:style>
+                <a:lnRef idx="2">
+                  <a:schemeClr val="accent1">
+                    <a:shade val="50000"/>
+                  </a:schemeClr>
+                </a:lnRef>
+                <a:fillRef idx="1">
+                  <a:schemeClr val="accent1"/>
+                </a:fillRef>
+                <a:effectRef idx="0">
+                  <a:schemeClr val="accent1"/>
+                </a:effectRef>
+                <a:fontRef idx="minor">
+                  <a:schemeClr val="lt1"/>
+                </a:fontRef>
+              </p:style>
+              <p:txBody>
+                <a:bodyPr rtlCol="0" anchor="ctr"/>
+                <a:lstStyle/>
+                <a:p>
+                  <a:pPr algn="ctr"/>
+                  <a:endParaRPr lang="en-US" sz="1600" dirty="0"/>
+                </a:p>
+              </p:txBody>
+            </p:sp>
+            <p:sp>
+              <p:nvSpPr>
+                <p:cNvPr id="7" name="Oval 6"/>
+                <p:cNvSpPr/>
+                <p:nvPr/>
+              </p:nvSpPr>
+              <p:spPr>
+                <a:xfrm>
+                  <a:off x="4511529" y="1479476"/>
+                  <a:ext cx="439437" cy="2137025"/>
+                </a:xfrm>
+                <a:prstGeom prst="ellipse">
+                  <a:avLst/>
+                </a:prstGeom>
+                <a:solidFill>
+                  <a:schemeClr val="accent2">
+                    <a:lumMod val="40000"/>
+                    <a:lumOff val="60000"/>
+                  </a:schemeClr>
+                </a:solidFill>
+                <a:ln>
+                  <a:noFill/>
+                </a:ln>
+              </p:spPr>
+              <p:style>
+                <a:lnRef idx="2">
+                  <a:schemeClr val="accent1">
+                    <a:shade val="50000"/>
+                  </a:schemeClr>
+                </a:lnRef>
+                <a:fillRef idx="1">
+                  <a:schemeClr val="accent1"/>
+                </a:fillRef>
+                <a:effectRef idx="0">
+                  <a:schemeClr val="accent1"/>
+                </a:effectRef>
+                <a:fontRef idx="minor">
+                  <a:schemeClr val="lt1"/>
+                </a:fontRef>
+              </p:style>
+              <p:txBody>
+                <a:bodyPr rtlCol="0" anchor="ctr"/>
+                <a:lstStyle/>
+                <a:p>
+                  <a:pPr algn="ctr"/>
+                  <a:endParaRPr lang="en-US" sz="1600" dirty="0"/>
+                </a:p>
+              </p:txBody>
+            </p:sp>
+          </p:grpSp>
+        </p:grpSp>
+        <p:grpSp>
+          <p:nvGrpSpPr>
+            <p:cNvPr id="48" name="Group 47">
+              <a:extLst>
+                <a:ext uri="{FF2B5EF4-FFF2-40B4-BE49-F238E27FC236}">
+                  <a16:creationId xmlns:a16="http://schemas.microsoft.com/office/drawing/2014/main" id="{7CC0D570-0423-42CA-A785-9E3C5E6E3839}"/>
+                </a:ext>
+              </a:extLst>
+            </p:cNvPr>
+            <p:cNvGrpSpPr/>
+            <p:nvPr/>
+          </p:nvGrpSpPr>
+          <p:grpSpPr>
+            <a:xfrm>
+              <a:off x="1490291" y="-309402"/>
+              <a:ext cx="2337538" cy="2687164"/>
+              <a:chOff x="1490290" y="-309403"/>
+              <a:chExt cx="2337536" cy="2687166"/>
+            </a:xfrm>
+          </p:grpSpPr>
+          <p:sp>
+            <p:nvSpPr>
+              <p:cNvPr id="30" name="Isosceles Triangle 29">
+                <a:extLst>
+                  <a:ext uri="{FF2B5EF4-FFF2-40B4-BE49-F238E27FC236}">
+                    <a16:creationId xmlns:a16="http://schemas.microsoft.com/office/drawing/2014/main" id="{9DAA899D-DEA0-4B80-91CA-D67DBA282513}"/>
+                  </a:ext>
+                </a:extLst>
+              </p:cNvPr>
+              <p:cNvSpPr>
+                <a:spLocks noChangeAspect="1"/>
+              </p:cNvSpPr>
+              <p:nvPr/>
+            </p:nvSpPr>
+            <p:spPr>
+              <a:xfrm rot="12848413">
+                <a:off x="1752186" y="1780508"/>
+                <a:ext cx="274320" cy="347846"/>
+              </a:xfrm>
+              <a:prstGeom prst="triangle">
+                <a:avLst/>
+              </a:prstGeom>
+              <a:solidFill>
+                <a:srgbClr val="FFFFFF"/>
+              </a:solidFill>
+              <a:ln>
+                <a:noFill/>
+              </a:ln>
+            </p:spPr>
+            <p:style>
+              <a:lnRef idx="2">
+                <a:schemeClr val="accent1">
+                  <a:shade val="50000"/>
+                </a:schemeClr>
+              </a:lnRef>
+              <a:fillRef idx="1">
+                <a:schemeClr val="accent1"/>
+              </a:fillRef>
+              <a:effectRef idx="0">
+                <a:schemeClr val="accent1"/>
+              </a:effectRef>
+              <a:fontRef idx="minor">
+                <a:schemeClr val="lt1"/>
+              </a:fontRef>
+            </p:style>
+            <p:txBody>
+              <a:bodyPr wrap="square" rtlCol="0" anchor="ctr">
+                <a:noAutofit/>
+              </a:bodyPr>
+              <a:lstStyle/>
+              <a:p>
+                <a:pPr algn="ctr"/>
+                <a:endParaRPr lang="en-US" sz="1600" dirty="0">
+                  <a:solidFill>
+                    <a:srgbClr val="947A69"/>
+                  </a:solidFill>
+                  <a:latin typeface="Karla" pitchFamily="2" charset="0"/>
+                </a:endParaRPr>
+              </a:p>
+            </p:txBody>
+          </p:sp>
+          <p:sp>
+            <p:nvSpPr>
+              <p:cNvPr id="31" name="Isosceles Triangle 30">
+                <a:extLst>
+                  <a:ext uri="{FF2B5EF4-FFF2-40B4-BE49-F238E27FC236}">
+                    <a16:creationId xmlns:a16="http://schemas.microsoft.com/office/drawing/2014/main" id="{B3C627E1-56FD-4620-85B9-C98611C3655B}"/>
+                  </a:ext>
+                </a:extLst>
+              </p:cNvPr>
+              <p:cNvSpPr>
+                <a:spLocks noChangeAspect="1"/>
+              </p:cNvSpPr>
+              <p:nvPr/>
+            </p:nvSpPr>
+            <p:spPr>
+              <a:xfrm rot="12273342">
+                <a:off x="1977708" y="1911379"/>
+                <a:ext cx="274320" cy="347846"/>
+              </a:xfrm>
+              <a:prstGeom prst="triangle">
+                <a:avLst/>
+              </a:prstGeom>
+              <a:solidFill>
+                <a:srgbClr val="FFFFFF"/>
+              </a:solidFill>
+              <a:ln>
+                <a:noFill/>
+              </a:ln>
+            </p:spPr>
+            <p:style>
+              <a:lnRef idx="2">
+                <a:schemeClr val="accent1">
+                  <a:shade val="50000"/>
+                </a:schemeClr>
+              </a:lnRef>
+              <a:fillRef idx="1">
+                <a:schemeClr val="accent1"/>
+              </a:fillRef>
+              <a:effectRef idx="0">
+                <a:schemeClr val="accent1"/>
+              </a:effectRef>
+              <a:fontRef idx="minor">
+                <a:schemeClr val="lt1"/>
+              </a:fontRef>
+            </p:style>
+            <p:txBody>
+              <a:bodyPr wrap="square" rtlCol="0" anchor="ctr">
+                <a:noAutofit/>
+              </a:bodyPr>
+              <a:lstStyle/>
+              <a:p>
+                <a:pPr algn="ctr"/>
+                <a:endParaRPr lang="en-US" sz="1600" dirty="0">
+                  <a:solidFill>
+                    <a:srgbClr val="947A69"/>
+                  </a:solidFill>
+                  <a:latin typeface="Karla" pitchFamily="2" charset="0"/>
+                </a:endParaRPr>
+              </a:p>
+            </p:txBody>
+          </p:sp>
+          <p:sp>
+            <p:nvSpPr>
+              <p:cNvPr id="32" name="Isosceles Triangle 31">
+                <a:extLst>
+                  <a:ext uri="{FF2B5EF4-FFF2-40B4-BE49-F238E27FC236}">
+                    <a16:creationId xmlns:a16="http://schemas.microsoft.com/office/drawing/2014/main" id="{8E9DE328-8DE3-4D86-86A6-D20A72CE68A9}"/>
+                  </a:ext>
+                </a:extLst>
+              </p:cNvPr>
+              <p:cNvSpPr>
+                <a:spLocks noChangeAspect="1"/>
+              </p:cNvSpPr>
+              <p:nvPr/>
+            </p:nvSpPr>
+            <p:spPr>
+              <a:xfrm rot="11517450">
+                <a:off x="2240710" y="1994838"/>
+                <a:ext cx="274320" cy="347846"/>
+              </a:xfrm>
+              <a:prstGeom prst="triangle">
+                <a:avLst/>
+              </a:prstGeom>
+              <a:solidFill>
+                <a:srgbClr val="FFFFFF"/>
+              </a:solidFill>
+              <a:ln>
+                <a:noFill/>
+              </a:ln>
+            </p:spPr>
+            <p:style>
+              <a:lnRef idx="2">
+                <a:schemeClr val="accent1">
+                  <a:shade val="50000"/>
+                </a:schemeClr>
+              </a:lnRef>
+              <a:fillRef idx="1">
+                <a:schemeClr val="accent1"/>
+              </a:fillRef>
+              <a:effectRef idx="0">
+                <a:schemeClr val="accent1"/>
+              </a:effectRef>
+              <a:fontRef idx="minor">
+                <a:schemeClr val="lt1"/>
+              </a:fontRef>
+            </p:style>
+            <p:txBody>
+              <a:bodyPr wrap="square" rtlCol="0" anchor="ctr">
+                <a:noAutofit/>
+              </a:bodyPr>
+              <a:lstStyle/>
+              <a:p>
+                <a:pPr algn="ctr"/>
+                <a:endParaRPr lang="en-US" sz="1600" dirty="0">
+                  <a:solidFill>
+                    <a:srgbClr val="947A69"/>
+                  </a:solidFill>
+                  <a:latin typeface="Karla" pitchFamily="2" charset="0"/>
+                </a:endParaRPr>
+              </a:p>
+            </p:txBody>
+          </p:sp>
+          <p:sp>
+            <p:nvSpPr>
+              <p:cNvPr id="33" name="Isosceles Triangle 32">
+                <a:extLst>
+                  <a:ext uri="{FF2B5EF4-FFF2-40B4-BE49-F238E27FC236}">
+                    <a16:creationId xmlns:a16="http://schemas.microsoft.com/office/drawing/2014/main" id="{BB940DF3-F83A-4CF0-81AC-6951542BFE32}"/>
+                  </a:ext>
+                </a:extLst>
+              </p:cNvPr>
+              <p:cNvSpPr>
+                <a:spLocks noChangeAspect="1"/>
+              </p:cNvSpPr>
+              <p:nvPr/>
+            </p:nvSpPr>
+            <p:spPr>
+              <a:xfrm rot="10800000">
+                <a:off x="2521750" y="2029917"/>
+                <a:ext cx="274320" cy="347846"/>
+              </a:xfrm>
+              <a:prstGeom prst="triangle">
+                <a:avLst/>
+              </a:prstGeom>
+              <a:solidFill>
+                <a:srgbClr val="FFFFFF"/>
+              </a:solidFill>
+              <a:ln>
+                <a:noFill/>
+              </a:ln>
+            </p:spPr>
+            <p:style>
+              <a:lnRef idx="2">
+                <a:schemeClr val="accent1">
+                  <a:shade val="50000"/>
+                </a:schemeClr>
+              </a:lnRef>
+              <a:fillRef idx="1">
+                <a:schemeClr val="accent1"/>
+              </a:fillRef>
+              <a:effectRef idx="0">
+                <a:schemeClr val="accent1"/>
+              </a:effectRef>
+              <a:fontRef idx="minor">
+                <a:schemeClr val="lt1"/>
+              </a:fontRef>
+            </p:style>
+            <p:txBody>
+              <a:bodyPr wrap="square" rtlCol="0" anchor="ctr">
+                <a:noAutofit/>
+              </a:bodyPr>
+              <a:lstStyle/>
+              <a:p>
+                <a:pPr algn="ctr"/>
+                <a:endParaRPr lang="en-US" sz="1600" dirty="0">
+                  <a:solidFill>
+                    <a:srgbClr val="947A69"/>
+                  </a:solidFill>
+                  <a:latin typeface="Karla" pitchFamily="2" charset="0"/>
+                </a:endParaRPr>
+              </a:p>
+            </p:txBody>
+          </p:sp>
+          <p:sp>
+            <p:nvSpPr>
+              <p:cNvPr id="34" name="Isosceles Triangle 33">
+                <a:extLst>
+                  <a:ext uri="{FF2B5EF4-FFF2-40B4-BE49-F238E27FC236}">
+                    <a16:creationId xmlns:a16="http://schemas.microsoft.com/office/drawing/2014/main" id="{FE6891BE-F7B2-4653-9A6C-61429484F342}"/>
+                  </a:ext>
+                </a:extLst>
+              </p:cNvPr>
+              <p:cNvSpPr>
+                <a:spLocks noChangeAspect="1"/>
+              </p:cNvSpPr>
+              <p:nvPr/>
+            </p:nvSpPr>
+            <p:spPr>
+              <a:xfrm rot="8751587" flipH="1">
+                <a:off x="3283834" y="1788865"/>
+                <a:ext cx="274320" cy="347846"/>
+              </a:xfrm>
+              <a:prstGeom prst="triangle">
+                <a:avLst/>
+              </a:prstGeom>
+              <a:solidFill>
+                <a:srgbClr val="FFFFFF"/>
+              </a:solidFill>
+              <a:ln>
+                <a:noFill/>
+              </a:ln>
+            </p:spPr>
+            <p:style>
+              <a:lnRef idx="2">
+                <a:schemeClr val="accent1">
+                  <a:shade val="50000"/>
+                </a:schemeClr>
+              </a:lnRef>
+              <a:fillRef idx="1">
+                <a:schemeClr val="accent1"/>
+              </a:fillRef>
+              <a:effectRef idx="0">
+                <a:schemeClr val="accent1"/>
+              </a:effectRef>
+              <a:fontRef idx="minor">
+                <a:schemeClr val="lt1"/>
+              </a:fontRef>
+            </p:style>
+            <p:txBody>
+              <a:bodyPr wrap="square" rtlCol="0" anchor="ctr">
+                <a:noAutofit/>
+              </a:bodyPr>
+              <a:lstStyle/>
+              <a:p>
+                <a:pPr algn="ctr"/>
+                <a:endParaRPr lang="en-US" sz="1600" dirty="0">
+                  <a:solidFill>
+                    <a:srgbClr val="947A69"/>
+                  </a:solidFill>
+                  <a:latin typeface="Karla" pitchFamily="2" charset="0"/>
+                </a:endParaRPr>
+              </a:p>
+            </p:txBody>
+          </p:sp>
+          <p:sp>
+            <p:nvSpPr>
+              <p:cNvPr id="35" name="Isosceles Triangle 34">
+                <a:extLst>
+                  <a:ext uri="{FF2B5EF4-FFF2-40B4-BE49-F238E27FC236}">
+                    <a16:creationId xmlns:a16="http://schemas.microsoft.com/office/drawing/2014/main" id="{5691CAC4-6350-4434-9C8F-4AAB951567AE}"/>
+                  </a:ext>
+                </a:extLst>
+              </p:cNvPr>
+              <p:cNvSpPr>
+                <a:spLocks noChangeAspect="1"/>
+              </p:cNvSpPr>
+              <p:nvPr/>
+            </p:nvSpPr>
+            <p:spPr>
+              <a:xfrm rot="9326658" flipH="1">
+                <a:off x="3054355" y="1918417"/>
+                <a:ext cx="274320" cy="347846"/>
+              </a:xfrm>
+              <a:prstGeom prst="triangle">
+                <a:avLst/>
+              </a:prstGeom>
+              <a:solidFill>
+                <a:srgbClr val="FFFFFF"/>
+              </a:solidFill>
+              <a:ln>
+                <a:noFill/>
+              </a:ln>
+            </p:spPr>
+            <p:style>
+              <a:lnRef idx="2">
+                <a:schemeClr val="accent1">
+                  <a:shade val="50000"/>
+                </a:schemeClr>
+              </a:lnRef>
+              <a:fillRef idx="1">
+                <a:schemeClr val="accent1"/>
+              </a:fillRef>
+              <a:effectRef idx="0">
+                <a:schemeClr val="accent1"/>
+              </a:effectRef>
+              <a:fontRef idx="minor">
+                <a:schemeClr val="lt1"/>
+              </a:fontRef>
+            </p:style>
+            <p:txBody>
+              <a:bodyPr wrap="square" rtlCol="0" anchor="ctr">
+                <a:noAutofit/>
+              </a:bodyPr>
+              <a:lstStyle/>
+              <a:p>
+                <a:pPr algn="ctr"/>
+                <a:endParaRPr lang="en-US" sz="1600" dirty="0">
+                  <a:solidFill>
+                    <a:srgbClr val="947A69"/>
+                  </a:solidFill>
+                  <a:latin typeface="Karla" pitchFamily="2" charset="0"/>
+                </a:endParaRPr>
+              </a:p>
+            </p:txBody>
+          </p:sp>
+          <p:sp>
+            <p:nvSpPr>
+              <p:cNvPr id="36" name="Isosceles Triangle 35">
+                <a:extLst>
+                  <a:ext uri="{FF2B5EF4-FFF2-40B4-BE49-F238E27FC236}">
+                    <a16:creationId xmlns:a16="http://schemas.microsoft.com/office/drawing/2014/main" id="{656B8BBE-1B5B-4690-A2CF-126BB19DA128}"/>
+                  </a:ext>
+                </a:extLst>
+              </p:cNvPr>
+              <p:cNvSpPr>
+                <a:spLocks noChangeAspect="1"/>
+              </p:cNvSpPr>
+              <p:nvPr/>
+            </p:nvSpPr>
+            <p:spPr>
+              <a:xfrm rot="10082550" flipH="1">
+                <a:off x="2790034" y="2000559"/>
+                <a:ext cx="274320" cy="347846"/>
+              </a:xfrm>
+              <a:prstGeom prst="triangle">
+                <a:avLst/>
+              </a:prstGeom>
+              <a:solidFill>
+                <a:srgbClr val="FFFFFF"/>
+              </a:solidFill>
+              <a:ln>
+                <a:noFill/>
+              </a:ln>
+            </p:spPr>
+            <p:style>
+              <a:lnRef idx="2">
+                <a:schemeClr val="accent1">
+                  <a:shade val="50000"/>
+                </a:schemeClr>
+              </a:lnRef>
+              <a:fillRef idx="1">
+                <a:schemeClr val="accent1"/>
+              </a:fillRef>
+              <a:effectRef idx="0">
+                <a:schemeClr val="accent1"/>
+              </a:effectRef>
+              <a:fontRef idx="minor">
+                <a:schemeClr val="lt1"/>
+              </a:fontRef>
+            </p:style>
+            <p:txBody>
+              <a:bodyPr wrap="square" rtlCol="0" anchor="ctr">
+                <a:noAutofit/>
+              </a:bodyPr>
+              <a:lstStyle/>
+              <a:p>
+                <a:pPr algn="ctr"/>
+                <a:endParaRPr lang="en-US" sz="1600" dirty="0">
+                  <a:solidFill>
+                    <a:srgbClr val="947A69"/>
+                  </a:solidFill>
+                  <a:latin typeface="Karla" pitchFamily="2" charset="0"/>
+                </a:endParaRPr>
+              </a:p>
+            </p:txBody>
+          </p:sp>
+          <p:sp>
+            <p:nvSpPr>
+              <p:cNvPr id="12" name="Arc 11">
+                <a:extLst>
+                  <a:ext uri="{FF2B5EF4-FFF2-40B4-BE49-F238E27FC236}">
+                    <a16:creationId xmlns:a16="http://schemas.microsoft.com/office/drawing/2014/main" id="{D69C6E5F-89EB-4FDC-AA1F-9F87143BFD62}"/>
+                  </a:ext>
+                </a:extLst>
+              </p:cNvPr>
+              <p:cNvSpPr/>
+              <p:nvPr/>
+            </p:nvSpPr>
+            <p:spPr>
+              <a:xfrm rot="8100000">
+                <a:off x="1490290" y="-309403"/>
+                <a:ext cx="2337536" cy="2337541"/>
+              </a:xfrm>
+              <a:prstGeom prst="arc">
+                <a:avLst/>
+              </a:prstGeom>
+              <a:ln w="28575">
+                <a:solidFill>
+                  <a:srgbClr val="947A69"/>
+                </a:solidFill>
+              </a:ln>
+            </p:spPr>
+            <p:style>
+              <a:lnRef idx="1">
+                <a:schemeClr val="accent1"/>
+              </a:lnRef>
+              <a:fillRef idx="0">
+                <a:schemeClr val="accent1"/>
+              </a:fillRef>
+              <a:effectRef idx="0">
+                <a:schemeClr val="accent1"/>
+              </a:effectRef>
+              <a:fontRef idx="minor">
+                <a:schemeClr val="tx1"/>
+              </a:fontRef>
+            </p:style>
+            <p:txBody>
+              <a:bodyPr rtlCol="0" anchor="ctr"/>
+              <a:lstStyle/>
+              <a:p>
+                <a:pPr algn="ctr"/>
+                <a:endParaRPr lang="en-US" sz="1600" dirty="0"/>
+              </a:p>
+            </p:txBody>
+          </p:sp>
+          <p:sp>
+            <p:nvSpPr>
+              <p:cNvPr id="39" name="TextBox 38">
+                <a:extLst>
+                  <a:ext uri="{FF2B5EF4-FFF2-40B4-BE49-F238E27FC236}">
+                    <a16:creationId xmlns:a16="http://schemas.microsoft.com/office/drawing/2014/main" id="{98259FF1-69DE-4DCE-9F68-21761A9CC1CF}"/>
+                  </a:ext>
+                </a:extLst>
+              </p:cNvPr>
+              <p:cNvSpPr txBox="1"/>
+              <p:nvPr/>
+            </p:nvSpPr>
+            <p:spPr>
+              <a:xfrm rot="2088303">
+                <a:off x="1819525" y="1807221"/>
+                <a:ext cx="202568" cy="190821"/>
+              </a:xfrm>
+              <a:prstGeom prst="rect">
+                <a:avLst/>
+              </a:prstGeom>
+              <a:noFill/>
+            </p:spPr>
+            <p:txBody>
+              <a:bodyPr wrap="none" rtlCol="0">
+                <a:spAutoFit/>
+              </a:bodyPr>
+              <a:lstStyle/>
+              <a:p>
+                <a:pPr algn="ctr"/>
+                <a:r>
+                  <a:rPr lang="en-US" sz="1600" dirty="0">
+                    <a:solidFill>
+                      <a:srgbClr val="947A69"/>
+                    </a:solidFill>
+                    <a:latin typeface="Karla" pitchFamily="2" charset="0"/>
+                  </a:rPr>
+                  <a:t>M</a:t>
+                </a:r>
+              </a:p>
+            </p:txBody>
+          </p:sp>
+          <p:sp>
+            <p:nvSpPr>
+              <p:cNvPr id="40" name="TextBox 39">
+                <a:extLst>
+                  <a:ext uri="{FF2B5EF4-FFF2-40B4-BE49-F238E27FC236}">
+                    <a16:creationId xmlns:a16="http://schemas.microsoft.com/office/drawing/2014/main" id="{A52F8C53-71B6-4048-8F3A-9BDF4218CFE6}"/>
+                  </a:ext>
+                </a:extLst>
+              </p:cNvPr>
+              <p:cNvSpPr txBox="1"/>
+              <p:nvPr/>
+            </p:nvSpPr>
+            <p:spPr>
+              <a:xfrm rot="1400978">
+                <a:off x="2051380" y="1930708"/>
+                <a:ext cx="170944" cy="190821"/>
+              </a:xfrm>
+              <a:prstGeom prst="rect">
+                <a:avLst/>
+              </a:prstGeom>
+              <a:noFill/>
+            </p:spPr>
+            <p:txBody>
+              <a:bodyPr wrap="none" rtlCol="0">
+                <a:spAutoFit/>
+              </a:bodyPr>
+              <a:lstStyle/>
+              <a:p>
+                <a:pPr algn="ctr"/>
+                <a:r>
+                  <a:rPr lang="en-US" sz="1600" dirty="0">
+                    <a:solidFill>
+                      <a:srgbClr val="947A69"/>
+                    </a:solidFill>
+                    <a:latin typeface="Karla" pitchFamily="2" charset="0"/>
+                  </a:rPr>
+                  <a:t>A</a:t>
+                </a:r>
+              </a:p>
+            </p:txBody>
+          </p:sp>
+          <p:sp>
+            <p:nvSpPr>
+              <p:cNvPr id="41" name="TextBox 40">
+                <a:extLst>
+                  <a:ext uri="{FF2B5EF4-FFF2-40B4-BE49-F238E27FC236}">
+                    <a16:creationId xmlns:a16="http://schemas.microsoft.com/office/drawing/2014/main" id="{77EDFD7B-9072-4D09-98AE-EA8FFEA84C1F}"/>
+                  </a:ext>
+                </a:extLst>
+              </p:cNvPr>
+              <p:cNvSpPr txBox="1"/>
+              <p:nvPr/>
+            </p:nvSpPr>
+            <p:spPr>
+              <a:xfrm rot="899030">
+                <a:off x="2302858" y="2025816"/>
+                <a:ext cx="173655" cy="190821"/>
+              </a:xfrm>
+              <a:prstGeom prst="rect">
+                <a:avLst/>
+              </a:prstGeom>
+              <a:noFill/>
+            </p:spPr>
+            <p:txBody>
+              <a:bodyPr wrap="none" rtlCol="0">
+                <a:spAutoFit/>
+              </a:bodyPr>
+              <a:lstStyle/>
+              <a:p>
+                <a:pPr algn="ctr"/>
+                <a:r>
+                  <a:rPr lang="en-US" sz="1600" dirty="0">
+                    <a:solidFill>
+                      <a:srgbClr val="947A69"/>
+                    </a:solidFill>
+                    <a:latin typeface="Karla" pitchFamily="2" charset="0"/>
+                  </a:rPr>
+                  <a:t>S</a:t>
+                </a:r>
+              </a:p>
+            </p:txBody>
+          </p:sp>
+          <p:sp>
+            <p:nvSpPr>
+              <p:cNvPr id="42" name="TextBox 41">
+                <a:extLst>
+                  <a:ext uri="{FF2B5EF4-FFF2-40B4-BE49-F238E27FC236}">
+                    <a16:creationId xmlns:a16="http://schemas.microsoft.com/office/drawing/2014/main" id="{C80A8269-291B-4DE7-BD39-64CD6030ACFC}"/>
+                  </a:ext>
+                </a:extLst>
+              </p:cNvPr>
+              <p:cNvSpPr txBox="1"/>
+              <p:nvPr/>
+            </p:nvSpPr>
+            <p:spPr>
+              <a:xfrm>
+                <a:off x="2580408" y="2024793"/>
+                <a:ext cx="161909" cy="190821"/>
+              </a:xfrm>
+              <a:prstGeom prst="rect">
+                <a:avLst/>
+              </a:prstGeom>
+              <a:noFill/>
+            </p:spPr>
+            <p:txBody>
+              <a:bodyPr wrap="none" rtlCol="0">
+                <a:spAutoFit/>
+              </a:bodyPr>
+              <a:lstStyle/>
+              <a:p>
+                <a:pPr algn="ctr"/>
+                <a:r>
+                  <a:rPr lang="en-US" sz="1600" dirty="0">
+                    <a:solidFill>
+                      <a:srgbClr val="947A69"/>
+                    </a:solidFill>
+                    <a:latin typeface="Karla" pitchFamily="2" charset="0"/>
+                  </a:rPr>
+                  <a:t>T</a:t>
+                </a:r>
+              </a:p>
+            </p:txBody>
+          </p:sp>
+          <p:sp>
+            <p:nvSpPr>
+              <p:cNvPr id="43" name="TextBox 42">
+                <a:extLst>
+                  <a:ext uri="{FF2B5EF4-FFF2-40B4-BE49-F238E27FC236}">
+                    <a16:creationId xmlns:a16="http://schemas.microsoft.com/office/drawing/2014/main" id="{4A3671EA-3D7E-48E3-84C0-1A20D8B99FCD}"/>
+                  </a:ext>
+                </a:extLst>
+              </p:cNvPr>
+              <p:cNvSpPr txBox="1"/>
+              <p:nvPr/>
+            </p:nvSpPr>
+            <p:spPr>
+              <a:xfrm rot="20792516">
+                <a:off x="2833916" y="2030586"/>
+                <a:ext cx="169137" cy="190821"/>
+              </a:xfrm>
+              <a:prstGeom prst="rect">
+                <a:avLst/>
+              </a:prstGeom>
+              <a:noFill/>
+            </p:spPr>
+            <p:txBody>
+              <a:bodyPr wrap="none" rtlCol="0">
+                <a:spAutoFit/>
+              </a:bodyPr>
+              <a:lstStyle/>
+              <a:p>
+                <a:pPr algn="ctr"/>
+                <a:r>
+                  <a:rPr lang="en-US" sz="1600" dirty="0">
+                    <a:solidFill>
+                      <a:srgbClr val="947A69"/>
+                    </a:solidFill>
+                    <a:latin typeface="Karla" pitchFamily="2" charset="0"/>
+                  </a:rPr>
+                  <a:t>E</a:t>
+                </a:r>
+              </a:p>
+            </p:txBody>
+          </p:sp>
+          <p:sp>
+            <p:nvSpPr>
+              <p:cNvPr id="44" name="TextBox 43">
+                <a:extLst>
+                  <a:ext uri="{FF2B5EF4-FFF2-40B4-BE49-F238E27FC236}">
+                    <a16:creationId xmlns:a16="http://schemas.microsoft.com/office/drawing/2014/main" id="{0D8199D1-1154-4D38-8ABA-EBD169B382A6}"/>
+                  </a:ext>
+                </a:extLst>
+              </p:cNvPr>
+              <p:cNvSpPr txBox="1"/>
+              <p:nvPr/>
+            </p:nvSpPr>
+            <p:spPr>
+              <a:xfrm rot="20571121">
+                <a:off x="3079861" y="1934506"/>
+                <a:ext cx="174558" cy="190821"/>
+              </a:xfrm>
+              <a:prstGeom prst="rect">
+                <a:avLst/>
+              </a:prstGeom>
+              <a:noFill/>
+            </p:spPr>
+            <p:txBody>
+              <a:bodyPr wrap="none" rtlCol="0">
+                <a:spAutoFit/>
+              </a:bodyPr>
+              <a:lstStyle/>
+              <a:p>
+                <a:pPr algn="ctr"/>
+                <a:r>
+                  <a:rPr lang="en-US" sz="1600" dirty="0">
+                    <a:solidFill>
+                      <a:srgbClr val="947A69"/>
+                    </a:solidFill>
+                    <a:latin typeface="Karla" pitchFamily="2" charset="0"/>
+                  </a:rPr>
+                  <a:t>R</a:t>
+                </a:r>
+              </a:p>
+            </p:txBody>
+          </p:sp>
+          <p:sp>
+            <p:nvSpPr>
+              <p:cNvPr id="45" name="TextBox 44">
+                <a:extLst>
+                  <a:ext uri="{FF2B5EF4-FFF2-40B4-BE49-F238E27FC236}">
+                    <a16:creationId xmlns:a16="http://schemas.microsoft.com/office/drawing/2014/main" id="{418B1E9B-8062-4A6A-932B-C7030E68A0E6}"/>
+                  </a:ext>
+                </a:extLst>
+              </p:cNvPr>
+              <p:cNvSpPr txBox="1"/>
+              <p:nvPr/>
+            </p:nvSpPr>
+            <p:spPr>
+              <a:xfrm rot="19302371">
+                <a:off x="3307585" y="1824644"/>
+                <a:ext cx="167330" cy="190821"/>
+              </a:xfrm>
+              <a:prstGeom prst="rect">
+                <a:avLst/>
+              </a:prstGeom>
+              <a:noFill/>
+            </p:spPr>
+            <p:txBody>
+              <a:bodyPr wrap="none" rtlCol="0">
+                <a:spAutoFit/>
+              </a:bodyPr>
+              <a:lstStyle/>
+              <a:p>
+                <a:pPr algn="ctr"/>
+                <a:r>
+                  <a:rPr lang="en-US" sz="1600" dirty="0">
+                    <a:solidFill>
+                      <a:srgbClr val="947A69"/>
+                    </a:solidFill>
+                    <a:latin typeface="Karla" pitchFamily="2" charset="0"/>
+                  </a:rPr>
+                  <a:t>Y</a:t>
+                </a:r>
+              </a:p>
+            </p:txBody>
+          </p:sp>
+        </p:grpSp>
+        <p:grpSp>
+          <p:nvGrpSpPr>
+            <p:cNvPr id="103" name="Group 102">
+              <a:extLst>
+                <a:ext uri="{FF2B5EF4-FFF2-40B4-BE49-F238E27FC236}">
+                  <a16:creationId xmlns:a16="http://schemas.microsoft.com/office/drawing/2014/main" id="{2BF05F93-A00A-47A2-93CC-FBE4DADF6203}"/>
+                </a:ext>
+              </a:extLst>
+            </p:cNvPr>
+            <p:cNvGrpSpPr/>
+            <p:nvPr/>
+          </p:nvGrpSpPr>
+          <p:grpSpPr>
+            <a:xfrm>
+              <a:off x="1239931" y="-353088"/>
+              <a:ext cx="2834640" cy="3175764"/>
+              <a:chOff x="1239931" y="-353088"/>
+              <a:chExt cx="2834640" cy="3175764"/>
+            </a:xfrm>
+          </p:grpSpPr>
+          <p:grpSp>
+            <p:nvGrpSpPr>
+              <p:cNvPr id="68" name="Group 67">
+                <a:extLst>
+                  <a:ext uri="{FF2B5EF4-FFF2-40B4-BE49-F238E27FC236}">
+                    <a16:creationId xmlns:a16="http://schemas.microsoft.com/office/drawing/2014/main" id="{C233304D-A677-4753-96C4-EAE2D0F85D32}"/>
+                  </a:ext>
+                </a:extLst>
+              </p:cNvPr>
+              <p:cNvGrpSpPr/>
+              <p:nvPr/>
+            </p:nvGrpSpPr>
+            <p:grpSpPr>
+              <a:xfrm>
+                <a:off x="1638515" y="2209699"/>
+                <a:ext cx="274320" cy="347846"/>
+                <a:chOff x="1904588" y="1932907"/>
+                <a:chExt cx="274320" cy="347846"/>
+              </a:xfrm>
+            </p:grpSpPr>
+            <p:sp>
+              <p:nvSpPr>
+                <p:cNvPr id="66" name="Isosceles Triangle 65">
+                  <a:extLst>
+                    <a:ext uri="{FF2B5EF4-FFF2-40B4-BE49-F238E27FC236}">
+                      <a16:creationId xmlns:a16="http://schemas.microsoft.com/office/drawing/2014/main" id="{D8B973EE-8BE1-49B7-A9A6-55E153E69DC8}"/>
+                    </a:ext>
+                  </a:extLst>
+                </p:cNvPr>
+                <p:cNvSpPr>
+                  <a:spLocks noChangeAspect="1"/>
+                </p:cNvSpPr>
+                <p:nvPr/>
+              </p:nvSpPr>
+              <p:spPr>
+                <a:xfrm rot="12848413">
+                  <a:off x="1904588" y="1932907"/>
+                  <a:ext cx="274320" cy="347846"/>
+                </a:xfrm>
+                <a:prstGeom prst="triangle">
+                  <a:avLst/>
+                </a:prstGeom>
+                <a:solidFill>
+                  <a:srgbClr val="FFFFFF"/>
+                </a:solidFill>
+                <a:ln>
+                  <a:noFill/>
+                </a:ln>
+              </p:spPr>
+              <p:style>
+                <a:lnRef idx="2">
+                  <a:schemeClr val="accent1">
+                    <a:shade val="50000"/>
+                  </a:schemeClr>
+                </a:lnRef>
+                <a:fillRef idx="1">
+                  <a:schemeClr val="accent1"/>
+                </a:fillRef>
+                <a:effectRef idx="0">
+                  <a:schemeClr val="accent1"/>
+                </a:effectRef>
+                <a:fontRef idx="minor">
+                  <a:schemeClr val="lt1"/>
+                </a:fontRef>
+              </p:style>
+              <p:txBody>
+                <a:bodyPr wrap="square" rtlCol="0" anchor="ctr">
+                  <a:noAutofit/>
+                </a:bodyPr>
+                <a:lstStyle/>
+                <a:p>
+                  <a:pPr algn="ctr"/>
+                  <a:endParaRPr lang="en-US" sz="1600" dirty="0">
+                    <a:solidFill>
+                      <a:srgbClr val="947A69"/>
+                    </a:solidFill>
+                    <a:latin typeface="Karla" pitchFamily="2" charset="0"/>
+                  </a:endParaRPr>
+                </a:p>
+              </p:txBody>
+            </p:sp>
+            <p:sp>
+              <p:nvSpPr>
+                <p:cNvPr id="67" name="TextBox 66">
+                  <a:extLst>
+                    <a:ext uri="{FF2B5EF4-FFF2-40B4-BE49-F238E27FC236}">
+                      <a16:creationId xmlns:a16="http://schemas.microsoft.com/office/drawing/2014/main" id="{C7B3E0E9-6B36-4BDB-A034-6ED883074CC0}"/>
+                    </a:ext>
+                  </a:extLst>
+                </p:cNvPr>
+                <p:cNvSpPr txBox="1"/>
+                <p:nvPr/>
+              </p:nvSpPr>
+              <p:spPr>
+                <a:xfrm rot="2088303">
+                  <a:off x="1987738" y="1959619"/>
+                  <a:ext cx="170944" cy="190822"/>
+                </a:xfrm>
+                <a:prstGeom prst="rect">
+                  <a:avLst/>
+                </a:prstGeom>
+                <a:noFill/>
+              </p:spPr>
+              <p:txBody>
+                <a:bodyPr wrap="none" rtlCol="0">
+                  <a:spAutoFit/>
+                </a:bodyPr>
+                <a:lstStyle/>
+                <a:p>
+                  <a:pPr algn="ctr"/>
+                  <a:r>
+                    <a:rPr lang="en-US" sz="1600" dirty="0">
+                      <a:solidFill>
+                        <a:srgbClr val="947A69"/>
+                      </a:solidFill>
+                      <a:latin typeface="Karla" pitchFamily="2" charset="0"/>
+                    </a:rPr>
+                    <a:t>A</a:t>
+                  </a:r>
+                </a:p>
+              </p:txBody>
+            </p:sp>
+          </p:grpSp>
+          <p:grpSp>
+            <p:nvGrpSpPr>
+              <p:cNvPr id="69" name="Group 68">
+                <a:extLst>
+                  <a:ext uri="{FF2B5EF4-FFF2-40B4-BE49-F238E27FC236}">
+                    <a16:creationId xmlns:a16="http://schemas.microsoft.com/office/drawing/2014/main" id="{934EA482-75C5-4024-9F45-9355405AFC5A}"/>
+                  </a:ext>
+                </a:extLst>
+              </p:cNvPr>
+              <p:cNvGrpSpPr/>
+              <p:nvPr/>
+            </p:nvGrpSpPr>
+            <p:grpSpPr>
+              <a:xfrm rot="21035215">
+                <a:off x="1867735" y="2336577"/>
+                <a:ext cx="274320" cy="347846"/>
+                <a:chOff x="1904588" y="1932907"/>
+                <a:chExt cx="274320" cy="347846"/>
+              </a:xfrm>
+            </p:grpSpPr>
+            <p:sp>
+              <p:nvSpPr>
+                <p:cNvPr id="70" name="Isosceles Triangle 69">
+                  <a:extLst>
+                    <a:ext uri="{FF2B5EF4-FFF2-40B4-BE49-F238E27FC236}">
+                      <a16:creationId xmlns:a16="http://schemas.microsoft.com/office/drawing/2014/main" id="{40062F74-3E2F-45FF-BE0C-978716208F04}"/>
+                    </a:ext>
+                  </a:extLst>
+                </p:cNvPr>
+                <p:cNvSpPr>
+                  <a:spLocks noChangeAspect="1"/>
+                </p:cNvSpPr>
+                <p:nvPr/>
+              </p:nvSpPr>
+              <p:spPr>
+                <a:xfrm rot="12848413">
+                  <a:off x="1904588" y="1932907"/>
+                  <a:ext cx="274320" cy="347846"/>
+                </a:xfrm>
+                <a:prstGeom prst="triangle">
+                  <a:avLst/>
+                </a:prstGeom>
+                <a:solidFill>
+                  <a:srgbClr val="FFFFFF"/>
+                </a:solidFill>
+                <a:ln>
+                  <a:noFill/>
+                </a:ln>
+              </p:spPr>
+              <p:style>
+                <a:lnRef idx="2">
+                  <a:schemeClr val="accent1">
+                    <a:shade val="50000"/>
+                  </a:schemeClr>
+                </a:lnRef>
+                <a:fillRef idx="1">
+                  <a:schemeClr val="accent1"/>
+                </a:fillRef>
+                <a:effectRef idx="0">
+                  <a:schemeClr val="accent1"/>
+                </a:effectRef>
+                <a:fontRef idx="minor">
+                  <a:schemeClr val="lt1"/>
+                </a:fontRef>
+              </p:style>
+              <p:txBody>
+                <a:bodyPr wrap="square" rtlCol="0" anchor="ctr">
+                  <a:noAutofit/>
+                </a:bodyPr>
+                <a:lstStyle/>
+                <a:p>
+                  <a:pPr algn="ctr"/>
+                  <a:endParaRPr lang="en-US" sz="1600" dirty="0">
+                    <a:solidFill>
+                      <a:srgbClr val="947A69"/>
+                    </a:solidFill>
+                    <a:latin typeface="Karla" pitchFamily="2" charset="0"/>
+                  </a:endParaRPr>
+                </a:p>
+              </p:txBody>
+            </p:sp>
+            <p:sp>
+              <p:nvSpPr>
+                <p:cNvPr id="71" name="TextBox 70">
+                  <a:extLst>
+                    <a:ext uri="{FF2B5EF4-FFF2-40B4-BE49-F238E27FC236}">
+                      <a16:creationId xmlns:a16="http://schemas.microsoft.com/office/drawing/2014/main" id="{3B79E132-73C6-4125-8575-C0F1F79406F3}"/>
+                    </a:ext>
+                  </a:extLst>
+                </p:cNvPr>
+                <p:cNvSpPr txBox="1"/>
+                <p:nvPr/>
+              </p:nvSpPr>
+              <p:spPr>
+                <a:xfrm rot="2088303">
+                  <a:off x="1985932" y="1959619"/>
+                  <a:ext cx="174558" cy="190822"/>
+                </a:xfrm>
+                <a:prstGeom prst="rect">
+                  <a:avLst/>
+                </a:prstGeom>
+                <a:noFill/>
+              </p:spPr>
+              <p:txBody>
+                <a:bodyPr wrap="none" rtlCol="0">
+                  <a:spAutoFit/>
+                </a:bodyPr>
+                <a:lstStyle/>
+                <a:p>
+                  <a:pPr algn="ctr"/>
+                  <a:r>
+                    <a:rPr lang="en-US" sz="1600" dirty="0">
+                      <a:solidFill>
+                        <a:srgbClr val="947A69"/>
+                      </a:solidFill>
+                      <a:latin typeface="Karla" pitchFamily="2" charset="0"/>
+                    </a:rPr>
+                    <a:t>C</a:t>
+                  </a:r>
+                </a:p>
+              </p:txBody>
+            </p:sp>
+          </p:grpSp>
+          <p:grpSp>
+            <p:nvGrpSpPr>
+              <p:cNvPr id="72" name="Group 71">
+                <a:extLst>
+                  <a:ext uri="{FF2B5EF4-FFF2-40B4-BE49-F238E27FC236}">
+                    <a16:creationId xmlns:a16="http://schemas.microsoft.com/office/drawing/2014/main" id="{63D4D768-921F-4554-8B46-7139AC11C36E}"/>
+                  </a:ext>
+                </a:extLst>
+              </p:cNvPr>
+              <p:cNvGrpSpPr/>
+              <p:nvPr/>
+            </p:nvGrpSpPr>
+            <p:grpSpPr>
+              <a:xfrm rot="20390960">
+                <a:off x="2116711" y="2428187"/>
+                <a:ext cx="274320" cy="347846"/>
+                <a:chOff x="1904588" y="1932907"/>
+                <a:chExt cx="274320" cy="347846"/>
+              </a:xfrm>
+            </p:grpSpPr>
+            <p:sp>
+              <p:nvSpPr>
+                <p:cNvPr id="73" name="Isosceles Triangle 72">
+                  <a:extLst>
+                    <a:ext uri="{FF2B5EF4-FFF2-40B4-BE49-F238E27FC236}">
+                      <a16:creationId xmlns:a16="http://schemas.microsoft.com/office/drawing/2014/main" id="{61FE1BB2-E970-43D6-BD5D-5C5535655493}"/>
+                    </a:ext>
+                  </a:extLst>
+                </p:cNvPr>
+                <p:cNvSpPr>
+                  <a:spLocks noChangeAspect="1"/>
+                </p:cNvSpPr>
+                <p:nvPr/>
+              </p:nvSpPr>
+              <p:spPr>
+                <a:xfrm rot="12848413">
+                  <a:off x="1904588" y="1932907"/>
+                  <a:ext cx="274320" cy="347846"/>
+                </a:xfrm>
+                <a:prstGeom prst="triangle">
+                  <a:avLst/>
+                </a:prstGeom>
+                <a:solidFill>
+                  <a:srgbClr val="FFFFFF"/>
+                </a:solidFill>
+                <a:ln>
+                  <a:noFill/>
+                </a:ln>
+              </p:spPr>
+              <p:style>
+                <a:lnRef idx="2">
+                  <a:schemeClr val="accent1">
+                    <a:shade val="50000"/>
+                  </a:schemeClr>
+                </a:lnRef>
+                <a:fillRef idx="1">
+                  <a:schemeClr val="accent1"/>
+                </a:fillRef>
+                <a:effectRef idx="0">
+                  <a:schemeClr val="accent1"/>
+                </a:effectRef>
+                <a:fontRef idx="minor">
+                  <a:schemeClr val="lt1"/>
+                </a:fontRef>
+              </p:style>
+              <p:txBody>
+                <a:bodyPr wrap="square" rtlCol="0" anchor="ctr">
+                  <a:noAutofit/>
+                </a:bodyPr>
+                <a:lstStyle/>
+                <a:p>
+                  <a:pPr algn="ctr"/>
+                  <a:endParaRPr lang="en-US" sz="1600" dirty="0">
+                    <a:solidFill>
+                      <a:srgbClr val="947A69"/>
+                    </a:solidFill>
+                    <a:latin typeface="Karla" pitchFamily="2" charset="0"/>
+                  </a:endParaRPr>
+                </a:p>
+              </p:txBody>
+            </p:sp>
+            <p:sp>
+              <p:nvSpPr>
+                <p:cNvPr id="74" name="TextBox 73">
+                  <a:extLst>
+                    <a:ext uri="{FF2B5EF4-FFF2-40B4-BE49-F238E27FC236}">
+                      <a16:creationId xmlns:a16="http://schemas.microsoft.com/office/drawing/2014/main" id="{FB355527-74DC-47B9-AACE-E4F36EC7DE4F}"/>
+                    </a:ext>
+                  </a:extLst>
+                </p:cNvPr>
+                <p:cNvSpPr txBox="1"/>
+                <p:nvPr/>
+              </p:nvSpPr>
+              <p:spPr>
+                <a:xfrm rot="2088303">
+                  <a:off x="1982318" y="1959619"/>
+                  <a:ext cx="181786" cy="190822"/>
+                </a:xfrm>
+                <a:prstGeom prst="rect">
+                  <a:avLst/>
+                </a:prstGeom>
+                <a:noFill/>
+              </p:spPr>
+              <p:txBody>
+                <a:bodyPr wrap="none" rtlCol="0">
+                  <a:spAutoFit/>
+                </a:bodyPr>
+                <a:lstStyle/>
+                <a:p>
+                  <a:pPr algn="ctr"/>
+                  <a:r>
+                    <a:rPr lang="en-US" sz="1600" dirty="0">
+                      <a:solidFill>
+                        <a:srgbClr val="947A69"/>
+                      </a:solidFill>
+                      <a:latin typeface="Karla" pitchFamily="2" charset="0"/>
+                    </a:rPr>
+                    <a:t>H</a:t>
+                  </a:r>
+                </a:p>
+              </p:txBody>
+            </p:sp>
+          </p:grpSp>
+          <p:grpSp>
+            <p:nvGrpSpPr>
+              <p:cNvPr id="75" name="Group 74">
+                <a:extLst>
+                  <a:ext uri="{FF2B5EF4-FFF2-40B4-BE49-F238E27FC236}">
+                    <a16:creationId xmlns:a16="http://schemas.microsoft.com/office/drawing/2014/main" id="{FE900CAE-3984-4EE8-A2C4-48209A280433}"/>
+                  </a:ext>
+                </a:extLst>
+              </p:cNvPr>
+              <p:cNvGrpSpPr/>
+              <p:nvPr/>
+            </p:nvGrpSpPr>
+            <p:grpSpPr>
+              <a:xfrm rot="19813120">
+                <a:off x="2384487" y="2474283"/>
+                <a:ext cx="274320" cy="347846"/>
+                <a:chOff x="1904588" y="1932907"/>
+                <a:chExt cx="274320" cy="347846"/>
+              </a:xfrm>
+            </p:grpSpPr>
+            <p:sp>
+              <p:nvSpPr>
+                <p:cNvPr id="76" name="Isosceles Triangle 75">
+                  <a:extLst>
+                    <a:ext uri="{FF2B5EF4-FFF2-40B4-BE49-F238E27FC236}">
+                      <a16:creationId xmlns:a16="http://schemas.microsoft.com/office/drawing/2014/main" id="{AF58082B-59B3-4BC9-8F06-228B0AE421F4}"/>
+                    </a:ext>
+                  </a:extLst>
+                </p:cNvPr>
+                <p:cNvSpPr>
+                  <a:spLocks noChangeAspect="1"/>
+                </p:cNvSpPr>
+                <p:nvPr/>
+              </p:nvSpPr>
+              <p:spPr>
+                <a:xfrm rot="12848413">
+                  <a:off x="1904588" y="1932907"/>
+                  <a:ext cx="274320" cy="347846"/>
+                </a:xfrm>
+                <a:prstGeom prst="triangle">
+                  <a:avLst/>
+                </a:prstGeom>
+                <a:solidFill>
+                  <a:srgbClr val="FFFFFF"/>
+                </a:solidFill>
+                <a:ln>
+                  <a:noFill/>
+                </a:ln>
+              </p:spPr>
+              <p:style>
+                <a:lnRef idx="2">
+                  <a:schemeClr val="accent1">
+                    <a:shade val="50000"/>
+                  </a:schemeClr>
+                </a:lnRef>
+                <a:fillRef idx="1">
+                  <a:schemeClr val="accent1"/>
+                </a:fillRef>
+                <a:effectRef idx="0">
+                  <a:schemeClr val="accent1"/>
+                </a:effectRef>
+                <a:fontRef idx="minor">
+                  <a:schemeClr val="lt1"/>
+                </a:fontRef>
+              </p:style>
+              <p:txBody>
+                <a:bodyPr wrap="square" rtlCol="0" anchor="ctr">
+                  <a:noAutofit/>
+                </a:bodyPr>
+                <a:lstStyle/>
+                <a:p>
+                  <a:pPr algn="ctr"/>
+                  <a:endParaRPr lang="en-US" sz="1600" dirty="0">
+                    <a:solidFill>
+                      <a:srgbClr val="947A69"/>
+                    </a:solidFill>
+                    <a:latin typeface="Karla" pitchFamily="2" charset="0"/>
+                  </a:endParaRPr>
+                </a:p>
+              </p:txBody>
+            </p:sp>
+            <p:sp>
+              <p:nvSpPr>
+                <p:cNvPr id="77" name="TextBox 76">
+                  <a:extLst>
+                    <a:ext uri="{FF2B5EF4-FFF2-40B4-BE49-F238E27FC236}">
+                      <a16:creationId xmlns:a16="http://schemas.microsoft.com/office/drawing/2014/main" id="{6DB6CED8-88E6-4846-808A-B7C4A8FF8A7A}"/>
+                    </a:ext>
+                  </a:extLst>
+                </p:cNvPr>
+                <p:cNvSpPr txBox="1"/>
+                <p:nvPr/>
+              </p:nvSpPr>
+              <p:spPr>
+                <a:xfrm rot="2088303">
+                  <a:off x="2004906" y="1959619"/>
+                  <a:ext cx="136611" cy="190822"/>
+                </a:xfrm>
+                <a:prstGeom prst="rect">
+                  <a:avLst/>
+                </a:prstGeom>
+                <a:noFill/>
+              </p:spPr>
+              <p:txBody>
+                <a:bodyPr wrap="none" rtlCol="0">
+                  <a:spAutoFit/>
+                </a:bodyPr>
+                <a:lstStyle/>
+                <a:p>
+                  <a:pPr algn="ctr"/>
+                  <a:r>
+                    <a:rPr lang="en-US" sz="1600" dirty="0">
+                      <a:solidFill>
+                        <a:srgbClr val="947A69"/>
+                      </a:solidFill>
+                      <a:latin typeface="Karla" pitchFamily="2" charset="0"/>
+                    </a:rPr>
+                    <a:t>I</a:t>
+                  </a:r>
+                </a:p>
+              </p:txBody>
+            </p:sp>
+          </p:grpSp>
+          <p:grpSp>
+            <p:nvGrpSpPr>
+              <p:cNvPr id="84" name="Group 83">
+                <a:extLst>
+                  <a:ext uri="{FF2B5EF4-FFF2-40B4-BE49-F238E27FC236}">
+                    <a16:creationId xmlns:a16="http://schemas.microsoft.com/office/drawing/2014/main" id="{AC9C4525-0268-48E5-AF6C-6F3FE35E1122}"/>
+                  </a:ext>
+                </a:extLst>
+              </p:cNvPr>
+              <p:cNvGrpSpPr/>
+              <p:nvPr/>
+            </p:nvGrpSpPr>
+            <p:grpSpPr>
+              <a:xfrm rot="1786880" flipH="1">
+                <a:off x="2649509" y="2474830"/>
+                <a:ext cx="274320" cy="347846"/>
+                <a:chOff x="1904588" y="1932907"/>
+                <a:chExt cx="274320" cy="347846"/>
+              </a:xfrm>
+            </p:grpSpPr>
+            <p:sp>
+              <p:nvSpPr>
+                <p:cNvPr id="85" name="Isosceles Triangle 84">
+                  <a:extLst>
+                    <a:ext uri="{FF2B5EF4-FFF2-40B4-BE49-F238E27FC236}">
+                      <a16:creationId xmlns:a16="http://schemas.microsoft.com/office/drawing/2014/main" id="{BB8AB1DB-FD90-4808-9301-17E54B39AF05}"/>
+                    </a:ext>
+                  </a:extLst>
+                </p:cNvPr>
+                <p:cNvSpPr>
+                  <a:spLocks noChangeAspect="1"/>
+                </p:cNvSpPr>
+                <p:nvPr/>
+              </p:nvSpPr>
+              <p:spPr>
+                <a:xfrm rot="12848413">
+                  <a:off x="1904588" y="1932907"/>
+                  <a:ext cx="274320" cy="347846"/>
+                </a:xfrm>
+                <a:prstGeom prst="triangle">
+                  <a:avLst/>
+                </a:prstGeom>
+                <a:solidFill>
+                  <a:srgbClr val="FFFFFF"/>
+                </a:solidFill>
+                <a:ln>
+                  <a:noFill/>
+                </a:ln>
+              </p:spPr>
+              <p:style>
+                <a:lnRef idx="2">
+                  <a:schemeClr val="accent1">
+                    <a:shade val="50000"/>
+                  </a:schemeClr>
+                </a:lnRef>
+                <a:fillRef idx="1">
+                  <a:schemeClr val="accent1"/>
+                </a:fillRef>
+                <a:effectRef idx="0">
+                  <a:schemeClr val="accent1"/>
+                </a:effectRef>
+                <a:fontRef idx="minor">
+                  <a:schemeClr val="lt1"/>
+                </a:fontRef>
+              </p:style>
+              <p:txBody>
+                <a:bodyPr wrap="square" rtlCol="0" anchor="ctr">
+                  <a:noAutofit/>
+                </a:bodyPr>
+                <a:lstStyle/>
+                <a:p>
+                  <a:pPr algn="ctr"/>
+                  <a:endParaRPr lang="en-US" sz="1600" dirty="0">
+                    <a:solidFill>
+                      <a:srgbClr val="947A69"/>
+                    </a:solidFill>
+                    <a:latin typeface="Karla" pitchFamily="2" charset="0"/>
+                  </a:endParaRPr>
+                </a:p>
+              </p:txBody>
+            </p:sp>
+            <p:sp>
+              <p:nvSpPr>
+                <p:cNvPr id="86" name="TextBox 85">
+                  <a:extLst>
+                    <a:ext uri="{FF2B5EF4-FFF2-40B4-BE49-F238E27FC236}">
+                      <a16:creationId xmlns:a16="http://schemas.microsoft.com/office/drawing/2014/main" id="{BEDB8921-CC63-4D99-9655-D57A91397146}"/>
+                    </a:ext>
+                  </a:extLst>
+                </p:cNvPr>
+                <p:cNvSpPr txBox="1"/>
+                <p:nvPr/>
+              </p:nvSpPr>
+              <p:spPr>
+                <a:xfrm rot="2088303">
+                  <a:off x="1988643" y="1959619"/>
+                  <a:ext cx="169137" cy="190821"/>
+                </a:xfrm>
+                <a:prstGeom prst="rect">
+                  <a:avLst/>
+                </a:prstGeom>
+                <a:noFill/>
+              </p:spPr>
+              <p:txBody>
+                <a:bodyPr wrap="none" rtlCol="0">
+                  <a:spAutoFit/>
+                </a:bodyPr>
+                <a:lstStyle/>
+                <a:p>
+                  <a:pPr algn="ctr"/>
+                  <a:r>
+                    <a:rPr lang="en-US" sz="1600" dirty="0">
+                      <a:solidFill>
+                        <a:srgbClr val="947A69"/>
+                      </a:solidFill>
+                      <a:latin typeface="Karla" pitchFamily="2" charset="0"/>
+                    </a:rPr>
+                    <a:t>E</a:t>
+                  </a:r>
+                </a:p>
+              </p:txBody>
+            </p:sp>
+          </p:grpSp>
+          <p:grpSp>
+            <p:nvGrpSpPr>
+              <p:cNvPr id="94" name="Group 93">
+                <a:extLst>
+                  <a:ext uri="{FF2B5EF4-FFF2-40B4-BE49-F238E27FC236}">
+                    <a16:creationId xmlns:a16="http://schemas.microsoft.com/office/drawing/2014/main" id="{2F6A7A11-6D25-4FE2-83D5-417A87227A01}"/>
+                  </a:ext>
+                </a:extLst>
+              </p:cNvPr>
+              <p:cNvGrpSpPr/>
+              <p:nvPr/>
+            </p:nvGrpSpPr>
+            <p:grpSpPr>
+              <a:xfrm flipH="1">
+                <a:off x="3410385" y="2206161"/>
+                <a:ext cx="274320" cy="347846"/>
+                <a:chOff x="1904588" y="1932907"/>
+                <a:chExt cx="274320" cy="347846"/>
+              </a:xfrm>
+            </p:grpSpPr>
+            <p:sp>
+              <p:nvSpPr>
+                <p:cNvPr id="101" name="Isosceles Triangle 100">
+                  <a:extLst>
+                    <a:ext uri="{FF2B5EF4-FFF2-40B4-BE49-F238E27FC236}">
+                      <a16:creationId xmlns:a16="http://schemas.microsoft.com/office/drawing/2014/main" id="{D51983A9-D4BB-4567-ACCC-E39BE209EE51}"/>
+                    </a:ext>
+                  </a:extLst>
+                </p:cNvPr>
+                <p:cNvSpPr>
+                  <a:spLocks noChangeAspect="1"/>
+                </p:cNvSpPr>
+                <p:nvPr/>
+              </p:nvSpPr>
+              <p:spPr>
+                <a:xfrm rot="12848413">
+                  <a:off x="1904588" y="1932907"/>
+                  <a:ext cx="274320" cy="347846"/>
+                </a:xfrm>
+                <a:prstGeom prst="triangle">
+                  <a:avLst/>
+                </a:prstGeom>
+                <a:solidFill>
+                  <a:srgbClr val="FFFFFF"/>
+                </a:solidFill>
+                <a:ln>
+                  <a:noFill/>
+                </a:ln>
+              </p:spPr>
+              <p:style>
+                <a:lnRef idx="2">
+                  <a:schemeClr val="accent1">
+                    <a:shade val="50000"/>
+                  </a:schemeClr>
+                </a:lnRef>
+                <a:fillRef idx="1">
+                  <a:schemeClr val="accent1"/>
+                </a:fillRef>
+                <a:effectRef idx="0">
+                  <a:schemeClr val="accent1"/>
+                </a:effectRef>
+                <a:fontRef idx="minor">
+                  <a:schemeClr val="lt1"/>
+                </a:fontRef>
+              </p:style>
+              <p:txBody>
+                <a:bodyPr wrap="square" rtlCol="0" anchor="ctr">
+                  <a:noAutofit/>
+                </a:bodyPr>
+                <a:lstStyle/>
+                <a:p>
+                  <a:pPr algn="ctr"/>
+                  <a:endParaRPr lang="en-US" sz="1600" dirty="0">
+                    <a:solidFill>
+                      <a:srgbClr val="947A69"/>
+                    </a:solidFill>
+                    <a:latin typeface="Karla" pitchFamily="2" charset="0"/>
+                  </a:endParaRPr>
+                </a:p>
+              </p:txBody>
+            </p:sp>
+            <p:sp>
+              <p:nvSpPr>
+                <p:cNvPr id="102" name="TextBox 101">
+                  <a:extLst>
+                    <a:ext uri="{FF2B5EF4-FFF2-40B4-BE49-F238E27FC236}">
+                      <a16:creationId xmlns:a16="http://schemas.microsoft.com/office/drawing/2014/main" id="{DD3AF2C1-6FE9-4222-9353-608A3AA7D275}"/>
+                    </a:ext>
+                  </a:extLst>
+                </p:cNvPr>
+                <p:cNvSpPr txBox="1"/>
+                <p:nvPr/>
+              </p:nvSpPr>
+              <p:spPr>
+                <a:xfrm rot="2088303">
+                  <a:off x="1982769" y="1959619"/>
+                  <a:ext cx="180883" cy="190822"/>
+                </a:xfrm>
+                <a:prstGeom prst="rect">
+                  <a:avLst/>
+                </a:prstGeom>
+                <a:noFill/>
+              </p:spPr>
+              <p:txBody>
+                <a:bodyPr wrap="none" rtlCol="0">
+                  <a:spAutoFit/>
+                </a:bodyPr>
+                <a:lstStyle/>
+                <a:p>
+                  <a:pPr algn="ctr"/>
+                  <a:r>
+                    <a:rPr lang="en-US" sz="1600" dirty="0">
+                      <a:solidFill>
+                        <a:srgbClr val="947A69"/>
+                      </a:solidFill>
+                      <a:latin typeface="Karla" pitchFamily="2" charset="0"/>
+                    </a:rPr>
+                    <a:t>D</a:t>
+                  </a:r>
+                </a:p>
+              </p:txBody>
+            </p:sp>
+          </p:grpSp>
+          <p:grpSp>
+            <p:nvGrpSpPr>
+              <p:cNvPr id="95" name="Group 94">
+                <a:extLst>
+                  <a:ext uri="{FF2B5EF4-FFF2-40B4-BE49-F238E27FC236}">
+                    <a16:creationId xmlns:a16="http://schemas.microsoft.com/office/drawing/2014/main" id="{52AE0BF5-333B-40C5-A158-425B12C531E3}"/>
+                  </a:ext>
+                </a:extLst>
+              </p:cNvPr>
+              <p:cNvGrpSpPr/>
+              <p:nvPr/>
+            </p:nvGrpSpPr>
+            <p:grpSpPr>
+              <a:xfrm rot="564785" flipH="1">
+                <a:off x="3181165" y="2337803"/>
+                <a:ext cx="274320" cy="347846"/>
+                <a:chOff x="1904588" y="1932907"/>
+                <a:chExt cx="274320" cy="347846"/>
+              </a:xfrm>
+            </p:grpSpPr>
+            <p:sp>
+              <p:nvSpPr>
+                <p:cNvPr id="99" name="Isosceles Triangle 98">
+                  <a:extLst>
+                    <a:ext uri="{FF2B5EF4-FFF2-40B4-BE49-F238E27FC236}">
+                      <a16:creationId xmlns:a16="http://schemas.microsoft.com/office/drawing/2014/main" id="{D43E8548-2D73-4FE9-B6CF-70AC91774AAD}"/>
+                    </a:ext>
+                  </a:extLst>
+                </p:cNvPr>
+                <p:cNvSpPr>
+                  <a:spLocks noChangeAspect="1"/>
+                </p:cNvSpPr>
+                <p:nvPr/>
+              </p:nvSpPr>
+              <p:spPr>
+                <a:xfrm rot="12848413">
+                  <a:off x="1904588" y="1932907"/>
+                  <a:ext cx="274320" cy="347846"/>
+                </a:xfrm>
+                <a:prstGeom prst="triangle">
+                  <a:avLst/>
+                </a:prstGeom>
+                <a:solidFill>
+                  <a:srgbClr val="FFFFFF"/>
+                </a:solidFill>
+                <a:ln>
+                  <a:noFill/>
+                </a:ln>
+              </p:spPr>
+              <p:style>
+                <a:lnRef idx="2">
+                  <a:schemeClr val="accent1">
+                    <a:shade val="50000"/>
+                  </a:schemeClr>
+                </a:lnRef>
+                <a:fillRef idx="1">
+                  <a:schemeClr val="accent1"/>
+                </a:fillRef>
+                <a:effectRef idx="0">
+                  <a:schemeClr val="accent1"/>
+                </a:effectRef>
+                <a:fontRef idx="minor">
+                  <a:schemeClr val="lt1"/>
+                </a:fontRef>
+              </p:style>
+              <p:txBody>
+                <a:bodyPr wrap="square" rtlCol="0" anchor="ctr">
+                  <a:noAutofit/>
+                </a:bodyPr>
+                <a:lstStyle/>
+                <a:p>
+                  <a:pPr algn="ctr"/>
+                  <a:endParaRPr lang="en-US" sz="1600" dirty="0">
+                    <a:solidFill>
+                      <a:srgbClr val="947A69"/>
+                    </a:solidFill>
+                    <a:latin typeface="Karla" pitchFamily="2" charset="0"/>
+                  </a:endParaRPr>
+                </a:p>
+              </p:txBody>
+            </p:sp>
+            <p:sp>
+              <p:nvSpPr>
+                <p:cNvPr id="100" name="TextBox 99">
+                  <a:extLst>
+                    <a:ext uri="{FF2B5EF4-FFF2-40B4-BE49-F238E27FC236}">
+                      <a16:creationId xmlns:a16="http://schemas.microsoft.com/office/drawing/2014/main" id="{DB5F8800-FD20-4D0B-857E-17D4F5D3277D}"/>
+                    </a:ext>
+                  </a:extLst>
+                </p:cNvPr>
+                <p:cNvSpPr txBox="1"/>
+                <p:nvPr/>
+              </p:nvSpPr>
+              <p:spPr>
+                <a:xfrm rot="2088303">
+                  <a:off x="1988643" y="1959619"/>
+                  <a:ext cx="169137" cy="190822"/>
+                </a:xfrm>
+                <a:prstGeom prst="rect">
+                  <a:avLst/>
+                </a:prstGeom>
+                <a:noFill/>
+              </p:spPr>
+              <p:txBody>
+                <a:bodyPr wrap="none" rtlCol="0">
+                  <a:spAutoFit/>
+                </a:bodyPr>
+                <a:lstStyle/>
+                <a:p>
+                  <a:pPr algn="ctr"/>
+                  <a:r>
+                    <a:rPr lang="en-US" sz="1600" dirty="0">
+                      <a:solidFill>
+                        <a:srgbClr val="947A69"/>
+                      </a:solidFill>
+                      <a:latin typeface="Karla" pitchFamily="2" charset="0"/>
+                    </a:rPr>
+                    <a:t>E</a:t>
+                  </a:r>
+                </a:p>
+              </p:txBody>
+            </p:sp>
+          </p:grpSp>
+          <p:grpSp>
+            <p:nvGrpSpPr>
+              <p:cNvPr id="96" name="Group 95">
+                <a:extLst>
+                  <a:ext uri="{FF2B5EF4-FFF2-40B4-BE49-F238E27FC236}">
+                    <a16:creationId xmlns:a16="http://schemas.microsoft.com/office/drawing/2014/main" id="{A9002E33-4A83-4268-AC5F-B02C48D58F50}"/>
+                  </a:ext>
+                </a:extLst>
+              </p:cNvPr>
+              <p:cNvGrpSpPr/>
+              <p:nvPr/>
+            </p:nvGrpSpPr>
+            <p:grpSpPr>
+              <a:xfrm rot="1209040" flipH="1">
+                <a:off x="2932189" y="2429412"/>
+                <a:ext cx="274320" cy="347846"/>
+                <a:chOff x="1904588" y="1932907"/>
+                <a:chExt cx="274320" cy="347846"/>
+              </a:xfrm>
+            </p:grpSpPr>
+            <p:sp>
+              <p:nvSpPr>
+                <p:cNvPr id="97" name="Isosceles Triangle 96">
+                  <a:extLst>
+                    <a:ext uri="{FF2B5EF4-FFF2-40B4-BE49-F238E27FC236}">
+                      <a16:creationId xmlns:a16="http://schemas.microsoft.com/office/drawing/2014/main" id="{398CC24C-D621-4AAB-AF44-00030DEB91FF}"/>
+                    </a:ext>
+                  </a:extLst>
+                </p:cNvPr>
+                <p:cNvSpPr>
+                  <a:spLocks noChangeAspect="1"/>
+                </p:cNvSpPr>
+                <p:nvPr/>
+              </p:nvSpPr>
+              <p:spPr>
+                <a:xfrm rot="12848413">
+                  <a:off x="1904588" y="1932907"/>
+                  <a:ext cx="274320" cy="347846"/>
+                </a:xfrm>
+                <a:prstGeom prst="triangle">
+                  <a:avLst/>
+                </a:prstGeom>
+                <a:solidFill>
+                  <a:srgbClr val="FFFFFF"/>
+                </a:solidFill>
+                <a:ln>
+                  <a:noFill/>
+                </a:ln>
+              </p:spPr>
+              <p:style>
+                <a:lnRef idx="2">
+                  <a:schemeClr val="accent1">
+                    <a:shade val="50000"/>
+                  </a:schemeClr>
+                </a:lnRef>
+                <a:fillRef idx="1">
+                  <a:schemeClr val="accent1"/>
+                </a:fillRef>
+                <a:effectRef idx="0">
+                  <a:schemeClr val="accent1"/>
+                </a:effectRef>
+                <a:fontRef idx="minor">
+                  <a:schemeClr val="lt1"/>
+                </a:fontRef>
+              </p:style>
+              <p:txBody>
+                <a:bodyPr wrap="square" rtlCol="0" anchor="ctr">
+                  <a:noAutofit/>
+                </a:bodyPr>
+                <a:lstStyle/>
+                <a:p>
+                  <a:pPr algn="ctr"/>
+                  <a:endParaRPr lang="en-US" sz="1600" dirty="0">
+                    <a:solidFill>
+                      <a:srgbClr val="947A69"/>
+                    </a:solidFill>
+                    <a:latin typeface="Karla" pitchFamily="2" charset="0"/>
+                  </a:endParaRPr>
+                </a:p>
+              </p:txBody>
+            </p:sp>
+            <p:sp>
+              <p:nvSpPr>
+                <p:cNvPr id="98" name="TextBox 97">
+                  <a:extLst>
+                    <a:ext uri="{FF2B5EF4-FFF2-40B4-BE49-F238E27FC236}">
+                      <a16:creationId xmlns:a16="http://schemas.microsoft.com/office/drawing/2014/main" id="{929E389B-EBCD-4B4F-906D-F54DA3F7AC86}"/>
+                    </a:ext>
+                  </a:extLst>
+                </p:cNvPr>
+                <p:cNvSpPr txBox="1"/>
+                <p:nvPr/>
+              </p:nvSpPr>
+              <p:spPr>
+                <a:xfrm rot="2088303">
+                  <a:off x="1988643" y="1959619"/>
+                  <a:ext cx="169137" cy="190822"/>
+                </a:xfrm>
+                <a:prstGeom prst="rect">
+                  <a:avLst/>
+                </a:prstGeom>
+                <a:noFill/>
+              </p:spPr>
+              <p:txBody>
+                <a:bodyPr wrap="none" rtlCol="0">
+                  <a:spAutoFit/>
+                </a:bodyPr>
+                <a:lstStyle/>
+                <a:p>
+                  <a:pPr algn="ctr"/>
+                  <a:r>
+                    <a:rPr lang="en-US" sz="1600" dirty="0">
+                      <a:solidFill>
+                        <a:srgbClr val="947A69"/>
+                      </a:solidFill>
+                      <a:latin typeface="Karla" pitchFamily="2" charset="0"/>
+                    </a:rPr>
+                    <a:t>V</a:t>
+                  </a:r>
+                </a:p>
+              </p:txBody>
+            </p:sp>
+          </p:grpSp>
+          <p:sp>
+            <p:nvSpPr>
+              <p:cNvPr id="65" name="Arc 64">
+                <a:extLst>
+                  <a:ext uri="{FF2B5EF4-FFF2-40B4-BE49-F238E27FC236}">
+                    <a16:creationId xmlns:a16="http://schemas.microsoft.com/office/drawing/2014/main" id="{9E09C613-50D1-4828-97F0-15C15439425C}"/>
+                  </a:ext>
+                </a:extLst>
+              </p:cNvPr>
+              <p:cNvSpPr/>
+              <p:nvPr/>
+            </p:nvSpPr>
+            <p:spPr>
+              <a:xfrm rot="8100000">
+                <a:off x="1239931" y="-353088"/>
+                <a:ext cx="2834640" cy="2834640"/>
+              </a:xfrm>
+              <a:prstGeom prst="arc">
+                <a:avLst/>
+              </a:prstGeom>
+              <a:ln w="28575">
+                <a:solidFill>
+                  <a:srgbClr val="947A69"/>
+                </a:solidFill>
+              </a:ln>
+            </p:spPr>
+            <p:style>
+              <a:lnRef idx="1">
+                <a:schemeClr val="accent1"/>
+              </a:lnRef>
+              <a:fillRef idx="0">
+                <a:schemeClr val="accent1"/>
+              </a:fillRef>
+              <a:effectRef idx="0">
+                <a:schemeClr val="accent1"/>
+              </a:effectRef>
+              <a:fontRef idx="minor">
+                <a:schemeClr val="tx1"/>
+              </a:fontRef>
+            </p:style>
+            <p:txBody>
+              <a:bodyPr rtlCol="0" anchor="ctr"/>
+              <a:lstStyle/>
+              <a:p>
+                <a:pPr algn="ctr"/>
+                <a:endParaRPr lang="en-US" sz="1600"/>
+              </a:p>
+            </p:txBody>
+          </p:sp>
+        </p:grpSp>
+      </p:grpSp>
+      <p:grpSp>
+        <p:nvGrpSpPr>
+          <p:cNvPr id="112" name="Group 111">
+            <a:extLst>
+              <a:ext uri="{FF2B5EF4-FFF2-40B4-BE49-F238E27FC236}">
+                <a16:creationId xmlns:a16="http://schemas.microsoft.com/office/drawing/2014/main" id="{4B1A51F6-D843-4AD0-8304-489420D91FCF}"/>
+              </a:ext>
+            </a:extLst>
+          </p:cNvPr>
           <p:cNvGrpSpPr/>
           <p:nvPr/>
         </p:nvGrpSpPr>
         <p:grpSpPr>
-          <a:xfrm flipV="1">
-            <a:off x="6734653" y="2559590"/>
-            <a:ext cx="2044557" cy="2938413"/>
+          <a:xfrm rot="10800000">
+            <a:off x="5931347" y="1570870"/>
+            <a:ext cx="3627440" cy="5213312"/>
             <a:chOff x="3708971" y="1479476"/>
             <a:chExt cx="2044557" cy="2938413"/>
           </a:xfrm>
         </p:grpSpPr>
         <p:sp>
           <p:nvSpPr>
-            <p:cNvPr id="17" name="Trapezoid 16"/>
+            <p:cNvPr id="155" name="Trapezoid 154">
+              <a:extLst>
+                <a:ext uri="{FF2B5EF4-FFF2-40B4-BE49-F238E27FC236}">
+                  <a16:creationId xmlns:a16="http://schemas.microsoft.com/office/drawing/2014/main" id="{E7FF0777-6A0F-408A-A33E-75DC26064C4D}"/>
+                </a:ext>
+              </a:extLst>
+            </p:cNvPr>
             <p:cNvSpPr/>
             <p:nvPr/>
           </p:nvSpPr>
@@ -4169,13 +6042,19 @@
             <a:lstStyle/>
             <a:p>
               <a:pPr algn="ctr"/>
-              <a:endParaRPr lang="en-US"/>
+              <a:endParaRPr lang="en-US" sz="1600"/>
             </a:p>
           </p:txBody>
         </p:sp>
         <p:cxnSp>
           <p:nvCxnSpPr>
-            <p:cNvPr id="21" name="Straight Connector 20"/>
+            <p:cNvPr id="156" name="Straight Connector 155">
+              <a:extLst>
+                <a:ext uri="{FF2B5EF4-FFF2-40B4-BE49-F238E27FC236}">
+                  <a16:creationId xmlns:a16="http://schemas.microsoft.com/office/drawing/2014/main" id="{C0F777CA-BB81-415E-8452-261AC91FB6BC}"/>
+                </a:ext>
+              </a:extLst>
+            </p:cNvPr>
             <p:cNvCxnSpPr/>
             <p:nvPr/>
           </p:nvCxnSpPr>
@@ -4187,7 +6066,7 @@
             <a:prstGeom prst="line">
               <a:avLst/>
             </a:prstGeom>
-            <a:ln w="38100">
+            <a:ln w="76200">
               <a:solidFill>
                 <a:srgbClr val="947A69"/>
               </a:solidFill>
@@ -4210,7 +6089,13 @@
         </p:cxnSp>
         <p:cxnSp>
           <p:nvCxnSpPr>
-            <p:cNvPr id="23" name="Straight Connector 22"/>
+            <p:cNvPr id="157" name="Straight Connector 156">
+              <a:extLst>
+                <a:ext uri="{FF2B5EF4-FFF2-40B4-BE49-F238E27FC236}">
+                  <a16:creationId xmlns:a16="http://schemas.microsoft.com/office/drawing/2014/main" id="{9C672876-4A71-4B9A-8E12-DC78C2DE65A9}"/>
+                </a:ext>
+              </a:extLst>
+            </p:cNvPr>
             <p:cNvCxnSpPr/>
             <p:nvPr/>
           </p:nvCxnSpPr>
@@ -4222,7 +6107,7 @@
             <a:prstGeom prst="line">
               <a:avLst/>
             </a:prstGeom>
-            <a:ln w="38100">
+            <a:ln w="76200">
               <a:solidFill>
                 <a:srgbClr val="947A69"/>
               </a:solidFill>
@@ -4245,7 +6130,13 @@
         </p:cxnSp>
         <p:grpSp>
           <p:nvGrpSpPr>
-            <p:cNvPr id="24" name="Group 23"/>
+            <p:cNvPr id="158" name="Group 157">
+              <a:extLst>
+                <a:ext uri="{FF2B5EF4-FFF2-40B4-BE49-F238E27FC236}">
+                  <a16:creationId xmlns:a16="http://schemas.microsoft.com/office/drawing/2014/main" id="{767184CA-5838-47BC-9AF5-4C915B107E26}"/>
+                </a:ext>
+              </a:extLst>
+            </p:cNvPr>
             <p:cNvGrpSpPr/>
             <p:nvPr/>
           </p:nvGrpSpPr>
@@ -4259,7 +6150,13 @@
           </p:grpSpPr>
           <p:sp>
             <p:nvSpPr>
-              <p:cNvPr id="25" name="Oval 24"/>
+              <p:cNvPr id="159" name="Oval 158">
+                <a:extLst>
+                  <a:ext uri="{FF2B5EF4-FFF2-40B4-BE49-F238E27FC236}">
+                    <a16:creationId xmlns:a16="http://schemas.microsoft.com/office/drawing/2014/main" id="{3A154FF7-CB87-4732-BAB4-56CF35C29C84}"/>
+                  </a:ext>
+                </a:extLst>
+              </p:cNvPr>
               <p:cNvSpPr/>
               <p:nvPr/>
             </p:nvSpPr>
@@ -4302,13 +6199,19 @@
               <a:lstStyle/>
               <a:p>
                 <a:pPr algn="ctr"/>
-                <a:endParaRPr lang="en-US"/>
+                <a:endParaRPr lang="en-US" sz="1600" dirty="0"/>
               </a:p>
             </p:txBody>
           </p:sp>
           <p:sp>
             <p:nvSpPr>
-              <p:cNvPr id="26" name="Oval 25"/>
+              <p:cNvPr id="160" name="Oval 159">
+                <a:extLst>
+                  <a:ext uri="{FF2B5EF4-FFF2-40B4-BE49-F238E27FC236}">
+                    <a16:creationId xmlns:a16="http://schemas.microsoft.com/office/drawing/2014/main" id="{27CF77CC-46BE-4B66-AAB5-1EE704790EC6}"/>
+                  </a:ext>
+                </a:extLst>
+              </p:cNvPr>
               <p:cNvSpPr/>
               <p:nvPr/>
             </p:nvSpPr>
@@ -4351,13 +6254,19 @@
               <a:lstStyle/>
               <a:p>
                 <a:pPr algn="ctr"/>
-                <a:endParaRPr lang="en-US"/>
+                <a:endParaRPr lang="en-US" sz="1600" dirty="0"/>
               </a:p>
             </p:txBody>
           </p:sp>
           <p:sp>
             <p:nvSpPr>
-              <p:cNvPr id="27" name="Oval 26"/>
+              <p:cNvPr id="161" name="Oval 160">
+                <a:extLst>
+                  <a:ext uri="{FF2B5EF4-FFF2-40B4-BE49-F238E27FC236}">
+                    <a16:creationId xmlns:a16="http://schemas.microsoft.com/office/drawing/2014/main" id="{DAE5595B-0741-4995-8EF1-5F9FED73D70C}"/>
+                  </a:ext>
+                </a:extLst>
+              </p:cNvPr>
               <p:cNvSpPr/>
               <p:nvPr/>
             </p:nvSpPr>
@@ -4400,13 +6309,19 @@
               <a:lstStyle/>
               <a:p>
                 <a:pPr algn="ctr"/>
-                <a:endParaRPr lang="en-US"/>
+                <a:endParaRPr lang="en-US" sz="1600" dirty="0"/>
               </a:p>
             </p:txBody>
           </p:sp>
           <p:sp>
             <p:nvSpPr>
-              <p:cNvPr id="28" name="Oval 27"/>
+              <p:cNvPr id="162" name="Oval 161">
+                <a:extLst>
+                  <a:ext uri="{FF2B5EF4-FFF2-40B4-BE49-F238E27FC236}">
+                    <a16:creationId xmlns:a16="http://schemas.microsoft.com/office/drawing/2014/main" id="{F3028906-31F8-47C4-98E3-3EEEA1C0068B}"/>
+                  </a:ext>
+                </a:extLst>
+              </p:cNvPr>
               <p:cNvSpPr/>
               <p:nvPr/>
             </p:nvSpPr>
@@ -4449,50 +6364,12 @@
               <a:lstStyle/>
               <a:p>
                 <a:pPr algn="ctr"/>
-                <a:endParaRPr lang="en-US"/>
+                <a:endParaRPr lang="en-US" sz="1600" dirty="0"/>
               </a:p>
             </p:txBody>
           </p:sp>
         </p:grpSp>
       </p:grpSp>
-      <p:sp>
-        <p:nvSpPr>
-          <p:cNvPr id="2" name="TextBox 1"/>
-          <p:cNvSpPr txBox="1"/>
-          <p:nvPr/>
-        </p:nvSpPr>
-        <p:spPr>
-          <a:xfrm>
-            <a:off x="1636785" y="1650775"/>
-            <a:ext cx="2044557" cy="1063924"/>
-          </a:xfrm>
-          <a:prstGeom prst="rect">
-            <a:avLst/>
-          </a:prstGeom>
-          <a:noFill/>
-        </p:spPr>
-        <p:txBody>
-          <a:bodyPr wrap="none" rtlCol="0">
-            <a:prstTxWarp prst="textArchUp">
-              <a:avLst>
-                <a:gd name="adj" fmla="val 13147348"/>
-              </a:avLst>
-            </a:prstTxWarp>
-            <a:spAutoFit/>
-          </a:bodyPr>
-          <a:lstStyle/>
-          <a:p>
-            <a:r>
-              <a:rPr lang="en-US" spc="300" dirty="0">
-                <a:latin typeface="Karla" charset="0"/>
-                <a:ea typeface="Karla" charset="0"/>
-                <a:cs typeface="Karla" charset="0"/>
-              </a:rPr>
-              <a:t>LET’S BEGIN!</a:t>
-            </a:r>
-          </a:p>
-        </p:txBody>
-      </p:sp>
     </p:spTree>
     <p:extLst>
       <p:ext uri="{BB962C8B-B14F-4D97-AF65-F5344CB8AC3E}">

</xml_diff>

<commit_message>
quick change with scroll behavior & add back to top button
</commit_message>
<xml_diff>
--- a/images/images.pptx
+++ b/images/images.pptx
@@ -201,7 +201,7 @@
           <a:p>
             <a:fld id="{886F97ED-8CED-CA4C-AC21-E9F1C6F3A2C0}" type="datetimeFigureOut">
               <a:rPr lang="en-US" smtClean="0"/>
-              <a:t>7/22/2019</a:t>
+              <a:t>7/3/2020</a:t>
             </a:fld>
             <a:endParaRPr lang="en-US"/>
           </a:p>
@@ -681,7 +681,7 @@
           <a:p>
             <a:fld id="{65BA97D1-A630-FB46-8B2C-2E138AAEAE44}" type="datetimeFigureOut">
               <a:rPr lang="en-US" smtClean="0"/>
-              <a:t>7/22/2019</a:t>
+              <a:t>7/3/2020</a:t>
             </a:fld>
             <a:endParaRPr lang="en-US"/>
           </a:p>
@@ -849,7 +849,7 @@
           <a:p>
             <a:fld id="{65BA97D1-A630-FB46-8B2C-2E138AAEAE44}" type="datetimeFigureOut">
               <a:rPr lang="en-US" smtClean="0"/>
-              <a:t>7/22/2019</a:t>
+              <a:t>7/3/2020</a:t>
             </a:fld>
             <a:endParaRPr lang="en-US"/>
           </a:p>
@@ -1027,7 +1027,7 @@
           <a:p>
             <a:fld id="{65BA97D1-A630-FB46-8B2C-2E138AAEAE44}" type="datetimeFigureOut">
               <a:rPr lang="en-US" smtClean="0"/>
-              <a:t>7/22/2019</a:t>
+              <a:t>7/3/2020</a:t>
             </a:fld>
             <a:endParaRPr lang="en-US"/>
           </a:p>
@@ -1195,7 +1195,7 @@
           <a:p>
             <a:fld id="{65BA97D1-A630-FB46-8B2C-2E138AAEAE44}" type="datetimeFigureOut">
               <a:rPr lang="en-US" smtClean="0"/>
-              <a:t>7/22/2019</a:t>
+              <a:t>7/3/2020</a:t>
             </a:fld>
             <a:endParaRPr lang="en-US"/>
           </a:p>
@@ -1440,7 +1440,7 @@
           <a:p>
             <a:fld id="{65BA97D1-A630-FB46-8B2C-2E138AAEAE44}" type="datetimeFigureOut">
               <a:rPr lang="en-US" smtClean="0"/>
-              <a:t>7/22/2019</a:t>
+              <a:t>7/3/2020</a:t>
             </a:fld>
             <a:endParaRPr lang="en-US"/>
           </a:p>
@@ -1669,7 +1669,7 @@
           <a:p>
             <a:fld id="{65BA97D1-A630-FB46-8B2C-2E138AAEAE44}" type="datetimeFigureOut">
               <a:rPr lang="en-US" smtClean="0"/>
-              <a:t>7/22/2019</a:t>
+              <a:t>7/3/2020</a:t>
             </a:fld>
             <a:endParaRPr lang="en-US"/>
           </a:p>
@@ -2033,7 +2033,7 @@
           <a:p>
             <a:fld id="{65BA97D1-A630-FB46-8B2C-2E138AAEAE44}" type="datetimeFigureOut">
               <a:rPr lang="en-US" smtClean="0"/>
-              <a:t>7/22/2019</a:t>
+              <a:t>7/3/2020</a:t>
             </a:fld>
             <a:endParaRPr lang="en-US"/>
           </a:p>
@@ -2150,7 +2150,7 @@
           <a:p>
             <a:fld id="{65BA97D1-A630-FB46-8B2C-2E138AAEAE44}" type="datetimeFigureOut">
               <a:rPr lang="en-US" smtClean="0"/>
-              <a:t>7/22/2019</a:t>
+              <a:t>7/3/2020</a:t>
             </a:fld>
             <a:endParaRPr lang="en-US"/>
           </a:p>
@@ -2245,7 +2245,7 @@
           <a:p>
             <a:fld id="{65BA97D1-A630-FB46-8B2C-2E138AAEAE44}" type="datetimeFigureOut">
               <a:rPr lang="en-US" smtClean="0"/>
-              <a:t>7/22/2019</a:t>
+              <a:t>7/3/2020</a:t>
             </a:fld>
             <a:endParaRPr lang="en-US"/>
           </a:p>
@@ -2520,7 +2520,7 @@
           <a:p>
             <a:fld id="{65BA97D1-A630-FB46-8B2C-2E138AAEAE44}" type="datetimeFigureOut">
               <a:rPr lang="en-US" smtClean="0"/>
-              <a:t>7/22/2019</a:t>
+              <a:t>7/3/2020</a:t>
             </a:fld>
             <a:endParaRPr lang="en-US"/>
           </a:p>
@@ -2772,7 +2772,7 @@
           <a:p>
             <a:fld id="{65BA97D1-A630-FB46-8B2C-2E138AAEAE44}" type="datetimeFigureOut">
               <a:rPr lang="en-US" smtClean="0"/>
-              <a:t>7/22/2019</a:t>
+              <a:t>7/3/2020</a:t>
             </a:fld>
             <a:endParaRPr lang="en-US"/>
           </a:p>
@@ -2983,7 +2983,7 @@
           <a:p>
             <a:fld id="{65BA97D1-A630-FB46-8B2C-2E138AAEAE44}" type="datetimeFigureOut">
               <a:rPr lang="en-US" smtClean="0"/>
-              <a:t>7/22/2019</a:t>
+              <a:t>7/3/2020</a:t>
             </a:fld>
             <a:endParaRPr lang="en-US"/>
           </a:p>

</xml_diff>